<commit_message>
looks ok from here
</commit_message>
<xml_diff>
--- a/Documentation/presentations/200906_Novartis/caGrid Data Services.pptx
+++ b/Documentation/presentations/200906_Novartis/caGrid Data Services.pptx
@@ -5,7 +5,7 @@
     <p:sldMasterId id="2147483648" r:id="rId1"/>
   </p:sldMasterIdLst>
   <p:notesMasterIdLst>
-    <p:notesMasterId r:id="rId24"/>
+    <p:notesMasterId r:id="rId27"/>
   </p:notesMasterIdLst>
   <p:sldIdLst>
     <p:sldId id="256" r:id="rId2"/>
@@ -20,16 +20,19 @@
     <p:sldId id="273" r:id="rId11"/>
     <p:sldId id="274" r:id="rId12"/>
     <p:sldId id="260" r:id="rId13"/>
-    <p:sldId id="271" r:id="rId14"/>
-    <p:sldId id="272" r:id="rId15"/>
-    <p:sldId id="261" r:id="rId16"/>
-    <p:sldId id="262" r:id="rId17"/>
-    <p:sldId id="263" r:id="rId18"/>
-    <p:sldId id="264" r:id="rId19"/>
-    <p:sldId id="275" r:id="rId20"/>
-    <p:sldId id="276" r:id="rId21"/>
-    <p:sldId id="277" r:id="rId22"/>
-    <p:sldId id="278" r:id="rId23"/>
+    <p:sldId id="280" r:id="rId14"/>
+    <p:sldId id="271" r:id="rId15"/>
+    <p:sldId id="272" r:id="rId16"/>
+    <p:sldId id="261" r:id="rId17"/>
+    <p:sldId id="262" r:id="rId18"/>
+    <p:sldId id="263" r:id="rId19"/>
+    <p:sldId id="264" r:id="rId20"/>
+    <p:sldId id="275" r:id="rId21"/>
+    <p:sldId id="276" r:id="rId22"/>
+    <p:sldId id="281" r:id="rId23"/>
+    <p:sldId id="277" r:id="rId24"/>
+    <p:sldId id="278" r:id="rId25"/>
+    <p:sldId id="279" r:id="rId26"/>
   </p:sldIdLst>
   <p:sldSz cx="9144000" cy="6858000" type="screen4x3"/>
   <p:notesSz cx="6858000" cy="9144000"/>
@@ -902,7 +905,7 @@
             <a:fld id="{F5EA7BEA-0DA3-446B-8D4C-70CC7C2360F4}" type="slidenum">
               <a:rPr lang="en-US"/>
               <a:pPr/>
-              <a:t>15</a:t>
+              <a:t>16</a:t>
             </a:fld>
             <a:endParaRPr lang="en-US"/>
           </a:p>
@@ -1005,7 +1008,7 @@
             <a:fld id="{E9569D21-1F98-43C8-8EC9-B78A541EFFE1}" type="slidenum">
               <a:rPr lang="en-US"/>
               <a:pPr/>
-              <a:t>16</a:t>
+              <a:t>17</a:t>
             </a:fld>
             <a:endParaRPr lang="en-US"/>
           </a:p>
@@ -1108,7 +1111,7 @@
             <a:fld id="{E6CC0C41-88F7-41C7-9D58-41A46E11E94E}" type="slidenum">
               <a:rPr lang="en-US"/>
               <a:pPr/>
-              <a:t>17</a:t>
+              <a:t>18</a:t>
             </a:fld>
             <a:endParaRPr lang="en-US"/>
           </a:p>
@@ -1211,7 +1214,7 @@
             <a:fld id="{06CC5F91-7E10-4D18-9438-9AF3612818A6}" type="slidenum">
               <a:rPr lang="en-US"/>
               <a:pPr/>
-              <a:t>18</a:t>
+              <a:t>19</a:t>
             </a:fld>
             <a:endParaRPr lang="en-US"/>
           </a:p>
@@ -1261,6 +1264,108 @@
               <a:rPr lang="en-US" smtClean="0"/>
               <a:t>And lastly we will even futher specify our search to say not only do we want a taxon to exist but that taxon needs to be from the homo sapiens genus.</a:t>
             </a:r>
+          </a:p>
+        </p:txBody>
+      </p:sp>
+    </p:spTree>
+  </p:cSld>
+  <p:clrMapOvr>
+    <a:masterClrMapping/>
+  </p:clrMapOvr>
+</p:notes>
+</file>
+
+<file path=ppt/notesSlides/notesSlide8.xml><?xml version="1.0" encoding="utf-8"?>
+<p:notes xmlns:a="http://schemas.openxmlformats.org/drawingml/2006/main" xmlns:r="http://schemas.openxmlformats.org/officeDocument/2006/relationships" xmlns:p="http://schemas.openxmlformats.org/presentationml/2006/main">
+  <p:cSld>
+    <p:spTree>
+      <p:nvGrpSpPr>
+        <p:cNvPr id="1" name=""/>
+        <p:cNvGrpSpPr/>
+        <p:nvPr/>
+      </p:nvGrpSpPr>
+      <p:grpSpPr>
+        <a:xfrm>
+          <a:off x="0" y="0"/>
+          <a:ext cx="0" cy="0"/>
+          <a:chOff x="0" y="0"/>
+          <a:chExt cx="0" cy="0"/>
+        </a:xfrm>
+      </p:grpSpPr>
+      <p:sp>
+        <p:nvSpPr>
+          <p:cNvPr id="60418" name="Slide Image Placeholder 1"/>
+          <p:cNvSpPr>
+            <a:spLocks noGrp="1" noRot="1" noChangeAspect="1"/>
+          </p:cNvSpPr>
+          <p:nvPr>
+            <p:ph type="sldImg"/>
+          </p:nvPr>
+        </p:nvSpPr>
+        <p:spPr bwMode="auto">
+          <a:noFill/>
+          <a:ln>
+            <a:solidFill>
+              <a:srgbClr val="000000"/>
+            </a:solidFill>
+            <a:miter lim="800000"/>
+            <a:headEnd/>
+            <a:tailEnd/>
+          </a:ln>
+        </p:spPr>
+      </p:sp>
+      <p:sp>
+        <p:nvSpPr>
+          <p:cNvPr id="60419" name="Notes Placeholder 2"/>
+          <p:cNvSpPr>
+            <a:spLocks noGrp="1"/>
+          </p:cNvSpPr>
+          <p:nvPr>
+            <p:ph type="body" idx="1"/>
+          </p:nvPr>
+        </p:nvSpPr>
+        <p:spPr bwMode="auto">
+          <a:noFill/>
+        </p:spPr>
+        <p:txBody>
+          <a:bodyPr/>
+          <a:lstStyle/>
+          <a:p>
+            <a:r>
+              <a:rPr lang="en-US" smtClean="0"/>
+              <a:t>A DCQL (Which is just distributed CQL) can be used to make queries that are federated and require sub queries to be issues to other data services in order to dertime the result set.  The main addition here is the ability to describe Forieng association which intern create remote joins to happen in the FQP Service.</a:t>
+            </a:r>
+          </a:p>
+        </p:txBody>
+      </p:sp>
+      <p:sp>
+        <p:nvSpPr>
+          <p:cNvPr id="60420" name="Slide Number Placeholder 3"/>
+          <p:cNvSpPr>
+            <a:spLocks noGrp="1"/>
+          </p:cNvSpPr>
+          <p:nvPr>
+            <p:ph type="sldNum" sz="quarter" idx="5"/>
+          </p:nvPr>
+        </p:nvSpPr>
+        <p:spPr bwMode="auto">
+          <a:noFill/>
+          <a:ln>
+            <a:miter lim="800000"/>
+            <a:headEnd/>
+            <a:tailEnd/>
+          </a:ln>
+        </p:spPr>
+        <p:txBody>
+          <a:bodyPr/>
+          <a:lstStyle/>
+          <a:p>
+            <a:fld id="{0EA92AC8-40AC-4621-AB8B-E24657776B35}" type="slidenum">
+              <a:rPr lang="en-US"/>
+              <a:pPr/>
+              <a:t>25</a:t>
+            </a:fld>
+            <a:endParaRPr lang="en-US"/>
           </a:p>
         </p:txBody>
       </p:sp>
@@ -4100,7 +4205,11 @@
           <a:bodyPr/>
           <a:lstStyle/>
           <a:p>
-            <a:endParaRPr lang="en-US"/>
+            <a:r>
+              <a:rPr lang="en-US" dirty="0" smtClean="0"/>
+              <a:t>Data Service Clients</a:t>
+            </a:r>
+            <a:endParaRPr lang="en-US" dirty="0"/>
           </a:p>
         </p:txBody>
       </p:sp>
@@ -4120,13 +4229,121 @@
           <a:lstStyle/>
           <a:p>
             <a:r>
-              <a:rPr lang="en-US" dirty="0" smtClean="0"/>
-              <a:t>… more on CQL query processors here?</a:t>
-            </a:r>
-            <a:endParaRPr lang="en-US" dirty="0"/>
+              <a:rPr lang="en-US" sz="2000" dirty="0" smtClean="0"/>
+              <a:t>Example client set-up and invocation:</a:t>
+            </a:r>
+          </a:p>
+          <a:p>
+            <a:endParaRPr lang="en-US" sz="2000" dirty="0" smtClean="0"/>
+          </a:p>
+          <a:p>
+            <a:endParaRPr lang="en-US" sz="2000" dirty="0" smtClean="0"/>
+          </a:p>
+          <a:p>
+            <a:endParaRPr lang="en-US" sz="2000" dirty="0" smtClean="0"/>
+          </a:p>
+          <a:p>
+            <a:endParaRPr lang="en-US" sz="2000" dirty="0" smtClean="0"/>
+          </a:p>
+          <a:p>
+            <a:pPr lvl="1"/>
+            <a:r>
+              <a:rPr lang="en-US" sz="2000" dirty="0" smtClean="0"/>
+              <a:t>The service URL is defined</a:t>
+            </a:r>
+          </a:p>
+          <a:p>
+            <a:pPr lvl="1"/>
+            <a:r>
+              <a:rPr lang="en-US" sz="2000" dirty="0" smtClean="0"/>
+              <a:t>The </a:t>
+            </a:r>
+            <a:r>
+              <a:rPr lang="en-US" sz="2000" i="1" dirty="0" smtClean="0"/>
+              <a:t>common data service client</a:t>
+            </a:r>
+            <a:r>
+              <a:rPr lang="en-US" sz="2000" dirty="0" smtClean="0"/>
+              <a:t> is created with the URL</a:t>
+            </a:r>
+          </a:p>
+          <a:p>
+            <a:pPr lvl="1"/>
+            <a:r>
+              <a:rPr lang="en-US" sz="2000" dirty="0" smtClean="0"/>
+              <a:t>A new CQL query object is created</a:t>
+            </a:r>
+          </a:p>
+          <a:p>
+            <a:pPr lvl="1"/>
+            <a:r>
+              <a:rPr lang="en-US" sz="2000" dirty="0" smtClean="0"/>
+              <a:t>Its target is set to </a:t>
+            </a:r>
+            <a:r>
+              <a:rPr lang="en-US" sz="2000" i="1" dirty="0" err="1" smtClean="0"/>
+              <a:t>gov.nih.nci.cabio.domain.Gene</a:t>
+            </a:r>
+            <a:endParaRPr lang="en-US" sz="2000" dirty="0" smtClean="0"/>
+          </a:p>
+          <a:p>
+            <a:pPr lvl="1"/>
+            <a:r>
+              <a:rPr lang="en-US" sz="2000" b="0" dirty="0" smtClean="0"/>
+              <a:t>The target is constrained by </a:t>
+            </a:r>
+            <a:r>
+              <a:rPr lang="en-US" sz="2000" b="0" i="1" dirty="0" smtClean="0"/>
+              <a:t>name </a:t>
+            </a:r>
+            <a:r>
+              <a:rPr lang="en-US" sz="2000" b="0" dirty="0" smtClean="0"/>
+              <a:t>attributes with values like </a:t>
+            </a:r>
+            <a:r>
+              <a:rPr lang="en-US" sz="2000" b="0" i="1" dirty="0" err="1" smtClean="0"/>
+              <a:t>brca</a:t>
+            </a:r>
+            <a:r>
+              <a:rPr lang="en-US" sz="2000" b="0" i="1" dirty="0" smtClean="0"/>
+              <a:t>%</a:t>
+            </a:r>
+            <a:endParaRPr lang="en-US" sz="2000" b="0" dirty="0" smtClean="0"/>
+          </a:p>
+          <a:p>
+            <a:pPr lvl="1"/>
+            <a:r>
+              <a:rPr lang="en-US" sz="2000" dirty="0" smtClean="0"/>
+              <a:t>The query is executed by the data service and results are returned</a:t>
+            </a:r>
+            <a:endParaRPr lang="en-US" sz="2000" b="0" dirty="0" smtClean="0"/>
           </a:p>
         </p:txBody>
       </p:sp>
+      <p:pic>
+        <p:nvPicPr>
+          <p:cNvPr id="4" name="Picture 3" descr="Client Example 1.png"/>
+          <p:cNvPicPr>
+            <a:picLocks noChangeAspect="1"/>
+          </p:cNvPicPr>
+          <p:nvPr/>
+        </p:nvPicPr>
+        <p:blipFill>
+          <a:blip r:embed="rId2" cstate="print"/>
+          <a:stretch>
+            <a:fillRect/>
+          </a:stretch>
+        </p:blipFill>
+        <p:spPr>
+          <a:xfrm>
+            <a:off x="762000" y="1724025"/>
+            <a:ext cx="6048375" cy="1476375"/>
+          </a:xfrm>
+          <a:prstGeom prst="rect">
+            <a:avLst/>
+          </a:prstGeom>
+        </p:spPr>
+      </p:pic>
     </p:spTree>
   </p:cSld>
   <p:clrMapOvr>
@@ -4297,7 +4514,7 @@
           <a:p>
             <a:r>
               <a:rPr lang="en-US" dirty="0" smtClean="0"/>
-              <a:t>Parts of a CQL Query</a:t>
+              <a:t>caGrid Query Language (CQL)</a:t>
             </a:r>
             <a:endParaRPr lang="en-US" dirty="0"/>
           </a:p>
@@ -4320,90 +4537,73 @@
           <a:p>
             <a:r>
               <a:rPr lang="en-US" sz="2000" dirty="0" smtClean="0"/>
-              <a:t>Object</a:t>
-            </a:r>
-            <a:endParaRPr lang="en-US" sz="2400" dirty="0" smtClean="0"/>
+              <a:t>Defined by XML schema</a:t>
+            </a:r>
           </a:p>
           <a:p>
             <a:pPr lvl="1"/>
             <a:r>
               <a:rPr lang="en-US" sz="2000" dirty="0" smtClean="0"/>
-              <a:t>Base for search criteria and target definition</a:t>
+              <a:t>Published in GME</a:t>
             </a:r>
           </a:p>
           <a:p>
             <a:pPr lvl="1"/>
             <a:r>
               <a:rPr lang="en-US" sz="2000" dirty="0" smtClean="0"/>
-              <a:t>Contains the name of the data type / class being searched for</a:t>
+              <a:t>Included in every caGrid Data Service</a:t>
+            </a:r>
+          </a:p>
+          <a:p>
+            <a:r>
+              <a:rPr lang="en-US" sz="2000" dirty="0" smtClean="0"/>
+              <a:t>Queries constructed in one of two ways</a:t>
             </a:r>
           </a:p>
           <a:p>
             <a:pPr lvl="1"/>
             <a:r>
               <a:rPr lang="en-US" sz="2000" dirty="0" smtClean="0"/>
-              <a:t>May have one of three child query parts</a:t>
+              <a:t>CQL object API</a:t>
             </a:r>
           </a:p>
           <a:p>
             <a:pPr lvl="2"/>
             <a:r>
               <a:rPr lang="en-US" sz="1800" dirty="0" smtClean="0"/>
-              <a:t>Association, Attribute, or Group</a:t>
-            </a:r>
-          </a:p>
-          <a:p>
+              <a:t>Java beans derived from CQL schema</a:t>
+            </a:r>
+          </a:p>
+          <a:p>
+            <a:pPr lvl="2"/>
+            <a:r>
+              <a:rPr lang="en-US" sz="1800" dirty="0" smtClean="0"/>
+              <a:t>Simple getter / setter functionality to add query components</a:t>
+            </a:r>
+          </a:p>
+          <a:p>
+            <a:pPr lvl="1"/>
             <a:r>
               <a:rPr lang="en-US" sz="2000" dirty="0" smtClean="0"/>
-              <a:t>Target</a:t>
-            </a:r>
-          </a:p>
-          <a:p>
-            <a:pPr lvl="1"/>
-            <a:r>
-              <a:rPr lang="en-US" sz="2000" dirty="0" smtClean="0"/>
-              <a:t>Top level query component extends from Object</a:t>
-            </a:r>
-          </a:p>
-          <a:p>
-            <a:pPr lvl="1"/>
-            <a:r>
-              <a:rPr lang="en-US" sz="2000" dirty="0" smtClean="0"/>
-              <a:t>Identifies the data type which will be returned by the query</a:t>
-            </a:r>
-          </a:p>
-          <a:p>
-            <a:r>
-              <a:rPr lang="en-US" sz="2000" dirty="0" smtClean="0"/>
-              <a:t>Association</a:t>
-            </a:r>
-          </a:p>
-          <a:p>
-            <a:pPr lvl="1"/>
-            <a:r>
-              <a:rPr lang="en-US" sz="2000" dirty="0" smtClean="0"/>
-              <a:t>Lower level query component extends from Object</a:t>
-            </a:r>
-          </a:p>
-          <a:p>
-            <a:pPr lvl="1"/>
-            <a:r>
-              <a:rPr lang="en-US" sz="2000" dirty="0" smtClean="0"/>
-              <a:t>Restricts query results</a:t>
+              <a:t>Written XML document</a:t>
             </a:r>
           </a:p>
           <a:p>
             <a:pPr lvl="2"/>
             <a:r>
+              <a:rPr lang="en-US" sz="1800" dirty="0" err="1" smtClean="0"/>
+              <a:t>Deserialized</a:t>
+            </a:r>
+            <a:r>
               <a:rPr lang="en-US" sz="1800" dirty="0" smtClean="0"/>
-              <a:t>Must be non-null</a:t>
+              <a:t> into CQL object and used with data service client API</a:t>
             </a:r>
           </a:p>
           <a:p>
             <a:pPr lvl="2"/>
             <a:r>
               <a:rPr lang="en-US" sz="1800" dirty="0" smtClean="0"/>
-              <a:t>Further associations, attributes, or groups as child query components</a:t>
+              <a:t>Passed by other means over SOAP interface</a:t>
             </a:r>
           </a:p>
         </p:txBody>
@@ -4473,64 +4673,91 @@
           <a:p>
             <a:r>
               <a:rPr lang="en-US" sz="2000" dirty="0" smtClean="0"/>
-              <a:t>Attribute</a:t>
-            </a:r>
+              <a:t>Object</a:t>
+            </a:r>
+            <a:endParaRPr lang="en-US" sz="2400" dirty="0" smtClean="0"/>
           </a:p>
           <a:p>
             <a:pPr lvl="1"/>
             <a:r>
               <a:rPr lang="en-US" sz="2000" dirty="0" smtClean="0"/>
-              <a:t>Object property used as search criteria</a:t>
+              <a:t>Base for search criteria and target definition</a:t>
             </a:r>
           </a:p>
           <a:p>
             <a:pPr lvl="1"/>
             <a:r>
               <a:rPr lang="en-US" sz="2000" dirty="0" smtClean="0"/>
-              <a:t>Defined in terms of attribute name, predicate, and value</a:t>
+              <a:t>Contains the name of the data type / class being searched for</a:t>
             </a:r>
           </a:p>
           <a:p>
             <a:pPr lvl="1"/>
             <a:r>
               <a:rPr lang="en-US" sz="2000" dirty="0" smtClean="0"/>
-              <a:t>Predicates are similar to SQL</a:t>
+              <a:t>May have one of three child query parts</a:t>
             </a:r>
           </a:p>
           <a:p>
             <a:pPr lvl="2"/>
             <a:r>
               <a:rPr lang="en-US" sz="1800" dirty="0" smtClean="0"/>
-              <a:t>Equals, Not Equals, Like, Less Than, Greater Than, Less or Equal, Greater or Equal, Null, and Not Null</a:t>
+              <a:t>Association, Attribute, or Group</a:t>
             </a:r>
           </a:p>
           <a:p>
             <a:r>
               <a:rPr lang="en-US" sz="2000" dirty="0" smtClean="0"/>
-              <a:t>Group</a:t>
+              <a:t>Target</a:t>
             </a:r>
           </a:p>
           <a:p>
             <a:pPr lvl="1"/>
             <a:r>
               <a:rPr lang="en-US" sz="2000" dirty="0" smtClean="0"/>
-              <a:t>A logical join of child search criteria</a:t>
+              <a:t>Top level query component extends from Object</a:t>
+            </a:r>
+          </a:p>
+          <a:p>
+            <a:pPr lvl="1"/>
+            <a:r>
+              <a:rPr lang="en-US" sz="2000" dirty="0" smtClean="0"/>
+              <a:t>Identifies the data type which will be returned by the query</a:t>
+            </a:r>
+          </a:p>
+          <a:p>
+            <a:r>
+              <a:rPr lang="en-US" sz="2000" dirty="0" smtClean="0"/>
+              <a:t>Association</a:t>
+            </a:r>
+          </a:p>
+          <a:p>
+            <a:pPr lvl="1"/>
+            <a:r>
+              <a:rPr lang="en-US" sz="2000" dirty="0" smtClean="0"/>
+              <a:t>Lower level query component extends from Object</a:t>
+            </a:r>
+          </a:p>
+          <a:p>
+            <a:pPr lvl="1"/>
+            <a:r>
+              <a:rPr lang="en-US" sz="2000" dirty="0" smtClean="0"/>
+              <a:t>Restricts query results</a:t>
             </a:r>
           </a:p>
           <a:p>
             <a:pPr lvl="2"/>
             <a:r>
               <a:rPr lang="en-US" sz="1800" dirty="0" smtClean="0"/>
-              <a:t>Logical operators AND / OR</a:t>
-            </a:r>
-          </a:p>
-          <a:p>
-            <a:pPr lvl="1"/>
-            <a:r>
-              <a:rPr lang="en-US" sz="2000" dirty="0" smtClean="0"/>
-              <a:t>May have one or more Attributes, Associations, or additional Groups in combination</a:t>
-            </a:r>
-            <a:endParaRPr lang="en-US" sz="2000" dirty="0"/>
+              <a:t>Must be non-null</a:t>
+            </a:r>
+          </a:p>
+          <a:p>
+            <a:pPr lvl="2"/>
+            <a:r>
+              <a:rPr lang="en-US" sz="1800" dirty="0" smtClean="0"/>
+              <a:t>Further associations, attributes, or groups as child query components</a:t>
+            </a:r>
           </a:p>
         </p:txBody>
       </p:sp>
@@ -4543,6 +4770,132 @@
 </file>
 
 <file path=ppt/slides/slide15.xml><?xml version="1.0" encoding="utf-8"?>
+<p:sld xmlns:a="http://schemas.openxmlformats.org/drawingml/2006/main" xmlns:r="http://schemas.openxmlformats.org/officeDocument/2006/relationships" xmlns:p="http://schemas.openxmlformats.org/presentationml/2006/main">
+  <p:cSld>
+    <p:spTree>
+      <p:nvGrpSpPr>
+        <p:cNvPr id="1" name=""/>
+        <p:cNvGrpSpPr/>
+        <p:nvPr/>
+      </p:nvGrpSpPr>
+      <p:grpSpPr>
+        <a:xfrm>
+          <a:off x="0" y="0"/>
+          <a:ext cx="0" cy="0"/>
+          <a:chOff x="0" y="0"/>
+          <a:chExt cx="0" cy="0"/>
+        </a:xfrm>
+      </p:grpSpPr>
+      <p:sp>
+        <p:nvSpPr>
+          <p:cNvPr id="2" name="Title 1"/>
+          <p:cNvSpPr>
+            <a:spLocks noGrp="1"/>
+          </p:cNvSpPr>
+          <p:nvPr>
+            <p:ph type="title"/>
+          </p:nvPr>
+        </p:nvSpPr>
+        <p:spPr/>
+        <p:txBody>
+          <a:bodyPr/>
+          <a:lstStyle/>
+          <a:p>
+            <a:r>
+              <a:rPr lang="en-US" dirty="0" smtClean="0"/>
+              <a:t>Parts of a CQL Query</a:t>
+            </a:r>
+            <a:endParaRPr lang="en-US" dirty="0"/>
+          </a:p>
+        </p:txBody>
+      </p:sp>
+      <p:sp>
+        <p:nvSpPr>
+          <p:cNvPr id="3" name="Content Placeholder 2"/>
+          <p:cNvSpPr>
+            <a:spLocks noGrp="1"/>
+          </p:cNvSpPr>
+          <p:nvPr>
+            <p:ph idx="1"/>
+          </p:nvPr>
+        </p:nvSpPr>
+        <p:spPr/>
+        <p:txBody>
+          <a:bodyPr/>
+          <a:lstStyle/>
+          <a:p>
+            <a:r>
+              <a:rPr lang="en-US" sz="2000" dirty="0" smtClean="0"/>
+              <a:t>Attribute</a:t>
+            </a:r>
+          </a:p>
+          <a:p>
+            <a:pPr lvl="1"/>
+            <a:r>
+              <a:rPr lang="en-US" sz="2000" dirty="0" smtClean="0"/>
+              <a:t>Object property used as search criteria</a:t>
+            </a:r>
+          </a:p>
+          <a:p>
+            <a:pPr lvl="1"/>
+            <a:r>
+              <a:rPr lang="en-US" sz="2000" dirty="0" smtClean="0"/>
+              <a:t>Defined in terms of attribute name, predicate, and value</a:t>
+            </a:r>
+          </a:p>
+          <a:p>
+            <a:pPr lvl="1"/>
+            <a:r>
+              <a:rPr lang="en-US" sz="2000" dirty="0" smtClean="0"/>
+              <a:t>Predicates are similar to SQL</a:t>
+            </a:r>
+          </a:p>
+          <a:p>
+            <a:pPr lvl="2"/>
+            <a:r>
+              <a:rPr lang="en-US" sz="1800" dirty="0" smtClean="0"/>
+              <a:t>Equals, Not Equals, Like, Less Than, Greater Than, Less or Equal, Greater or Equal, Null, and Not Null</a:t>
+            </a:r>
+          </a:p>
+          <a:p>
+            <a:r>
+              <a:rPr lang="en-US" sz="2000" dirty="0" smtClean="0"/>
+              <a:t>Group</a:t>
+            </a:r>
+          </a:p>
+          <a:p>
+            <a:pPr lvl="1"/>
+            <a:r>
+              <a:rPr lang="en-US" sz="2000" dirty="0" smtClean="0"/>
+              <a:t>A logical join of child search criteria</a:t>
+            </a:r>
+          </a:p>
+          <a:p>
+            <a:pPr lvl="2"/>
+            <a:r>
+              <a:rPr lang="en-US" sz="1800" dirty="0" smtClean="0"/>
+              <a:t>Logical operators AND / OR</a:t>
+            </a:r>
+          </a:p>
+          <a:p>
+            <a:pPr lvl="1"/>
+            <a:r>
+              <a:rPr lang="en-US" sz="2000" dirty="0" smtClean="0"/>
+              <a:t>May have one or more Attributes, Associations, or additional Groups in combination</a:t>
+            </a:r>
+            <a:endParaRPr lang="en-US" sz="2000" dirty="0"/>
+          </a:p>
+        </p:txBody>
+      </p:sp>
+    </p:spTree>
+  </p:cSld>
+  <p:clrMapOvr>
+    <a:masterClrMapping/>
+  </p:clrMapOvr>
+</p:sld>
+</file>
+
+<file path=ppt/slides/slide16.xml><?xml version="1.0" encoding="utf-8"?>
 <p:sld xmlns:a="http://schemas.openxmlformats.org/drawingml/2006/main" xmlns:r="http://schemas.openxmlformats.org/officeDocument/2006/relationships" xmlns:p="http://schemas.openxmlformats.org/presentationml/2006/main">
   <p:cSld>
     <p:spTree>
@@ -5004,7 +5357,7 @@
 </p:sld>
 </file>
 
-<file path=ppt/slides/slide16.xml><?xml version="1.0" encoding="utf-8"?>
+<file path=ppt/slides/slide17.xml><?xml version="1.0" encoding="utf-8"?>
 <p:sld xmlns:a="http://schemas.openxmlformats.org/drawingml/2006/main" xmlns:r="http://schemas.openxmlformats.org/officeDocument/2006/relationships" xmlns:p="http://schemas.openxmlformats.org/presentationml/2006/main">
   <p:cSld>
     <p:spTree>
@@ -5625,7 +5978,7 @@
 </p:sld>
 </file>
 
-<file path=ppt/slides/slide17.xml><?xml version="1.0" encoding="utf-8"?>
+<file path=ppt/slides/slide18.xml><?xml version="1.0" encoding="utf-8"?>
 <p:sld xmlns:a="http://schemas.openxmlformats.org/drawingml/2006/main" xmlns:r="http://schemas.openxmlformats.org/officeDocument/2006/relationships" xmlns:p="http://schemas.openxmlformats.org/presentationml/2006/main">
   <p:cSld>
     <p:spTree>
@@ -6437,7 +6790,7 @@
 </p:sld>
 </file>
 
-<file path=ppt/slides/slide18.xml><?xml version="1.0" encoding="utf-8"?>
+<file path=ppt/slides/slide19.xml><?xml version="1.0" encoding="utf-8"?>
 <p:sld xmlns:a="http://schemas.openxmlformats.org/drawingml/2006/main" xmlns:r="http://schemas.openxmlformats.org/officeDocument/2006/relationships" xmlns:p="http://schemas.openxmlformats.org/presentationml/2006/main">
   <p:cSld>
     <p:spTree>
@@ -7385,429 +7738,6 @@
 </p:sld>
 </file>
 
-<file path=ppt/slides/slide19.xml><?xml version="1.0" encoding="utf-8"?>
-<p:sld xmlns:a="http://schemas.openxmlformats.org/drawingml/2006/main" xmlns:r="http://schemas.openxmlformats.org/officeDocument/2006/relationships" xmlns:p="http://schemas.openxmlformats.org/presentationml/2006/main">
-  <p:cSld>
-    <p:spTree>
-      <p:nvGrpSpPr>
-        <p:cNvPr id="1" name=""/>
-        <p:cNvGrpSpPr/>
-        <p:nvPr/>
-      </p:nvGrpSpPr>
-      <p:grpSpPr>
-        <a:xfrm>
-          <a:off x="0" y="0"/>
-          <a:ext cx="0" cy="0"/>
-          <a:chOff x="0" y="0"/>
-          <a:chExt cx="0" cy="0"/>
-        </a:xfrm>
-      </p:grpSpPr>
-      <p:sp>
-        <p:nvSpPr>
-          <p:cNvPr id="2" name="Title 1"/>
-          <p:cNvSpPr>
-            <a:spLocks noGrp="1"/>
-          </p:cNvSpPr>
-          <p:nvPr>
-            <p:ph type="title"/>
-          </p:nvPr>
-        </p:nvSpPr>
-        <p:spPr/>
-        <p:txBody>
-          <a:bodyPr/>
-          <a:lstStyle/>
-          <a:p>
-            <a:r>
-              <a:rPr lang="en-US" dirty="0" smtClean="0"/>
-              <a:t>CQL Query Results</a:t>
-            </a:r>
-            <a:endParaRPr lang="en-US" dirty="0"/>
-          </a:p>
-        </p:txBody>
-      </p:sp>
-      <p:sp>
-        <p:nvSpPr>
-          <p:cNvPr id="4" name="Content Placeholder 2"/>
-          <p:cNvSpPr txBox="1">
-            <a:spLocks/>
-          </p:cNvSpPr>
-          <p:nvPr/>
-        </p:nvSpPr>
-        <p:spPr bwMode="auto">
-          <a:xfrm>
-            <a:off x="304800" y="1371600"/>
-            <a:ext cx="8458200" cy="4953000"/>
-          </a:xfrm>
-          <a:prstGeom prst="rect">
-            <a:avLst/>
-          </a:prstGeom>
-          <a:noFill/>
-          <a:ln w="9525">
-            <a:noFill/>
-            <a:miter lim="800000"/>
-            <a:headEnd/>
-            <a:tailEnd/>
-          </a:ln>
-          <a:effectLst/>
-        </p:spPr>
-        <p:txBody>
-          <a:bodyPr vert="horz" wrap="square" lIns="91440" tIns="45720" rIns="91440" bIns="45720" numCol="1" anchor="t" anchorCtr="0" compatLnSpc="1">
-            <a:prstTxWarp prst="textNoShape">
-              <a:avLst/>
-            </a:prstTxWarp>
-          </a:bodyPr>
-          <a:lstStyle/>
-          <a:p>
-            <a:pPr marL="342900" marR="0" lvl="0" indent="-342900" algn="l" defTabSz="914400" rtl="0" eaLnBrk="1" fontAlgn="base" latinLnBrk="0" hangingPunct="1">
-              <a:lnSpc>
-                <a:spcPct val="100000"/>
-              </a:lnSpc>
-              <a:spcBef>
-                <a:spcPct val="20000"/>
-              </a:spcBef>
-              <a:spcAft>
-                <a:spcPct val="0"/>
-              </a:spcAft>
-              <a:buClr>
-                <a:srgbClr val="00AAF6"/>
-              </a:buClr>
-              <a:buSzTx/>
-              <a:buFontTx/>
-              <a:buChar char="•"/>
-              <a:tabLst/>
-              <a:defRPr/>
-            </a:pPr>
-            <a:r>
-              <a:rPr lang="en-US" sz="2000" b="1" kern="0" dirty="0" smtClean="0">
-                <a:latin typeface="+mn-lt"/>
-              </a:rPr>
-              <a:t>Multiple Result Types</a:t>
-            </a:r>
-          </a:p>
-          <a:p>
-            <a:pPr marL="800100" lvl="1" indent="-342900">
-              <a:spcBef>
-                <a:spcPct val="20000"/>
-              </a:spcBef>
-              <a:buClr>
-                <a:srgbClr val="00AAF6"/>
-              </a:buClr>
-              <a:buFontTx/>
-              <a:buChar char="•"/>
-              <a:defRPr/>
-            </a:pPr>
-            <a:r>
-              <a:rPr kumimoji="0" lang="en-US" sz="2000" i="0" u="none" strike="noStrike" kern="0" cap="none" spc="0" normalizeH="0" baseline="0" noProof="0" dirty="0" smtClean="0">
-                <a:ln>
-                  <a:noFill/>
-                </a:ln>
-                <a:solidFill>
-                  <a:schemeClr val="tx1"/>
-                </a:solidFill>
-                <a:effectLst/>
-                <a:uLnTx/>
-                <a:uFillTx/>
-                <a:latin typeface="+mn-lt"/>
-              </a:rPr>
-              <a:t>Object</a:t>
-            </a:r>
-            <a:r>
-              <a:rPr kumimoji="0" lang="en-US" sz="2000" i="0" u="none" strike="noStrike" kern="0" cap="none" spc="0" normalizeH="0" noProof="0" dirty="0" smtClean="0">
-                <a:ln>
-                  <a:noFill/>
-                </a:ln>
-                <a:solidFill>
-                  <a:schemeClr val="tx1"/>
-                </a:solidFill>
-                <a:effectLst/>
-                <a:uLnTx/>
-                <a:uFillTx/>
-                <a:latin typeface="+mn-lt"/>
-              </a:rPr>
-              <a:t> results encapsulate complete data types / classes</a:t>
-            </a:r>
-          </a:p>
-          <a:p>
-            <a:pPr marL="800100" lvl="1" indent="-342900">
-              <a:spcBef>
-                <a:spcPct val="20000"/>
-              </a:spcBef>
-              <a:buClr>
-                <a:srgbClr val="00AAF6"/>
-              </a:buClr>
-              <a:buFontTx/>
-              <a:buChar char="•"/>
-              <a:defRPr/>
-            </a:pPr>
-            <a:r>
-              <a:rPr lang="en-US" sz="2000" kern="0" baseline="0" dirty="0" smtClean="0">
-                <a:latin typeface="+mn-lt"/>
-              </a:rPr>
-              <a:t>Attribute</a:t>
-            </a:r>
-            <a:r>
-              <a:rPr lang="en-US" sz="2000" kern="0" dirty="0" smtClean="0">
-                <a:latin typeface="+mn-lt"/>
-              </a:rPr>
-              <a:t> results contain key-value pairs grouped by the individual object instances from which they are derived</a:t>
-            </a:r>
-          </a:p>
-          <a:p>
-            <a:pPr marL="800100" lvl="1" indent="-342900">
-              <a:spcBef>
-                <a:spcPct val="20000"/>
-              </a:spcBef>
-              <a:buClr>
-                <a:srgbClr val="00AAF6"/>
-              </a:buClr>
-              <a:buFontTx/>
-              <a:buChar char="•"/>
-              <a:defRPr/>
-            </a:pPr>
-            <a:r>
-              <a:rPr kumimoji="0" lang="en-US" sz="2000" i="0" u="none" strike="noStrike" kern="0" cap="none" spc="0" normalizeH="0" baseline="0" noProof="0" dirty="0" smtClean="0">
-                <a:ln>
-                  <a:noFill/>
-                </a:ln>
-                <a:solidFill>
-                  <a:schemeClr val="tx1"/>
-                </a:solidFill>
-                <a:effectLst/>
-                <a:uLnTx/>
-                <a:uFillTx/>
-                <a:latin typeface="+mn-lt"/>
-              </a:rPr>
-              <a:t>Count</a:t>
-            </a:r>
-            <a:r>
-              <a:rPr kumimoji="0" lang="en-US" sz="2000" i="0" u="none" strike="noStrike" kern="0" cap="none" spc="0" normalizeH="0" noProof="0" dirty="0" smtClean="0">
-                <a:ln>
-                  <a:noFill/>
-                </a:ln>
-                <a:solidFill>
-                  <a:schemeClr val="tx1"/>
-                </a:solidFill>
-                <a:effectLst/>
-                <a:uLnTx/>
-                <a:uFillTx/>
-                <a:latin typeface="+mn-lt"/>
-              </a:rPr>
-              <a:t> results contain a single long value indicating the count of object instances which satisfy the search criteria</a:t>
-            </a:r>
-          </a:p>
-          <a:p>
-            <a:pPr marL="342900" indent="-342900">
-              <a:spcBef>
-                <a:spcPct val="20000"/>
-              </a:spcBef>
-              <a:buClr>
-                <a:srgbClr val="00AAF6"/>
-              </a:buClr>
-              <a:buFontTx/>
-              <a:buChar char="•"/>
-              <a:defRPr/>
-            </a:pPr>
-            <a:r>
-              <a:rPr lang="en-US" sz="2000" b="1" kern="0" baseline="0" dirty="0" smtClean="0">
-                <a:latin typeface="+mn-lt"/>
-              </a:rPr>
-              <a:t>Allowable</a:t>
-            </a:r>
-            <a:r>
-              <a:rPr lang="en-US" sz="2000" b="1" kern="0" dirty="0" smtClean="0">
-                <a:latin typeface="+mn-lt"/>
-              </a:rPr>
-              <a:t> Types</a:t>
-            </a:r>
-          </a:p>
-          <a:p>
-            <a:pPr marL="800100" lvl="1" indent="-342900">
-              <a:spcBef>
-                <a:spcPct val="20000"/>
-              </a:spcBef>
-              <a:buClr>
-                <a:srgbClr val="00AAF6"/>
-              </a:buClr>
-              <a:buFontTx/>
-              <a:buChar char="•"/>
-              <a:defRPr/>
-            </a:pPr>
-            <a:r>
-              <a:rPr kumimoji="0" lang="en-US" sz="2000" i="0" u="none" strike="noStrike" kern="0" cap="none" spc="0" normalizeH="0" baseline="0" noProof="0" dirty="0" smtClean="0">
-                <a:ln>
-                  <a:noFill/>
-                </a:ln>
-                <a:solidFill>
-                  <a:schemeClr val="tx1"/>
-                </a:solidFill>
-                <a:effectLst/>
-                <a:uLnTx/>
-                <a:uFillTx/>
-                <a:latin typeface="+mn-lt"/>
-              </a:rPr>
-              <a:t>Data</a:t>
-            </a:r>
-            <a:r>
-              <a:rPr kumimoji="0" lang="en-US" sz="2000" i="0" u="none" strike="noStrike" kern="0" cap="none" spc="0" normalizeH="0" noProof="0" dirty="0" smtClean="0">
-                <a:ln>
-                  <a:noFill/>
-                </a:ln>
-                <a:solidFill>
-                  <a:schemeClr val="tx1"/>
-                </a:solidFill>
-                <a:effectLst/>
-                <a:uLnTx/>
-                <a:uFillTx/>
-                <a:latin typeface="+mn-lt"/>
-              </a:rPr>
-              <a:t> services infrastructure generates a custom “</a:t>
-            </a:r>
-            <a:r>
-              <a:rPr kumimoji="0" lang="en-US" sz="2000" i="0" u="none" strike="noStrike" kern="0" cap="none" spc="0" normalizeH="0" noProof="0" dirty="0" err="1" smtClean="0">
-                <a:ln>
-                  <a:noFill/>
-                </a:ln>
-                <a:solidFill>
-                  <a:schemeClr val="tx1"/>
-                </a:solidFill>
-                <a:effectLst/>
-                <a:uLnTx/>
-                <a:uFillTx/>
-                <a:latin typeface="+mn-lt"/>
-              </a:rPr>
-              <a:t>CQLResultTypes</a:t>
-            </a:r>
-            <a:r>
-              <a:rPr kumimoji="0" lang="en-US" sz="2000" i="0" u="none" strike="noStrike" kern="0" cap="none" spc="0" normalizeH="0" noProof="0" dirty="0" smtClean="0">
-                <a:ln>
-                  <a:noFill/>
-                </a:ln>
-                <a:solidFill>
-                  <a:schemeClr val="tx1"/>
-                </a:solidFill>
-                <a:effectLst/>
-                <a:uLnTx/>
-                <a:uFillTx/>
-                <a:latin typeface="+mn-lt"/>
-              </a:rPr>
-              <a:t>” schema</a:t>
-            </a:r>
-          </a:p>
-          <a:p>
-            <a:pPr marL="1257300" lvl="2" indent="-342900">
-              <a:spcBef>
-                <a:spcPct val="20000"/>
-              </a:spcBef>
-              <a:buClr>
-                <a:srgbClr val="00AAF6"/>
-              </a:buClr>
-              <a:buFontTx/>
-              <a:buChar char="•"/>
-              <a:defRPr/>
-            </a:pPr>
-            <a:r>
-              <a:rPr lang="en-US" sz="2000" kern="0" baseline="0" dirty="0" smtClean="0">
-                <a:latin typeface="+mn-lt"/>
-              </a:rPr>
-              <a:t>Contains an </a:t>
-            </a:r>
-            <a:r>
-              <a:rPr lang="en-US" sz="2000" kern="0" baseline="0" dirty="0" err="1" smtClean="0">
-                <a:latin typeface="+mn-lt"/>
-              </a:rPr>
-              <a:t>xsd:choice</a:t>
-            </a:r>
-            <a:r>
-              <a:rPr lang="en-US" sz="2000" kern="0" dirty="0" smtClean="0">
-                <a:latin typeface="+mn-lt"/>
-              </a:rPr>
-              <a:t> of all allowable return types for CQL object results</a:t>
-            </a:r>
-          </a:p>
-          <a:p>
-            <a:pPr marL="1257300" lvl="2" indent="-342900">
-              <a:spcBef>
-                <a:spcPct val="20000"/>
-              </a:spcBef>
-              <a:buClr>
-                <a:srgbClr val="00AAF6"/>
-              </a:buClr>
-              <a:buFontTx/>
-              <a:buChar char="•"/>
-              <a:defRPr/>
-            </a:pPr>
-            <a:r>
-              <a:rPr lang="en-US" sz="2000" kern="0" dirty="0" smtClean="0">
-                <a:latin typeface="+mn-lt"/>
-              </a:rPr>
-              <a:t>Imported into and available to clients via the data service WSDL</a:t>
-            </a:r>
-          </a:p>
-          <a:p>
-            <a:pPr marL="800100" lvl="1" indent="-342900">
-              <a:spcBef>
-                <a:spcPct val="20000"/>
-              </a:spcBef>
-              <a:buClr>
-                <a:srgbClr val="00AAF6"/>
-              </a:buClr>
-              <a:buFontTx/>
-              <a:buChar char="•"/>
-              <a:defRPr/>
-            </a:pPr>
-            <a:r>
-              <a:rPr kumimoji="0" lang="en-US" sz="2000" i="0" u="none" strike="noStrike" kern="0" cap="none" spc="0" normalizeH="0" baseline="0" noProof="0" dirty="0" smtClean="0">
-                <a:ln>
-                  <a:noFill/>
-                </a:ln>
-                <a:solidFill>
-                  <a:schemeClr val="tx1"/>
-                </a:solidFill>
-                <a:effectLst/>
-                <a:uLnTx/>
-                <a:uFillTx/>
-                <a:latin typeface="+mn-lt"/>
-              </a:rPr>
-              <a:t>Clients</a:t>
-            </a:r>
-            <a:r>
-              <a:rPr kumimoji="0" lang="en-US" sz="2000" i="0" u="none" strike="noStrike" kern="0" cap="none" spc="0" normalizeH="0" noProof="0" dirty="0" smtClean="0">
-                <a:ln>
-                  <a:noFill/>
-                </a:ln>
-                <a:solidFill>
-                  <a:schemeClr val="tx1"/>
-                </a:solidFill>
-                <a:effectLst/>
-                <a:uLnTx/>
-                <a:uFillTx/>
-                <a:latin typeface="+mn-lt"/>
-              </a:rPr>
-              <a:t> know what types to expect and handle</a:t>
-            </a:r>
-            <a:endParaRPr kumimoji="0" lang="en-US" sz="2000" i="0" u="none" strike="noStrike" kern="0" cap="none" spc="0" normalizeH="0" baseline="0" noProof="0" dirty="0">
-              <a:ln>
-                <a:noFill/>
-              </a:ln>
-              <a:solidFill>
-                <a:schemeClr val="tx1"/>
-              </a:solidFill>
-              <a:effectLst/>
-              <a:uLnTx/>
-              <a:uFillTx/>
-              <a:latin typeface="+mn-lt"/>
-            </a:endParaRPr>
-          </a:p>
-        </p:txBody>
-      </p:sp>
-    </p:spTree>
-  </p:cSld>
-  <p:clrMapOvr>
-    <a:masterClrMapping/>
-  </p:clrMapOvr>
-</p:sld>
-</file>
-
 <file path=ppt/slides/slide2.xml><?xml version="1.0" encoding="utf-8"?>
 <p:sld xmlns:a="http://schemas.openxmlformats.org/drawingml/2006/main" xmlns:r="http://schemas.openxmlformats.org/officeDocument/2006/relationships" xmlns:p="http://schemas.openxmlformats.org/presentationml/2006/main">
   <p:cSld>
@@ -7977,7 +7907,7 @@
           <a:p>
             <a:r>
               <a:rPr lang="en-US" dirty="0" smtClean="0"/>
-              <a:t>Handling CQL Results</a:t>
+              <a:t>CQL Query Results</a:t>
             </a:r>
             <a:endParaRPr lang="en-US" dirty="0"/>
           </a:p>
@@ -8036,14 +7966,11 @@
               <a:defRPr/>
             </a:pPr>
             <a:r>
-              <a:rPr lang="en-US" sz="2000" b="1" kern="0" dirty="0" err="1" smtClean="0">
+              <a:rPr lang="en-US" sz="2000" b="1" kern="0" dirty="0" smtClean="0">
                 <a:latin typeface="+mn-lt"/>
               </a:rPr>
-              <a:t>CQLQueryResultsIterator</a:t>
-            </a:r>
-            <a:endParaRPr lang="en-US" sz="2000" b="1" kern="0" dirty="0" smtClean="0">
-              <a:latin typeface="+mn-lt"/>
-            </a:endParaRPr>
+              <a:t>Multiple Result Types</a:t>
+            </a:r>
           </a:p>
           <a:p>
             <a:pPr marL="800100" lvl="1" indent="-342900">
@@ -8058,20 +7985,35 @@
               <a:defRPr/>
             </a:pPr>
             <a:r>
-              <a:rPr lang="en-US" sz="2000" kern="0" dirty="0" smtClean="0">
+              <a:rPr kumimoji="0" lang="en-US" sz="2000" i="0" u="none" strike="noStrike" kern="0" cap="none" spc="0" normalizeH="0" baseline="0" noProof="0" dirty="0" smtClean="0">
+                <a:ln>
+                  <a:noFill/>
+                </a:ln>
+                <a:solidFill>
+                  <a:schemeClr val="tx1"/>
+                </a:solidFill>
+                <a:effectLst/>
+                <a:uLnTx/>
+                <a:uFillTx/>
                 <a:latin typeface="+mn-lt"/>
               </a:rPr>
-              <a:t>Implements </a:t>
-            </a:r>
-            <a:r>
-              <a:rPr lang="en-US" sz="2000" kern="0" dirty="0" err="1" smtClean="0">
+              <a:t>Object</a:t>
+            </a:r>
+            <a:r>
+              <a:rPr kumimoji="0" lang="en-US" sz="2000" i="0" u="none" strike="noStrike" kern="0" cap="none" spc="0" normalizeH="0" noProof="0" dirty="0" smtClean="0">
+                <a:ln>
+                  <a:noFill/>
+                </a:ln>
+                <a:solidFill>
+                  <a:schemeClr val="tx1"/>
+                </a:solidFill>
+                <a:effectLst/>
+                <a:uLnTx/>
+                <a:uFillTx/>
                 <a:latin typeface="+mn-lt"/>
               </a:rPr>
-              <a:t>java.util.Iterator</a:t>
-            </a:r>
-            <a:endParaRPr lang="en-US" sz="2000" kern="0" dirty="0" smtClean="0">
-              <a:latin typeface="+mn-lt"/>
-            </a:endParaRPr>
+              <a:t> results encapsulate complete data types / classes</a:t>
+            </a:r>
           </a:p>
           <a:p>
             <a:pPr marL="800100" lvl="1" indent="-342900">
@@ -8086,26 +8028,17 @@
               <a:defRPr/>
             </a:pPr>
             <a:r>
+              <a:rPr lang="en-US" sz="2000" kern="0" baseline="0" dirty="0" smtClean="0">
+                <a:latin typeface="+mn-lt"/>
+              </a:rPr>
+              <a:t>Attribute</a:t>
+            </a:r>
+            <a:r>
               <a:rPr lang="en-US" sz="2000" kern="0" dirty="0" smtClean="0">
                 <a:latin typeface="+mn-lt"/>
               </a:rPr>
-              <a:t>next() can return </a:t>
-            </a:r>
-            <a:r>
-              <a:rPr lang="en-US" sz="2000" kern="0" dirty="0" err="1" smtClean="0">
-                <a:latin typeface="+mn-lt"/>
-              </a:rPr>
-              <a:t>deserialized</a:t>
-            </a:r>
-            <a:r>
-              <a:rPr lang="en-US" sz="2000" kern="0" dirty="0" smtClean="0">
-                <a:latin typeface="+mn-lt"/>
-              </a:rPr>
-              <a:t> objects or XML text</a:t>
-            </a:r>
-            <a:endParaRPr lang="en-US" sz="2000" kern="0" dirty="0" smtClean="0">
-              <a:latin typeface="+mn-lt"/>
-            </a:endParaRPr>
+              <a:t> results contain key-value pairs grouped by the individual object instances from which they are derived</a:t>
+            </a:r>
           </a:p>
           <a:p>
             <a:pPr marL="800100" lvl="1" indent="-342900">
@@ -8120,22 +8053,132 @@
               <a:defRPr/>
             </a:pPr>
             <a:r>
-              <a:rPr lang="en-US" sz="2000" kern="0" dirty="0" smtClean="0">
+              <a:rPr kumimoji="0" lang="en-US" sz="2000" i="0" u="none" strike="noStrike" kern="0" cap="none" spc="0" normalizeH="0" baseline="0" noProof="0" dirty="0" smtClean="0">
+                <a:ln>
+                  <a:noFill/>
+                </a:ln>
+                <a:solidFill>
+                  <a:schemeClr val="tx1"/>
+                </a:solidFill>
+                <a:effectLst/>
+                <a:uLnTx/>
+                <a:uFillTx/>
                 <a:latin typeface="+mn-lt"/>
               </a:rPr>
-              <a:t>Configured by client-</a:t>
-            </a:r>
-            <a:r>
-              <a:rPr lang="en-US" sz="2000" kern="0" dirty="0" err="1" smtClean="0">
+              <a:t>Count</a:t>
+            </a:r>
+            <a:r>
+              <a:rPr kumimoji="0" lang="en-US" sz="2000" i="0" u="none" strike="noStrike" kern="0" cap="none" spc="0" normalizeH="0" noProof="0" dirty="0" smtClean="0">
+                <a:ln>
+                  <a:noFill/>
+                </a:ln>
+                <a:solidFill>
+                  <a:schemeClr val="tx1"/>
+                </a:solidFill>
+                <a:effectLst/>
+                <a:uLnTx/>
+                <a:uFillTx/>
                 <a:latin typeface="+mn-lt"/>
               </a:rPr>
-              <a:t>config.wsdd</a:t>
-            </a:r>
-            <a:r>
-              <a:rPr lang="en-US" sz="2000" kern="0" dirty="0" smtClean="0">
+              <a:t> results contain a single long value indicating the count of object instances which satisfy the search criteria</a:t>
+            </a:r>
+          </a:p>
+          <a:p>
+            <a:pPr marL="342900" indent="-342900">
+              <a:spcBef>
+                <a:spcPct val="20000"/>
+              </a:spcBef>
+              <a:buClr>
+                <a:srgbClr val="00AAF6"/>
+              </a:buClr>
+              <a:buFontTx/>
+              <a:buChar char="•"/>
+              <a:defRPr/>
+            </a:pPr>
+            <a:r>
+              <a:rPr lang="en-US" sz="2000" b="1" kern="0" baseline="0" dirty="0" smtClean="0">
                 <a:latin typeface="+mn-lt"/>
               </a:rPr>
-              <a:t> document at construction</a:t>
+              <a:t>Allowable</a:t>
+            </a:r>
+            <a:r>
+              <a:rPr lang="en-US" sz="2000" b="1" kern="0" dirty="0" smtClean="0">
+                <a:latin typeface="+mn-lt"/>
+              </a:rPr>
+              <a:t> Types</a:t>
+            </a:r>
+          </a:p>
+          <a:p>
+            <a:pPr marL="800100" lvl="1" indent="-342900">
+              <a:spcBef>
+                <a:spcPct val="20000"/>
+              </a:spcBef>
+              <a:buClr>
+                <a:srgbClr val="00AAF6"/>
+              </a:buClr>
+              <a:buFontTx/>
+              <a:buChar char="•"/>
+              <a:defRPr/>
+            </a:pPr>
+            <a:r>
+              <a:rPr kumimoji="0" lang="en-US" sz="2000" i="0" u="none" strike="noStrike" kern="0" cap="none" spc="0" normalizeH="0" baseline="0" noProof="0" dirty="0" smtClean="0">
+                <a:ln>
+                  <a:noFill/>
+                </a:ln>
+                <a:solidFill>
+                  <a:schemeClr val="tx1"/>
+                </a:solidFill>
+                <a:effectLst/>
+                <a:uLnTx/>
+                <a:uFillTx/>
+                <a:latin typeface="+mn-lt"/>
+              </a:rPr>
+              <a:t>Data</a:t>
+            </a:r>
+            <a:r>
+              <a:rPr kumimoji="0" lang="en-US" sz="2000" i="0" u="none" strike="noStrike" kern="0" cap="none" spc="0" normalizeH="0" noProof="0" dirty="0" smtClean="0">
+                <a:ln>
+                  <a:noFill/>
+                </a:ln>
+                <a:solidFill>
+                  <a:schemeClr val="tx1"/>
+                </a:solidFill>
+                <a:effectLst/>
+                <a:uLnTx/>
+                <a:uFillTx/>
+                <a:latin typeface="+mn-lt"/>
+              </a:rPr>
+              <a:t> services infrastructure generates a custom “</a:t>
+            </a:r>
+            <a:r>
+              <a:rPr kumimoji="0" lang="en-US" sz="2000" i="0" u="none" strike="noStrike" kern="0" cap="none" spc="0" normalizeH="0" noProof="0" dirty="0" err="1" smtClean="0">
+                <a:ln>
+                  <a:noFill/>
+                </a:ln>
+                <a:solidFill>
+                  <a:schemeClr val="tx1"/>
+                </a:solidFill>
+                <a:effectLst/>
+                <a:uLnTx/>
+                <a:uFillTx/>
+                <a:latin typeface="+mn-lt"/>
+              </a:rPr>
+              <a:t>CQLResultTypes</a:t>
+            </a:r>
+            <a:r>
+              <a:rPr kumimoji="0" lang="en-US" sz="2000" i="0" u="none" strike="noStrike" kern="0" cap="none" spc="0" normalizeH="0" noProof="0" dirty="0" smtClean="0">
+                <a:ln>
+                  <a:noFill/>
+                </a:ln>
+                <a:solidFill>
+                  <a:schemeClr val="tx1"/>
+                </a:solidFill>
+                <a:effectLst/>
+                <a:uLnTx/>
+                <a:uFillTx/>
+                <a:latin typeface="+mn-lt"/>
+              </a:rPr>
+              <a:t>” schema</a:t>
             </a:r>
           </a:p>
           <a:p>
@@ -8151,14 +8194,26 @@
               <a:defRPr/>
             </a:pPr>
             <a:r>
-              <a:rPr lang="en-US" kern="0" dirty="0" smtClean="0">
+              <a:rPr lang="en-US" sz="2000" kern="0" baseline="0" dirty="0" smtClean="0">
                 <a:latin typeface="+mn-lt"/>
               </a:rPr>
-              <a:t>Optional – needed for custom deserialization</a:t>
-            </a:r>
-          </a:p>
-          <a:p>
-            <a:pPr marL="342900" indent="-342900">
+              <a:t>Contains an </a:t>
+            </a:r>
+            <a:r>
+              <a:rPr lang="en-US" sz="2000" kern="0" baseline="0" dirty="0" err="1" smtClean="0">
+                <a:latin typeface="+mn-lt"/>
+              </a:rPr>
+              <a:t>xsd:choice</a:t>
+            </a:r>
+            <a:r>
+              <a:rPr lang="en-US" sz="2000" kern="0" dirty="0" smtClean="0">
+                <a:latin typeface="+mn-lt"/>
+              </a:rPr>
+              <a:t> of all allowable return types for CQL object results</a:t>
+            </a:r>
+          </a:p>
+          <a:p>
+            <a:pPr marL="1257300" lvl="2" indent="-342900">
               <a:spcBef>
                 <a:spcPct val="20000"/>
               </a:spcBef>
@@ -8170,14 +8225,11 @@
               <a:defRPr/>
             </a:pPr>
             <a:r>
-              <a:rPr lang="en-US" sz="2000" b="1" kern="0" dirty="0" err="1" smtClean="0">
+              <a:rPr lang="en-US" sz="2000" kern="0" dirty="0" smtClean="0">
                 <a:latin typeface="+mn-lt"/>
               </a:rPr>
-              <a:t>DataServiceIterator</a:t>
-            </a:r>
-            <a:endParaRPr lang="en-US" sz="2000" b="1" i="1" kern="0" dirty="0" smtClean="0">
-              <a:latin typeface="+mn-lt"/>
-            </a:endParaRPr>
+              <a:t>Imported into and available to clients via the data service WSDL</a:t>
+            </a:r>
           </a:p>
           <a:p>
             <a:pPr marL="800100" lvl="1" indent="-342900">
@@ -8192,70 +8244,47 @@
               <a:defRPr/>
             </a:pPr>
             <a:r>
-              <a:rPr lang="en-US" sz="2000" kern="0" dirty="0" smtClean="0">
+              <a:rPr kumimoji="0" lang="en-US" sz="2000" i="0" u="none" strike="noStrike" kern="0" cap="none" spc="0" normalizeH="0" baseline="0" noProof="0" dirty="0" smtClean="0">
+                <a:ln>
+                  <a:noFill/>
+                </a:ln>
+                <a:solidFill>
+                  <a:schemeClr val="tx1"/>
+                </a:solidFill>
+                <a:effectLst/>
+                <a:uLnTx/>
+                <a:uFillTx/>
                 <a:latin typeface="+mn-lt"/>
               </a:rPr>
-              <a:t>Interface that takes a CQL query and returns an </a:t>
-            </a:r>
-            <a:r>
-              <a:rPr lang="en-US" sz="2000" kern="0" dirty="0" err="1" smtClean="0">
+              <a:t>Clients</a:t>
+            </a:r>
+            <a:r>
+              <a:rPr kumimoji="0" lang="en-US" sz="2000" i="0" u="none" strike="noStrike" kern="0" cap="none" spc="0" normalizeH="0" noProof="0" dirty="0" smtClean="0">
+                <a:ln>
+                  <a:noFill/>
+                </a:ln>
+                <a:solidFill>
+                  <a:schemeClr val="tx1"/>
+                </a:solidFill>
+                <a:effectLst/>
+                <a:uLnTx/>
+                <a:uFillTx/>
                 <a:latin typeface="+mn-lt"/>
               </a:rPr>
-              <a:t>Iterator</a:t>
-            </a:r>
-            <a:endParaRPr lang="en-US" sz="2000" kern="0" dirty="0" smtClean="0">
+              <a:t> know what types to expect and handle</a:t>
+            </a:r>
+            <a:endParaRPr kumimoji="0" lang="en-US" sz="2000" i="0" u="none" strike="noStrike" kern="0" cap="none" spc="0" normalizeH="0" baseline="0" noProof="0" dirty="0">
+              <a:ln>
+                <a:noFill/>
+              </a:ln>
+              <a:solidFill>
+                <a:schemeClr val="tx1"/>
+              </a:solidFill>
+              <a:effectLst/>
+              <a:uLnTx/>
+              <a:uFillTx/>
               <a:latin typeface="+mn-lt"/>
             </a:endParaRPr>
-          </a:p>
-          <a:p>
-            <a:pPr marL="800100" lvl="1" indent="-342900">
-              <a:spcBef>
-                <a:spcPct val="20000"/>
-              </a:spcBef>
-              <a:buClr>
-                <a:srgbClr val="00AAF6"/>
-              </a:buClr>
-              <a:buFontTx/>
-              <a:buChar char="•"/>
-              <a:defRPr/>
-            </a:pPr>
-            <a:r>
-              <a:rPr lang="en-US" sz="2000" kern="0" dirty="0" smtClean="0">
-                <a:latin typeface="+mn-lt"/>
-              </a:rPr>
-              <a:t>Implementations for standard, BDT, and WS-Enumeration</a:t>
-            </a:r>
-          </a:p>
-          <a:p>
-            <a:pPr marL="800100" lvl="1" indent="-342900">
-              <a:spcBef>
-                <a:spcPct val="20000"/>
-              </a:spcBef>
-              <a:buClr>
-                <a:srgbClr val="00AAF6"/>
-              </a:buClr>
-              <a:buFontTx/>
-              <a:buChar char="•"/>
-              <a:defRPr/>
-            </a:pPr>
-            <a:r>
-              <a:rPr lang="en-US" sz="2000" kern="0" dirty="0" smtClean="0">
-                <a:latin typeface="+mn-lt"/>
-              </a:rPr>
-              <a:t>Simplifies creation of an </a:t>
-            </a:r>
-            <a:r>
-              <a:rPr lang="en-US" sz="2000" kern="0" dirty="0" err="1" smtClean="0">
-                <a:latin typeface="+mn-lt"/>
-              </a:rPr>
-              <a:t>Iterator</a:t>
-            </a:r>
-            <a:r>
-              <a:rPr lang="en-US" sz="2000" kern="0" dirty="0" smtClean="0">
-                <a:latin typeface="+mn-lt"/>
-              </a:rPr>
-              <a:t> for every query result</a:t>
-            </a:r>
           </a:p>
         </p:txBody>
       </p:sp>
@@ -8301,7 +8330,7 @@
           <a:p>
             <a:r>
               <a:rPr lang="en-US" dirty="0" smtClean="0"/>
-              <a:t>Federated Queries</a:t>
+              <a:t>Handling CQL Results</a:t>
             </a:r>
             <a:endParaRPr lang="en-US" dirty="0"/>
           </a:p>
@@ -8309,7 +8338,7 @@
       </p:sp>
       <p:sp>
         <p:nvSpPr>
-          <p:cNvPr id="5" name="Content Placeholder 2"/>
+          <p:cNvPr id="4" name="Content Placeholder 2"/>
           <p:cNvSpPr txBox="1">
             <a:spLocks/>
           </p:cNvSpPr>
@@ -8360,11 +8389,14 @@
               <a:defRPr/>
             </a:pPr>
             <a:r>
-              <a:rPr lang="en-US" sz="2000" b="1" kern="0" dirty="0" smtClean="0">
+              <a:rPr lang="en-US" sz="2000" b="1" kern="0" dirty="0" err="1" smtClean="0">
                 <a:latin typeface="+mn-lt"/>
               </a:rPr>
-              <a:t>Multiple Data Services Involved</a:t>
-            </a:r>
+              <a:t>CQLQueryResultsIterator</a:t>
+            </a:r>
+            <a:endParaRPr lang="en-US" sz="2000" b="1" kern="0" dirty="0" smtClean="0">
+              <a:latin typeface="+mn-lt"/>
+            </a:endParaRPr>
           </a:p>
           <a:p>
             <a:pPr marL="800100" lvl="1" indent="-342900">
@@ -8379,14 +8411,18 @@
               <a:defRPr/>
             </a:pPr>
             <a:r>
-              <a:rPr lang="en-US" sz="2000" kern="0" dirty="0" smtClean="0"/>
-              <a:t>Basic distributed joins and </a:t>
-            </a:r>
-            <a:r>
-              <a:rPr lang="en-US" sz="2000" kern="0" dirty="0" smtClean="0"/>
-              <a:t>aggregations</a:t>
-            </a:r>
-            <a:endParaRPr lang="en-US" sz="2000" b="1" kern="0" dirty="0" smtClean="0">
+              <a:rPr lang="en-US" sz="2000" kern="0" dirty="0" smtClean="0">
+                <a:latin typeface="+mn-lt"/>
+              </a:rPr>
+              <a:t>Implements </a:t>
+            </a:r>
+            <a:r>
+              <a:rPr lang="en-US" sz="2000" kern="0" dirty="0" err="1" smtClean="0">
+                <a:latin typeface="+mn-lt"/>
+              </a:rPr>
+              <a:t>java.util.Iterator</a:t>
+            </a:r>
+            <a:endParaRPr lang="en-US" sz="2000" kern="0" dirty="0" smtClean="0">
               <a:latin typeface="+mn-lt"/>
             </a:endParaRPr>
           </a:p>
@@ -8406,7 +8442,53 @@
               <a:rPr lang="en-US" sz="2000" kern="0" dirty="0" smtClean="0">
                 <a:latin typeface="+mn-lt"/>
               </a:rPr>
-              <a:t>All data services use the same language (CQL), so federation using multiple data services is possible</a:t>
+              <a:t>next() can return </a:t>
+            </a:r>
+            <a:r>
+              <a:rPr lang="en-US" sz="2000" kern="0" dirty="0" err="1" smtClean="0">
+                <a:latin typeface="+mn-lt"/>
+              </a:rPr>
+              <a:t>deserialized</a:t>
+            </a:r>
+            <a:r>
+              <a:rPr lang="en-US" sz="2000" kern="0" dirty="0" smtClean="0">
+                <a:latin typeface="+mn-lt"/>
+              </a:rPr>
+              <a:t> objects or XML text</a:t>
+            </a:r>
+            <a:endParaRPr lang="en-US" sz="2000" kern="0" dirty="0" smtClean="0">
+              <a:latin typeface="+mn-lt"/>
+            </a:endParaRPr>
+          </a:p>
+          <a:p>
+            <a:pPr marL="800100" lvl="1" indent="-342900">
+              <a:spcBef>
+                <a:spcPct val="20000"/>
+              </a:spcBef>
+              <a:buClr>
+                <a:srgbClr val="00AAF6"/>
+              </a:buClr>
+              <a:buFontTx/>
+              <a:buChar char="•"/>
+              <a:defRPr/>
+            </a:pPr>
+            <a:r>
+              <a:rPr lang="en-US" sz="2000" kern="0" dirty="0" smtClean="0">
+                <a:latin typeface="+mn-lt"/>
+              </a:rPr>
+              <a:t>Configured by client-</a:t>
+            </a:r>
+            <a:r>
+              <a:rPr lang="en-US" sz="2000" kern="0" dirty="0" err="1" smtClean="0">
+                <a:latin typeface="+mn-lt"/>
+              </a:rPr>
+              <a:t>config.wsdd</a:t>
+            </a:r>
+            <a:r>
+              <a:rPr lang="en-US" sz="2000" kern="0" dirty="0" smtClean="0">
+                <a:latin typeface="+mn-lt"/>
+              </a:rPr>
+              <a:t> document at construction</a:t>
             </a:r>
           </a:p>
           <a:p>
@@ -8422,35 +8504,10 @@
               <a:defRPr/>
             </a:pPr>
             <a:r>
-              <a:rPr lang="en-US" i="1" kern="0" dirty="0" smtClean="0">
-                <a:latin typeface="+mn-lt"/>
-              </a:rPr>
-              <a:t>Any</a:t>
-            </a:r>
-            <a:r>
               <a:rPr lang="en-US" kern="0" dirty="0" smtClean="0">
                 <a:latin typeface="+mn-lt"/>
               </a:rPr>
-              <a:t> combination of data services may be used</a:t>
-            </a:r>
-          </a:p>
-          <a:p>
-            <a:pPr marL="1257300" lvl="2" indent="-342900">
-              <a:spcBef>
-                <a:spcPct val="20000"/>
-              </a:spcBef>
-              <a:buClr>
-                <a:srgbClr val="00AAF6"/>
-              </a:buClr>
-              <a:buFontTx/>
-              <a:buChar char="•"/>
-              <a:defRPr/>
-            </a:pPr>
-            <a:r>
-              <a:rPr lang="en-US" kern="0" dirty="0" smtClean="0">
-                <a:latin typeface="+mn-lt"/>
-              </a:rPr>
-              <a:t>Arbitrary cross-model joins</a:t>
+              <a:t>Optional – needed for custom deserialization</a:t>
             </a:r>
           </a:p>
           <a:p>
@@ -8466,17 +8523,14 @@
               <a:defRPr/>
             </a:pPr>
             <a:r>
-              <a:rPr lang="en-US" sz="2000" b="1" i="1" kern="0" dirty="0" smtClean="0">
+              <a:rPr lang="en-US" sz="2000" b="1" kern="0" dirty="0" err="1" smtClean="0">
                 <a:latin typeface="+mn-lt"/>
               </a:rPr>
-              <a:t>D</a:t>
-            </a:r>
-            <a:r>
-              <a:rPr lang="en-US" sz="2000" b="1" kern="0" dirty="0" smtClean="0">
-                <a:latin typeface="+mn-lt"/>
-              </a:rPr>
-              <a:t>CQL extends from CQL</a:t>
-            </a:r>
+              <a:t>DataServiceIterator</a:t>
+            </a:r>
+            <a:endParaRPr lang="en-US" sz="2000" b="1" i="1" kern="0" dirty="0" smtClean="0">
+              <a:latin typeface="+mn-lt"/>
+            </a:endParaRPr>
           </a:p>
           <a:p>
             <a:pPr marL="800100" lvl="1" indent="-342900">
@@ -8494,8 +8548,17 @@
               <a:rPr lang="en-US" sz="2000" kern="0" dirty="0" smtClean="0">
                 <a:latin typeface="+mn-lt"/>
               </a:rPr>
-              <a:t>Distributed version of CQL</a:t>
-            </a:r>
+              <a:t>Interface that takes a CQL query and returns an </a:t>
+            </a:r>
+            <a:r>
+              <a:rPr lang="en-US" sz="2000" kern="0" dirty="0" err="1" smtClean="0">
+                <a:latin typeface="+mn-lt"/>
+              </a:rPr>
+              <a:t>Iterator</a:t>
+            </a:r>
+            <a:endParaRPr lang="en-US" sz="2000" kern="0" dirty="0" smtClean="0">
+              <a:latin typeface="+mn-lt"/>
+            </a:endParaRPr>
           </a:p>
           <a:p>
             <a:pPr marL="800100" lvl="1" indent="-342900">
@@ -8513,32 +8576,7 @@
               <a:rPr lang="en-US" sz="2000" kern="0" dirty="0" smtClean="0">
                 <a:latin typeface="+mn-lt"/>
               </a:rPr>
-              <a:t>Expresses joins, foreign data services, and target services</a:t>
-            </a:r>
-          </a:p>
-          <a:p>
-            <a:pPr marL="342900" indent="-342900">
-              <a:spcBef>
-                <a:spcPct val="20000"/>
-              </a:spcBef>
-              <a:buClr>
-                <a:srgbClr val="00AAF6"/>
-              </a:buClr>
-              <a:buFontTx/>
-              <a:buChar char="•"/>
-              <a:defRPr/>
-            </a:pPr>
-            <a:r>
-              <a:rPr lang="en-US" sz="2000" b="1" kern="0" dirty="0" err="1" smtClean="0">
-                <a:latin typeface="+mn-lt"/>
-              </a:rPr>
-              <a:t>Stateful</a:t>
-            </a:r>
-            <a:r>
-              <a:rPr lang="en-US" sz="2000" b="1" kern="0" dirty="0" smtClean="0">
-                <a:latin typeface="+mn-lt"/>
-              </a:rPr>
-              <a:t> Grid Service or Local API</a:t>
+              <a:t>Implementations for standard, BDT, and WS-Enumeration</a:t>
             </a:r>
           </a:p>
           <a:p>
@@ -8557,26 +8595,19 @@
               <a:rPr lang="en-US" sz="2000" kern="0" dirty="0" smtClean="0">
                 <a:latin typeface="+mn-lt"/>
               </a:rPr>
-              <a:t>Queries may be issued to an FQP grid service and processed asynchronously for later results retrieval</a:t>
-            </a:r>
-          </a:p>
-          <a:p>
-            <a:pPr marL="800100" lvl="1" indent="-342900">
-              <a:spcBef>
-                <a:spcPct val="20000"/>
-              </a:spcBef>
-              <a:buClr>
-                <a:srgbClr val="00AAF6"/>
-              </a:buClr>
-              <a:buFontTx/>
-              <a:buChar char="•"/>
-              <a:defRPr/>
-            </a:pPr>
+              <a:t>Simplifies creation of an </a:t>
+            </a:r>
+            <a:r>
+              <a:rPr lang="en-US" sz="2000" kern="0" dirty="0" err="1" smtClean="0">
+                <a:latin typeface="+mn-lt"/>
+              </a:rPr>
+              <a:t>Iterator</a:t>
+            </a:r>
             <a:r>
               <a:rPr lang="en-US" sz="2000" kern="0" dirty="0" smtClean="0">
                 <a:latin typeface="+mn-lt"/>
               </a:rPr>
-              <a:t>FQP engine may be used within an application directly</a:t>
+              <a:t> for every query result</a:t>
             </a:r>
           </a:p>
         </p:txBody>
@@ -8623,7 +8654,447 @@
           <a:p>
             <a:r>
               <a:rPr lang="en-US" dirty="0" smtClean="0"/>
-              <a:t>Federated Query Service</a:t>
+              <a:t>Handling CQL Results</a:t>
+            </a:r>
+            <a:endParaRPr lang="en-US" dirty="0"/>
+          </a:p>
+        </p:txBody>
+      </p:sp>
+      <p:sp>
+        <p:nvSpPr>
+          <p:cNvPr id="4" name="Content Placeholder 2"/>
+          <p:cNvSpPr txBox="1">
+            <a:spLocks/>
+          </p:cNvSpPr>
+          <p:nvPr/>
+        </p:nvSpPr>
+        <p:spPr bwMode="auto">
+          <a:xfrm>
+            <a:off x="304800" y="1371600"/>
+            <a:ext cx="8458200" cy="4953000"/>
+          </a:xfrm>
+          <a:prstGeom prst="rect">
+            <a:avLst/>
+          </a:prstGeom>
+          <a:noFill/>
+          <a:ln w="9525">
+            <a:noFill/>
+            <a:miter lim="800000"/>
+            <a:headEnd/>
+            <a:tailEnd/>
+          </a:ln>
+          <a:effectLst/>
+        </p:spPr>
+        <p:txBody>
+          <a:bodyPr vert="horz" wrap="square" lIns="91440" tIns="45720" rIns="91440" bIns="45720" numCol="1" anchor="t" anchorCtr="0" compatLnSpc="1">
+            <a:prstTxWarp prst="textNoShape">
+              <a:avLst/>
+            </a:prstTxWarp>
+          </a:bodyPr>
+          <a:lstStyle/>
+          <a:p>
+            <a:pPr marL="342900" marR="0" lvl="0" indent="-342900" algn="l" defTabSz="914400" rtl="0" eaLnBrk="1" fontAlgn="base" latinLnBrk="0" hangingPunct="1">
+              <a:lnSpc>
+                <a:spcPct val="100000"/>
+              </a:lnSpc>
+              <a:spcBef>
+                <a:spcPct val="20000"/>
+              </a:spcBef>
+              <a:spcAft>
+                <a:spcPct val="0"/>
+              </a:spcAft>
+              <a:buClr>
+                <a:srgbClr val="00AAF6"/>
+              </a:buClr>
+              <a:buSzTx/>
+              <a:buFontTx/>
+              <a:buChar char="•"/>
+              <a:tabLst/>
+              <a:defRPr/>
+            </a:pPr>
+            <a:r>
+              <a:rPr lang="en-US" sz="2000" b="1" kern="0" dirty="0" smtClean="0">
+                <a:latin typeface="+mn-lt"/>
+              </a:rPr>
+              <a:t>Example CQL Query Results </a:t>
+            </a:r>
+            <a:r>
+              <a:rPr lang="en-US" sz="2000" b="1" kern="0" dirty="0" err="1" smtClean="0">
+                <a:latin typeface="+mn-lt"/>
+              </a:rPr>
+              <a:t>Iterator</a:t>
+            </a:r>
+            <a:r>
+              <a:rPr lang="en-US" sz="2000" b="1" kern="0" dirty="0" smtClean="0">
+                <a:latin typeface="+mn-lt"/>
+              </a:rPr>
+              <a:t> usage</a:t>
+            </a:r>
+          </a:p>
+          <a:p>
+            <a:pPr marL="342900" marR="0" lvl="0" indent="-342900" algn="l" defTabSz="914400" rtl="0" eaLnBrk="1" fontAlgn="base" latinLnBrk="0" hangingPunct="1">
+              <a:lnSpc>
+                <a:spcPct val="100000"/>
+              </a:lnSpc>
+              <a:spcBef>
+                <a:spcPct val="20000"/>
+              </a:spcBef>
+              <a:spcAft>
+                <a:spcPct val="0"/>
+              </a:spcAft>
+              <a:buClr>
+                <a:srgbClr val="00AAF6"/>
+              </a:buClr>
+              <a:buSzTx/>
+              <a:buFontTx/>
+              <a:buChar char="•"/>
+              <a:tabLst/>
+              <a:defRPr/>
+            </a:pPr>
+            <a:endParaRPr lang="en-US" sz="2000" b="1" kern="0" dirty="0" smtClean="0">
+              <a:latin typeface="+mn-lt"/>
+            </a:endParaRPr>
+          </a:p>
+          <a:p>
+            <a:pPr marL="342900" marR="0" lvl="0" indent="-342900" algn="l" defTabSz="914400" rtl="0" eaLnBrk="1" fontAlgn="base" latinLnBrk="0" hangingPunct="1">
+              <a:lnSpc>
+                <a:spcPct val="100000"/>
+              </a:lnSpc>
+              <a:spcBef>
+                <a:spcPct val="20000"/>
+              </a:spcBef>
+              <a:spcAft>
+                <a:spcPct val="0"/>
+              </a:spcAft>
+              <a:buClr>
+                <a:srgbClr val="00AAF6"/>
+              </a:buClr>
+              <a:buSzTx/>
+              <a:buFontTx/>
+              <a:buChar char="•"/>
+              <a:tabLst/>
+              <a:defRPr/>
+            </a:pPr>
+            <a:endParaRPr lang="en-US" sz="2000" b="1" kern="0" dirty="0" smtClean="0">
+              <a:latin typeface="+mn-lt"/>
+            </a:endParaRPr>
+          </a:p>
+          <a:p>
+            <a:pPr marL="342900" marR="0" lvl="0" indent="-342900" algn="l" defTabSz="914400" rtl="0" eaLnBrk="1" fontAlgn="base" latinLnBrk="0" hangingPunct="1">
+              <a:lnSpc>
+                <a:spcPct val="100000"/>
+              </a:lnSpc>
+              <a:spcBef>
+                <a:spcPct val="20000"/>
+              </a:spcBef>
+              <a:spcAft>
+                <a:spcPct val="0"/>
+              </a:spcAft>
+              <a:buClr>
+                <a:srgbClr val="00AAF6"/>
+              </a:buClr>
+              <a:buSzTx/>
+              <a:buFontTx/>
+              <a:buChar char="•"/>
+              <a:tabLst/>
+              <a:defRPr/>
+            </a:pPr>
+            <a:endParaRPr lang="en-US" sz="2000" b="1" kern="0" dirty="0" smtClean="0">
+              <a:latin typeface="+mn-lt"/>
+            </a:endParaRPr>
+          </a:p>
+          <a:p>
+            <a:pPr marL="342900" marR="0" lvl="0" indent="-342900" algn="l" defTabSz="914400" rtl="0" eaLnBrk="1" fontAlgn="base" latinLnBrk="0" hangingPunct="1">
+              <a:lnSpc>
+                <a:spcPct val="100000"/>
+              </a:lnSpc>
+              <a:spcBef>
+                <a:spcPct val="20000"/>
+              </a:spcBef>
+              <a:spcAft>
+                <a:spcPct val="0"/>
+              </a:spcAft>
+              <a:buClr>
+                <a:srgbClr val="00AAF6"/>
+              </a:buClr>
+              <a:buSzTx/>
+              <a:buFontTx/>
+              <a:buChar char="•"/>
+              <a:tabLst/>
+              <a:defRPr/>
+            </a:pPr>
+            <a:endParaRPr lang="en-US" sz="2000" b="1" kern="0" dirty="0" smtClean="0">
+              <a:latin typeface="+mn-lt"/>
+            </a:endParaRPr>
+          </a:p>
+          <a:p>
+            <a:pPr marL="800100" lvl="1" indent="-342900">
+              <a:spcBef>
+                <a:spcPct val="20000"/>
+              </a:spcBef>
+              <a:buClr>
+                <a:srgbClr val="00AAF6"/>
+              </a:buClr>
+              <a:buFontTx/>
+              <a:buChar char="•"/>
+              <a:defRPr/>
+            </a:pPr>
+            <a:r>
+              <a:rPr lang="en-US" sz="2000" kern="0" dirty="0" smtClean="0">
+                <a:latin typeface="+mn-lt"/>
+              </a:rPr>
+              <a:t>CQL Query Results have been returned from the data service</a:t>
+            </a:r>
+          </a:p>
+          <a:p>
+            <a:pPr marL="800100" lvl="1" indent="-342900">
+              <a:spcBef>
+                <a:spcPct val="20000"/>
+              </a:spcBef>
+              <a:buClr>
+                <a:srgbClr val="00AAF6"/>
+              </a:buClr>
+              <a:buFontTx/>
+              <a:buChar char="•"/>
+              <a:defRPr/>
+            </a:pPr>
+            <a:r>
+              <a:rPr lang="en-US" sz="2000" kern="0" dirty="0" smtClean="0">
+                <a:latin typeface="+mn-lt"/>
+              </a:rPr>
+              <a:t>The WSDD file for this data service is opened as an Input Stream</a:t>
+            </a:r>
+          </a:p>
+          <a:p>
+            <a:pPr marL="800100" lvl="1" indent="-342900">
+              <a:spcBef>
+                <a:spcPct val="20000"/>
+              </a:spcBef>
+              <a:buClr>
+                <a:srgbClr val="00AAF6"/>
+              </a:buClr>
+              <a:buFontTx/>
+              <a:buChar char="•"/>
+              <a:defRPr/>
+            </a:pPr>
+            <a:r>
+              <a:rPr lang="en-US" sz="2000" kern="0" dirty="0" smtClean="0">
+                <a:latin typeface="+mn-lt"/>
+              </a:rPr>
+              <a:t>A new CQL Query Results </a:t>
+            </a:r>
+            <a:r>
+              <a:rPr lang="en-US" sz="2000" kern="0" dirty="0" err="1" smtClean="0">
+                <a:latin typeface="+mn-lt"/>
+              </a:rPr>
+              <a:t>Iterator</a:t>
+            </a:r>
+            <a:r>
+              <a:rPr lang="en-US" sz="2000" kern="0" dirty="0" smtClean="0">
+                <a:latin typeface="+mn-lt"/>
+              </a:rPr>
+              <a:t> is created using the query results and the WSDD for configuration of the </a:t>
+            </a:r>
+            <a:r>
+              <a:rPr lang="en-US" sz="2000" kern="0" dirty="0" err="1" smtClean="0">
+                <a:latin typeface="+mn-lt"/>
+              </a:rPr>
+              <a:t>deserializer</a:t>
+            </a:r>
+            <a:endParaRPr lang="en-US" sz="2000" kern="0" dirty="0" smtClean="0">
+              <a:latin typeface="+mn-lt"/>
+            </a:endParaRPr>
+          </a:p>
+          <a:p>
+            <a:pPr marL="800100" lvl="1" indent="-342900">
+              <a:spcBef>
+                <a:spcPct val="20000"/>
+              </a:spcBef>
+              <a:buClr>
+                <a:srgbClr val="00AAF6"/>
+              </a:buClr>
+              <a:buFontTx/>
+              <a:buChar char="•"/>
+              <a:defRPr/>
+            </a:pPr>
+            <a:r>
+              <a:rPr lang="en-US" sz="2000" kern="0" dirty="0" smtClean="0">
+                <a:latin typeface="+mn-lt"/>
+              </a:rPr>
+              <a:t>Results are iterated one at a time until none remain</a:t>
+            </a:r>
+          </a:p>
+          <a:p>
+            <a:pPr marL="800100" lvl="1" indent="-342900">
+              <a:spcBef>
+                <a:spcPct val="20000"/>
+              </a:spcBef>
+              <a:buClr>
+                <a:srgbClr val="00AAF6"/>
+              </a:buClr>
+              <a:buFontTx/>
+              <a:buChar char="•"/>
+              <a:defRPr/>
+            </a:pPr>
+            <a:r>
+              <a:rPr lang="en-US" sz="2000" kern="0" dirty="0" smtClean="0">
+                <a:latin typeface="+mn-lt"/>
+              </a:rPr>
+              <a:t>Each result is cast as the query target’s data type (</a:t>
+            </a:r>
+            <a:r>
+              <a:rPr lang="en-US" sz="2000" i="1" kern="0" dirty="0" smtClean="0">
+                <a:latin typeface="+mn-lt"/>
+              </a:rPr>
+              <a:t>gene</a:t>
+            </a:r>
+            <a:r>
+              <a:rPr lang="en-US" sz="2000" kern="0" dirty="0" smtClean="0">
+                <a:latin typeface="+mn-lt"/>
+              </a:rPr>
+              <a:t>)</a:t>
+            </a:r>
+          </a:p>
+          <a:p>
+            <a:pPr marL="800100" lvl="1" indent="-342900">
+              <a:spcBef>
+                <a:spcPct val="20000"/>
+              </a:spcBef>
+              <a:buClr>
+                <a:srgbClr val="00AAF6"/>
+              </a:buClr>
+              <a:buFontTx/>
+              <a:buChar char="•"/>
+              <a:defRPr/>
+            </a:pPr>
+            <a:r>
+              <a:rPr lang="en-US" sz="2000" kern="0" dirty="0" smtClean="0">
+                <a:latin typeface="+mn-lt"/>
+              </a:rPr>
+              <a:t>The name of each gene is printed</a:t>
+            </a:r>
+          </a:p>
+          <a:p>
+            <a:pPr marL="800100" lvl="1" indent="-342900">
+              <a:spcBef>
+                <a:spcPct val="20000"/>
+              </a:spcBef>
+              <a:buClr>
+                <a:srgbClr val="00AAF6"/>
+              </a:buClr>
+              <a:buFontTx/>
+              <a:buChar char="•"/>
+              <a:defRPr/>
+            </a:pPr>
+            <a:r>
+              <a:rPr lang="en-US" sz="2000" kern="0" dirty="0" smtClean="0">
+                <a:latin typeface="+mn-lt"/>
+              </a:rPr>
+              <a:t>The WSDD file stream </a:t>
+            </a:r>
+            <a:r>
+              <a:rPr lang="en-US" sz="2000" kern="0" smtClean="0">
+                <a:latin typeface="+mn-lt"/>
+              </a:rPr>
+              <a:t>is closed</a:t>
+            </a:r>
+            <a:endParaRPr lang="en-US" sz="2000" kern="0" dirty="0" smtClean="0">
+              <a:latin typeface="+mn-lt"/>
+            </a:endParaRPr>
+          </a:p>
+          <a:p>
+            <a:pPr marL="342900" marR="0" lvl="0" indent="-342900" algn="l" defTabSz="914400" rtl="0" eaLnBrk="1" fontAlgn="base" latinLnBrk="0" hangingPunct="1">
+              <a:lnSpc>
+                <a:spcPct val="100000"/>
+              </a:lnSpc>
+              <a:spcBef>
+                <a:spcPct val="20000"/>
+              </a:spcBef>
+              <a:spcAft>
+                <a:spcPct val="0"/>
+              </a:spcAft>
+              <a:buClr>
+                <a:srgbClr val="00AAF6"/>
+              </a:buClr>
+              <a:buSzTx/>
+              <a:buFontTx/>
+              <a:buChar char="•"/>
+              <a:tabLst/>
+              <a:defRPr/>
+            </a:pPr>
+            <a:endParaRPr lang="en-US" sz="2000" b="1" kern="0" dirty="0" smtClean="0">
+              <a:latin typeface="+mn-lt"/>
+            </a:endParaRPr>
+          </a:p>
+        </p:txBody>
+      </p:sp>
+      <p:pic>
+        <p:nvPicPr>
+          <p:cNvPr id="5" name="Picture 4" descr="Iterator Example 1.png"/>
+          <p:cNvPicPr>
+            <a:picLocks noChangeAspect="1"/>
+          </p:cNvPicPr>
+          <p:nvPr/>
+        </p:nvPicPr>
+        <p:blipFill>
+          <a:blip r:embed="rId2" cstate="print"/>
+          <a:stretch>
+            <a:fillRect/>
+          </a:stretch>
+        </p:blipFill>
+        <p:spPr>
+          <a:xfrm>
+            <a:off x="762000" y="1752600"/>
+            <a:ext cx="5191125" cy="1285875"/>
+          </a:xfrm>
+          <a:prstGeom prst="rect">
+            <a:avLst/>
+          </a:prstGeom>
+        </p:spPr>
+      </p:pic>
+    </p:spTree>
+  </p:cSld>
+  <p:clrMapOvr>
+    <a:masterClrMapping/>
+  </p:clrMapOvr>
+</p:sld>
+</file>
+
+<file path=ppt/slides/slide23.xml><?xml version="1.0" encoding="utf-8"?>
+<p:sld xmlns:a="http://schemas.openxmlformats.org/drawingml/2006/main" xmlns:r="http://schemas.openxmlformats.org/officeDocument/2006/relationships" xmlns:p="http://schemas.openxmlformats.org/presentationml/2006/main">
+  <p:cSld>
+    <p:spTree>
+      <p:nvGrpSpPr>
+        <p:cNvPr id="1" name=""/>
+        <p:cNvGrpSpPr/>
+        <p:nvPr/>
+      </p:nvGrpSpPr>
+      <p:grpSpPr>
+        <a:xfrm>
+          <a:off x="0" y="0"/>
+          <a:ext cx="0" cy="0"/>
+          <a:chOff x="0" y="0"/>
+          <a:chExt cx="0" cy="0"/>
+        </a:xfrm>
+      </p:grpSpPr>
+      <p:sp>
+        <p:nvSpPr>
+          <p:cNvPr id="2" name="Title 1"/>
+          <p:cNvSpPr>
+            <a:spLocks noGrp="1"/>
+          </p:cNvSpPr>
+          <p:nvPr>
+            <p:ph type="title"/>
+          </p:nvPr>
+        </p:nvSpPr>
+        <p:spPr/>
+        <p:txBody>
+          <a:bodyPr/>
+          <a:lstStyle/>
+          <a:p>
+            <a:r>
+              <a:rPr lang="en-US" dirty="0" smtClean="0"/>
+              <a:t>Federated Queries</a:t>
             </a:r>
             <a:endParaRPr lang="en-US" dirty="0"/>
           </a:p>
@@ -8662,6 +9133,120 @@
           </a:bodyPr>
           <a:lstStyle/>
           <a:p>
+            <a:pPr marL="342900" marR="0" lvl="0" indent="-342900" algn="l" defTabSz="914400" rtl="0" eaLnBrk="1" fontAlgn="base" latinLnBrk="0" hangingPunct="1">
+              <a:lnSpc>
+                <a:spcPct val="100000"/>
+              </a:lnSpc>
+              <a:spcBef>
+                <a:spcPct val="20000"/>
+              </a:spcBef>
+              <a:spcAft>
+                <a:spcPct val="0"/>
+              </a:spcAft>
+              <a:buClr>
+                <a:srgbClr val="00AAF6"/>
+              </a:buClr>
+              <a:buSzTx/>
+              <a:buFontTx/>
+              <a:buChar char="•"/>
+              <a:tabLst/>
+              <a:defRPr/>
+            </a:pPr>
+            <a:r>
+              <a:rPr lang="en-US" sz="2000" b="1" kern="0" dirty="0" smtClean="0">
+                <a:latin typeface="+mn-lt"/>
+              </a:rPr>
+              <a:t>Multiple Data Services Involved</a:t>
+            </a:r>
+          </a:p>
+          <a:p>
+            <a:pPr marL="800100" lvl="1" indent="-342900">
+              <a:spcBef>
+                <a:spcPct val="20000"/>
+              </a:spcBef>
+              <a:buClr>
+                <a:srgbClr val="00AAF6"/>
+              </a:buClr>
+              <a:buFontTx/>
+              <a:buChar char="•"/>
+              <a:defRPr/>
+            </a:pPr>
+            <a:r>
+              <a:rPr lang="en-US" sz="2000" kern="0" dirty="0" smtClean="0"/>
+              <a:t>Basic distributed joins and </a:t>
+            </a:r>
+            <a:r>
+              <a:rPr lang="en-US" sz="2000" kern="0" dirty="0" smtClean="0"/>
+              <a:t>aggregations</a:t>
+            </a:r>
+            <a:endParaRPr lang="en-US" sz="2000" b="1" kern="0" dirty="0" smtClean="0">
+              <a:latin typeface="+mn-lt"/>
+            </a:endParaRPr>
+          </a:p>
+          <a:p>
+            <a:pPr marL="800100" lvl="1" indent="-342900">
+              <a:spcBef>
+                <a:spcPct val="20000"/>
+              </a:spcBef>
+              <a:buClr>
+                <a:srgbClr val="00AAF6"/>
+              </a:buClr>
+              <a:buFontTx/>
+              <a:buChar char="•"/>
+              <a:defRPr/>
+            </a:pPr>
+            <a:r>
+              <a:rPr lang="en-US" sz="2000" kern="0" dirty="0" smtClean="0">
+                <a:latin typeface="+mn-lt"/>
+              </a:rPr>
+              <a:t>All data services use the same language (CQL), so federation using multiple data services is possible</a:t>
+            </a:r>
+          </a:p>
+          <a:p>
+            <a:pPr marL="1257300" lvl="2" indent="-342900">
+              <a:spcBef>
+                <a:spcPct val="20000"/>
+              </a:spcBef>
+              <a:buClr>
+                <a:srgbClr val="00AAF6"/>
+              </a:buClr>
+              <a:buFontTx/>
+              <a:buChar char="•"/>
+              <a:defRPr/>
+            </a:pPr>
+            <a:r>
+              <a:rPr lang="en-US" i="1" kern="0" dirty="0" smtClean="0">
+                <a:latin typeface="+mn-lt"/>
+              </a:rPr>
+              <a:t>Any</a:t>
+            </a:r>
+            <a:r>
+              <a:rPr lang="en-US" kern="0" dirty="0" smtClean="0">
+                <a:latin typeface="+mn-lt"/>
+              </a:rPr>
+              <a:t> combination of data services may be used</a:t>
+            </a:r>
+          </a:p>
+          <a:p>
+            <a:pPr marL="1257300" lvl="2" indent="-342900">
+              <a:spcBef>
+                <a:spcPct val="20000"/>
+              </a:spcBef>
+              <a:buClr>
+                <a:srgbClr val="00AAF6"/>
+              </a:buClr>
+              <a:buFontTx/>
+              <a:buChar char="•"/>
+              <a:defRPr/>
+            </a:pPr>
+            <a:r>
+              <a:rPr lang="en-US" kern="0" dirty="0" smtClean="0">
+                <a:latin typeface="+mn-lt"/>
+              </a:rPr>
+              <a:t>Arbitrary cross-model joins</a:t>
+            </a:r>
+          </a:p>
+          <a:p>
             <a:pPr marL="342900" indent="-342900">
               <a:spcBef>
                 <a:spcPct val="20000"/>
@@ -8674,8 +9259,16 @@
               <a:defRPr/>
             </a:pPr>
             <a:r>
-              <a:rPr lang="en-US" sz="2000" b="1" kern="0" dirty="0" smtClean="0"/>
-              <a:t>Asynchronous query execution</a:t>
+              <a:rPr lang="en-US" sz="2000" b="1" i="1" kern="0" dirty="0" smtClean="0">
+                <a:latin typeface="+mn-lt"/>
+              </a:rPr>
+              <a:t>D</a:t>
+            </a:r>
+            <a:r>
+              <a:rPr lang="en-US" sz="2000" b="1" kern="0" dirty="0" smtClean="0">
+                <a:latin typeface="+mn-lt"/>
+              </a:rPr>
+              <a:t>CQL extends from CQL</a:t>
             </a:r>
           </a:p>
           <a:p>
@@ -8691,8 +9284,10 @@
               <a:defRPr/>
             </a:pPr>
             <a:r>
-              <a:rPr lang="en-US" sz="2000" kern="0" dirty="0" smtClean="0"/>
-              <a:t>Start a DCQL query and immediately return the results context</a:t>
+              <a:rPr lang="en-US" sz="2000" kern="0" dirty="0" smtClean="0">
+                <a:latin typeface="+mn-lt"/>
+              </a:rPr>
+              <a:t>Distributed version of CQL</a:t>
             </a:r>
           </a:p>
           <a:p>
@@ -8708,6 +9303,204 @@
               <a:defRPr/>
             </a:pPr>
             <a:r>
+              <a:rPr lang="en-US" sz="2000" kern="0" dirty="0" smtClean="0">
+                <a:latin typeface="+mn-lt"/>
+              </a:rPr>
+              <a:t>Expresses joins, foreign data services, and target services</a:t>
+            </a:r>
+          </a:p>
+          <a:p>
+            <a:pPr marL="342900" indent="-342900">
+              <a:spcBef>
+                <a:spcPct val="20000"/>
+              </a:spcBef>
+              <a:buClr>
+                <a:srgbClr val="00AAF6"/>
+              </a:buClr>
+              <a:buFontTx/>
+              <a:buChar char="•"/>
+              <a:defRPr/>
+            </a:pPr>
+            <a:r>
+              <a:rPr lang="en-US" sz="2000" b="1" kern="0" dirty="0" err="1" smtClean="0">
+                <a:latin typeface="+mn-lt"/>
+              </a:rPr>
+              <a:t>Stateful</a:t>
+            </a:r>
+            <a:r>
+              <a:rPr lang="en-US" sz="2000" b="1" kern="0" dirty="0" smtClean="0">
+                <a:latin typeface="+mn-lt"/>
+              </a:rPr>
+              <a:t> Grid Service or Local API</a:t>
+            </a:r>
+          </a:p>
+          <a:p>
+            <a:pPr marL="800100" lvl="1" indent="-342900">
+              <a:spcBef>
+                <a:spcPct val="20000"/>
+              </a:spcBef>
+              <a:buClr>
+                <a:srgbClr val="00AAF6"/>
+              </a:buClr>
+              <a:buFontTx/>
+              <a:buChar char="•"/>
+              <a:defRPr/>
+            </a:pPr>
+            <a:r>
+              <a:rPr lang="en-US" sz="2000" kern="0" dirty="0" smtClean="0">
+                <a:latin typeface="+mn-lt"/>
+              </a:rPr>
+              <a:t>Queries may be issued to an FQP grid service and processed asynchronously for later results retrieval</a:t>
+            </a:r>
+          </a:p>
+          <a:p>
+            <a:pPr marL="800100" lvl="1" indent="-342900">
+              <a:spcBef>
+                <a:spcPct val="20000"/>
+              </a:spcBef>
+              <a:buClr>
+                <a:srgbClr val="00AAF6"/>
+              </a:buClr>
+              <a:buFontTx/>
+              <a:buChar char="•"/>
+              <a:defRPr/>
+            </a:pPr>
+            <a:r>
+              <a:rPr lang="en-US" sz="2000" kern="0" dirty="0" smtClean="0">
+                <a:latin typeface="+mn-lt"/>
+              </a:rPr>
+              <a:t>FQP engine may be used within an application directly</a:t>
+            </a:r>
+          </a:p>
+        </p:txBody>
+      </p:sp>
+    </p:spTree>
+  </p:cSld>
+  <p:clrMapOvr>
+    <a:masterClrMapping/>
+  </p:clrMapOvr>
+</p:sld>
+</file>
+
+<file path=ppt/slides/slide24.xml><?xml version="1.0" encoding="utf-8"?>
+<p:sld xmlns:a="http://schemas.openxmlformats.org/drawingml/2006/main" xmlns:r="http://schemas.openxmlformats.org/officeDocument/2006/relationships" xmlns:p="http://schemas.openxmlformats.org/presentationml/2006/main">
+  <p:cSld>
+    <p:spTree>
+      <p:nvGrpSpPr>
+        <p:cNvPr id="1" name=""/>
+        <p:cNvGrpSpPr/>
+        <p:nvPr/>
+      </p:nvGrpSpPr>
+      <p:grpSpPr>
+        <a:xfrm>
+          <a:off x="0" y="0"/>
+          <a:ext cx="0" cy="0"/>
+          <a:chOff x="0" y="0"/>
+          <a:chExt cx="0" cy="0"/>
+        </a:xfrm>
+      </p:grpSpPr>
+      <p:sp>
+        <p:nvSpPr>
+          <p:cNvPr id="2" name="Title 1"/>
+          <p:cNvSpPr>
+            <a:spLocks noGrp="1"/>
+          </p:cNvSpPr>
+          <p:nvPr>
+            <p:ph type="title"/>
+          </p:nvPr>
+        </p:nvSpPr>
+        <p:spPr/>
+        <p:txBody>
+          <a:bodyPr/>
+          <a:lstStyle/>
+          <a:p>
+            <a:r>
+              <a:rPr lang="en-US" dirty="0" smtClean="0"/>
+              <a:t>Federated Query Service</a:t>
+            </a:r>
+            <a:endParaRPr lang="en-US" dirty="0"/>
+          </a:p>
+        </p:txBody>
+      </p:sp>
+      <p:sp>
+        <p:nvSpPr>
+          <p:cNvPr id="5" name="Content Placeholder 2"/>
+          <p:cNvSpPr txBox="1">
+            <a:spLocks/>
+          </p:cNvSpPr>
+          <p:nvPr/>
+        </p:nvSpPr>
+        <p:spPr bwMode="auto">
+          <a:xfrm>
+            <a:off x="304800" y="1371600"/>
+            <a:ext cx="8458200" cy="4953000"/>
+          </a:xfrm>
+          <a:prstGeom prst="rect">
+            <a:avLst/>
+          </a:prstGeom>
+          <a:noFill/>
+          <a:ln w="9525">
+            <a:noFill/>
+            <a:miter lim="800000"/>
+            <a:headEnd/>
+            <a:tailEnd/>
+          </a:ln>
+          <a:effectLst/>
+        </p:spPr>
+        <p:txBody>
+          <a:bodyPr vert="horz" wrap="square" lIns="91440" tIns="45720" rIns="91440" bIns="45720" numCol="1" anchor="t" anchorCtr="0" compatLnSpc="1">
+            <a:prstTxWarp prst="textNoShape">
+              <a:avLst/>
+            </a:prstTxWarp>
+          </a:bodyPr>
+          <a:lstStyle/>
+          <a:p>
+            <a:pPr marL="342900" indent="-342900">
+              <a:spcBef>
+                <a:spcPct val="20000"/>
+              </a:spcBef>
+              <a:buClr>
+                <a:srgbClr val="00AAF6"/>
+              </a:buClr>
+              <a:buFontTx/>
+              <a:buChar char="•"/>
+              <a:defRPr/>
+            </a:pPr>
+            <a:r>
+              <a:rPr lang="en-US" sz="2000" b="1" kern="0" dirty="0" smtClean="0"/>
+              <a:t>Asynchronous query execution</a:t>
+            </a:r>
+          </a:p>
+          <a:p>
+            <a:pPr marL="800100" lvl="1" indent="-342900">
+              <a:spcBef>
+                <a:spcPct val="20000"/>
+              </a:spcBef>
+              <a:buClr>
+                <a:srgbClr val="00AAF6"/>
+              </a:buClr>
+              <a:buFontTx/>
+              <a:buChar char="•"/>
+              <a:defRPr/>
+            </a:pPr>
+            <a:r>
+              <a:rPr lang="en-US" sz="2000" kern="0" dirty="0" smtClean="0"/>
+              <a:t>Start a DCQL query and immediately return the results context</a:t>
+            </a:r>
+          </a:p>
+          <a:p>
+            <a:pPr marL="800100" lvl="1" indent="-342900">
+              <a:spcBef>
+                <a:spcPct val="20000"/>
+              </a:spcBef>
+              <a:buClr>
+                <a:srgbClr val="00AAF6"/>
+              </a:buClr>
+              <a:buFontTx/>
+              <a:buChar char="•"/>
+              <a:defRPr/>
+            </a:pPr>
+            <a:r>
               <a:rPr lang="en-US" sz="2000" kern="0" dirty="0" smtClean="0"/>
               <a:t>WS-Notification allows client to subscribe to status</a:t>
             </a:r>
@@ -8801,7 +9594,7 @@
             </a:r>
             <a:r>
               <a:rPr lang="en-US" sz="2000" kern="0" dirty="0" smtClean="0"/>
-              <a:t>ervice</a:t>
+              <a:t>ervice (CDS)</a:t>
             </a:r>
           </a:p>
           <a:p>
@@ -8835,13 +9628,8 @@
             </a:pPr>
             <a:r>
               <a:rPr lang="en-US" sz="2000" kern="0" dirty="0" smtClean="0"/>
-              <a:t>WS-Enumeration and </a:t>
-            </a:r>
-            <a:r>
-              <a:rPr lang="en-US" sz="2000" kern="0" smtClean="0"/>
-              <a:t>caGrid Transfer</a:t>
-            </a:r>
-            <a:endParaRPr lang="en-US" sz="2000" kern="0" dirty="0" smtClean="0"/>
+              <a:t>WS-Enumeration and caGrid Transfer</a:t>
+            </a:r>
           </a:p>
           <a:p>
             <a:pPr marL="342900" indent="-342900">
@@ -8856,20 +9644,11 @@
               <a:defRPr/>
             </a:pPr>
             <a:r>
-              <a:rPr lang="en-US" sz="2000" kern="0" dirty="0" smtClean="0"/>
-              <a:t>Basic </a:t>
-            </a:r>
-            <a:r>
-              <a:rPr lang="en-US" sz="2000" kern="0" dirty="0" smtClean="0"/>
-              <a:t>distributed joins and </a:t>
-            </a:r>
-            <a:r>
-              <a:rPr lang="en-US" sz="2000" kern="0" dirty="0" smtClean="0"/>
-              <a:t>aggregations</a:t>
-            </a:r>
-            <a:endParaRPr lang="en-US" sz="2000" b="1" kern="0" dirty="0" smtClean="0">
-              <a:latin typeface="+mn-lt"/>
-            </a:endParaRPr>
+              <a:rPr lang="en-US" sz="2000" b="1" kern="0" dirty="0" smtClean="0">
+                <a:latin typeface="+mn-lt"/>
+              </a:rPr>
+              <a:t>Configurable Query Behavior</a:t>
+            </a:r>
           </a:p>
           <a:p>
             <a:pPr marL="800100" lvl="1" indent="-342900">
@@ -8887,177 +9666,7 @@
               <a:rPr lang="en-US" sz="2000" kern="0" dirty="0" smtClean="0">
                 <a:latin typeface="+mn-lt"/>
               </a:rPr>
-              <a:t>All data services use the same language (CQL), so federation using multiple data services is possible</a:t>
-            </a:r>
-          </a:p>
-          <a:p>
-            <a:pPr marL="1257300" lvl="2" indent="-342900">
-              <a:spcBef>
-                <a:spcPct val="20000"/>
-              </a:spcBef>
-              <a:buClr>
-                <a:srgbClr val="00AAF6"/>
-              </a:buClr>
-              <a:buFontTx/>
-              <a:buChar char="•"/>
-              <a:defRPr/>
-            </a:pPr>
-            <a:r>
-              <a:rPr lang="en-US" i="1" kern="0" dirty="0" smtClean="0">
-                <a:latin typeface="+mn-lt"/>
-              </a:rPr>
-              <a:t>Any</a:t>
-            </a:r>
-            <a:r>
-              <a:rPr lang="en-US" kern="0" dirty="0" smtClean="0">
-                <a:latin typeface="+mn-lt"/>
-              </a:rPr>
-              <a:t> combination of data services may be used</a:t>
-            </a:r>
-          </a:p>
-          <a:p>
-            <a:pPr marL="1257300" lvl="2" indent="-342900">
-              <a:spcBef>
-                <a:spcPct val="20000"/>
-              </a:spcBef>
-              <a:buClr>
-                <a:srgbClr val="00AAF6"/>
-              </a:buClr>
-              <a:buFontTx/>
-              <a:buChar char="•"/>
-              <a:defRPr/>
-            </a:pPr>
-            <a:r>
-              <a:rPr lang="en-US" kern="0" dirty="0" smtClean="0">
-                <a:latin typeface="+mn-lt"/>
-              </a:rPr>
-              <a:t>Arbitrary cross-model joins</a:t>
-            </a:r>
-          </a:p>
-          <a:p>
-            <a:pPr marL="342900" indent="-342900">
-              <a:spcBef>
-                <a:spcPct val="20000"/>
-              </a:spcBef>
-              <a:buClr>
-                <a:srgbClr val="00AAF6"/>
-              </a:buClr>
-              <a:buFontTx/>
-              <a:buChar char="•"/>
-              <a:defRPr/>
-            </a:pPr>
-            <a:r>
-              <a:rPr lang="en-US" sz="2000" b="1" i="1" kern="0" dirty="0" smtClean="0">
-                <a:latin typeface="+mn-lt"/>
-              </a:rPr>
-              <a:t>D</a:t>
-            </a:r>
-            <a:r>
-              <a:rPr lang="en-US" sz="2000" b="1" kern="0" dirty="0" smtClean="0">
-                <a:latin typeface="+mn-lt"/>
-              </a:rPr>
-              <a:t>CQL extends from CQL</a:t>
-            </a:r>
-          </a:p>
-          <a:p>
-            <a:pPr marL="800100" lvl="1" indent="-342900">
-              <a:spcBef>
-                <a:spcPct val="20000"/>
-              </a:spcBef>
-              <a:buClr>
-                <a:srgbClr val="00AAF6"/>
-              </a:buClr>
-              <a:buFontTx/>
-              <a:buChar char="•"/>
-              <a:defRPr/>
-            </a:pPr>
-            <a:r>
-              <a:rPr lang="en-US" sz="2000" kern="0" dirty="0" smtClean="0">
-                <a:latin typeface="+mn-lt"/>
-              </a:rPr>
-              <a:t>Distributed version of CQL</a:t>
-            </a:r>
-          </a:p>
-          <a:p>
-            <a:pPr marL="800100" lvl="1" indent="-342900">
-              <a:spcBef>
-                <a:spcPct val="20000"/>
-              </a:spcBef>
-              <a:buClr>
-                <a:srgbClr val="00AAF6"/>
-              </a:buClr>
-              <a:buFontTx/>
-              <a:buChar char="•"/>
-              <a:defRPr/>
-            </a:pPr>
-            <a:r>
-              <a:rPr lang="en-US" sz="2000" kern="0" dirty="0" smtClean="0">
-                <a:latin typeface="+mn-lt"/>
-              </a:rPr>
-              <a:t>Expresses joins, foreign data services, and target services</a:t>
-            </a:r>
-          </a:p>
-          <a:p>
-            <a:pPr marL="342900" indent="-342900">
-              <a:spcBef>
-                <a:spcPct val="20000"/>
-              </a:spcBef>
-              <a:buClr>
-                <a:srgbClr val="00AAF6"/>
-              </a:buClr>
-              <a:buFontTx/>
-              <a:buChar char="•"/>
-              <a:defRPr/>
-            </a:pPr>
-            <a:r>
-              <a:rPr lang="en-US" sz="2000" b="1" kern="0" dirty="0" err="1" smtClean="0">
-                <a:latin typeface="+mn-lt"/>
-              </a:rPr>
-              <a:t>Stateful</a:t>
-            </a:r>
-            <a:r>
-              <a:rPr lang="en-US" sz="2000" b="1" kern="0" dirty="0" smtClean="0">
-                <a:latin typeface="+mn-lt"/>
-              </a:rPr>
-              <a:t> Grid Service or Local API</a:t>
-            </a:r>
-          </a:p>
-          <a:p>
-            <a:pPr marL="800100" lvl="1" indent="-342900">
-              <a:spcBef>
-                <a:spcPct val="20000"/>
-              </a:spcBef>
-              <a:buClr>
-                <a:srgbClr val="00AAF6"/>
-              </a:buClr>
-              <a:buFontTx/>
-              <a:buChar char="•"/>
-              <a:defRPr/>
-            </a:pPr>
-            <a:r>
-              <a:rPr lang="en-US" sz="2000" kern="0" dirty="0" smtClean="0">
-                <a:latin typeface="+mn-lt"/>
-              </a:rPr>
-              <a:t>Queries may be issued to an FQP grid service and processed asynchronously for later results retrieval</a:t>
-            </a:r>
-          </a:p>
-          <a:p>
-            <a:pPr marL="800100" lvl="1" indent="-342900">
-              <a:spcBef>
-                <a:spcPct val="20000"/>
-              </a:spcBef>
-              <a:buClr>
-                <a:srgbClr val="00AAF6"/>
-              </a:buClr>
-              <a:buFontTx/>
-              <a:buChar char="•"/>
-              <a:defRPr/>
-            </a:pPr>
-            <a:r>
-              <a:rPr lang="en-US" sz="2000" kern="0" dirty="0" smtClean="0">
-                <a:latin typeface="+mn-lt"/>
-              </a:rPr>
-              <a:t>FQP engine may be used within an application directly</a:t>
+              <a:t>Failure handling, partial results retrieval, etc</a:t>
             </a:r>
           </a:p>
         </p:txBody>
@@ -9067,6 +9676,579 @@
   <p:clrMapOvr>
     <a:masterClrMapping/>
   </p:clrMapOvr>
+</p:sld>
+</file>
+
+<file path=ppt/slides/slide25.xml><?xml version="1.0" encoding="utf-8"?>
+<p:sld xmlns:a="http://schemas.openxmlformats.org/drawingml/2006/main" xmlns:r="http://schemas.openxmlformats.org/officeDocument/2006/relationships" xmlns:p="http://schemas.openxmlformats.org/presentationml/2006/main">
+  <p:cSld>
+    <p:spTree>
+      <p:nvGrpSpPr>
+        <p:cNvPr id="1" name=""/>
+        <p:cNvGrpSpPr/>
+        <p:nvPr/>
+      </p:nvGrpSpPr>
+      <p:grpSpPr>
+        <a:xfrm>
+          <a:off x="0" y="0"/>
+          <a:ext cx="0" cy="0"/>
+          <a:chOff x="0" y="0"/>
+          <a:chExt cx="0" cy="0"/>
+        </a:xfrm>
+      </p:grpSpPr>
+      <p:sp>
+        <p:nvSpPr>
+          <p:cNvPr id="59394" name="Rectangle 2"/>
+          <p:cNvSpPr>
+            <a:spLocks noGrp="1" noChangeArrowheads="1"/>
+          </p:cNvSpPr>
+          <p:nvPr>
+            <p:ph type="title"/>
+          </p:nvPr>
+        </p:nvSpPr>
+        <p:spPr/>
+        <p:txBody>
+          <a:bodyPr/>
+          <a:lstStyle/>
+          <a:p>
+            <a:pPr eaLnBrk="1" hangingPunct="1"/>
+            <a:r>
+              <a:rPr lang="en-US" smtClean="0"/>
+              <a:t>DCQL Example</a:t>
+            </a:r>
+          </a:p>
+        </p:txBody>
+      </p:sp>
+      <p:sp>
+        <p:nvSpPr>
+          <p:cNvPr id="59395" name="Rectangle 3"/>
+          <p:cNvSpPr>
+            <a:spLocks noGrp="1" noChangeArrowheads="1"/>
+          </p:cNvSpPr>
+          <p:nvPr>
+            <p:ph idx="1"/>
+          </p:nvPr>
+        </p:nvSpPr>
+        <p:spPr>
+          <a:xfrm>
+            <a:off x="685800" y="1447800"/>
+            <a:ext cx="8458200" cy="4953000"/>
+          </a:xfrm>
+        </p:spPr>
+        <p:txBody>
+          <a:bodyPr/>
+          <a:lstStyle/>
+          <a:p>
+            <a:pPr>
+              <a:buFontTx/>
+              <a:buNone/>
+            </a:pPr>
+            <a:r>
+              <a:rPr lang="en-US" sz="1800" dirty="0" smtClean="0"/>
+              <a:t>Return all the Genes in my local database that have a symbol </a:t>
+            </a:r>
+            <a:r>
+              <a:rPr lang="en-US" sz="1800" i="1" dirty="0" smtClean="0"/>
+              <a:t>beginning </a:t>
+            </a:r>
+            <a:r>
+              <a:rPr lang="en-US" sz="1800" dirty="0" smtClean="0"/>
+              <a:t>with “BRC“ and also exist in the </a:t>
+            </a:r>
+            <a:r>
+              <a:rPr lang="en-US" sz="1800" dirty="0" err="1" smtClean="0"/>
+              <a:t>caBIO</a:t>
+            </a:r>
+            <a:r>
+              <a:rPr lang="en-US" sz="1800" dirty="0" smtClean="0"/>
+              <a:t> database.</a:t>
+            </a:r>
+          </a:p>
+          <a:p>
+            <a:pPr>
+              <a:buFontTx/>
+              <a:buNone/>
+            </a:pPr>
+            <a:endParaRPr lang="en-US" sz="1400" dirty="0" smtClean="0"/>
+          </a:p>
+          <a:p>
+            <a:pPr>
+              <a:buFontTx/>
+              <a:buNone/>
+            </a:pPr>
+            <a:r>
+              <a:rPr lang="en-US" sz="1400" dirty="0" smtClean="0"/>
+              <a:t>&lt;</a:t>
+            </a:r>
+            <a:r>
+              <a:rPr lang="en-US" sz="1400" dirty="0" err="1" smtClean="0"/>
+              <a:t>DCQLQuery</a:t>
+            </a:r>
+            <a:r>
+              <a:rPr lang="en-US" sz="1400" dirty="0" smtClean="0"/>
+              <a:t>&gt;</a:t>
+            </a:r>
+          </a:p>
+          <a:p>
+            <a:pPr>
+              <a:buFontTx/>
+              <a:buNone/>
+            </a:pPr>
+            <a:r>
+              <a:rPr lang="en-US" sz="1400" dirty="0" smtClean="0"/>
+              <a:t>    &lt;</a:t>
+            </a:r>
+            <a:r>
+              <a:rPr lang="en-US" sz="1400" dirty="0" err="1" smtClean="0"/>
+              <a:t>TargetObject</a:t>
+            </a:r>
+            <a:r>
+              <a:rPr lang="en-US" sz="1400" dirty="0" smtClean="0"/>
+              <a:t> name=</a:t>
+            </a:r>
+            <a:r>
+              <a:rPr lang="en-US" sz="1400" i="1" dirty="0" smtClean="0"/>
+              <a:t>"</a:t>
+            </a:r>
+            <a:r>
+              <a:rPr lang="en-US" sz="1400" i="1" dirty="0" err="1" smtClean="0"/>
+              <a:t>gov.nih.nci.cabio.domain.Gene</a:t>
+            </a:r>
+            <a:r>
+              <a:rPr lang="en-US" sz="1400" i="1" dirty="0" smtClean="0"/>
+              <a:t>"&gt;</a:t>
+            </a:r>
+          </a:p>
+          <a:p>
+            <a:pPr>
+              <a:buFontTx/>
+              <a:buNone/>
+            </a:pPr>
+            <a:r>
+              <a:rPr lang="en-US" sz="1400" dirty="0" smtClean="0"/>
+              <a:t>        &lt;Group </a:t>
+            </a:r>
+            <a:r>
+              <a:rPr lang="en-US" sz="1400" dirty="0" err="1" smtClean="0"/>
+              <a:t>logicRelation</a:t>
+            </a:r>
+            <a:r>
+              <a:rPr lang="en-US" sz="1400" dirty="0" smtClean="0"/>
+              <a:t>=</a:t>
+            </a:r>
+            <a:r>
+              <a:rPr lang="en-US" sz="1400" i="1" dirty="0" smtClean="0"/>
+              <a:t>"AND"&gt;</a:t>
+            </a:r>
+          </a:p>
+          <a:p>
+            <a:pPr>
+              <a:buFontTx/>
+              <a:buNone/>
+            </a:pPr>
+            <a:r>
+              <a:rPr lang="en-US" sz="1400" dirty="0" smtClean="0">
+                <a:solidFill>
+                  <a:srgbClr val="FF0000"/>
+                </a:solidFill>
+              </a:rPr>
+              <a:t>            &lt;</a:t>
+            </a:r>
+            <a:r>
+              <a:rPr lang="en-US" sz="1400" dirty="0" err="1" smtClean="0">
+                <a:solidFill>
+                  <a:srgbClr val="FF0000"/>
+                </a:solidFill>
+              </a:rPr>
+              <a:t>ForeignAssociation</a:t>
+            </a:r>
+            <a:r>
+              <a:rPr lang="en-US" sz="1400" dirty="0" smtClean="0">
+                <a:solidFill>
+                  <a:srgbClr val="FF0000"/>
+                </a:solidFill>
+              </a:rPr>
+              <a:t> </a:t>
+            </a:r>
+            <a:r>
+              <a:rPr lang="en-US" sz="1400" dirty="0" err="1" smtClean="0">
+                <a:solidFill>
+                  <a:srgbClr val="FF0000"/>
+                </a:solidFill>
+              </a:rPr>
+              <a:t>targetServiceURL</a:t>
+            </a:r>
+            <a:r>
+              <a:rPr lang="en-US" sz="1400" dirty="0" smtClean="0">
+                <a:solidFill>
+                  <a:srgbClr val="FF0000"/>
+                </a:solidFill>
+              </a:rPr>
+              <a:t>=</a:t>
+            </a:r>
+            <a:r>
+              <a:rPr lang="en-US" sz="1400" i="1" dirty="0" smtClean="0">
+                <a:solidFill>
+                  <a:srgbClr val="FF0000"/>
+                </a:solidFill>
+              </a:rPr>
+              <a:t>"http://cabio-gridservice.nci.nih.gov:80/wsrf-cabio/services/cagrid/CaBIOSvc"&gt;</a:t>
+            </a:r>
+          </a:p>
+          <a:p>
+            <a:pPr>
+              <a:buFontTx/>
+              <a:buNone/>
+            </a:pPr>
+            <a:r>
+              <a:rPr lang="en-US" sz="1400" dirty="0" smtClean="0">
+                <a:solidFill>
+                  <a:srgbClr val="008000"/>
+                </a:solidFill>
+              </a:rPr>
+              <a:t>                &lt;</a:t>
+            </a:r>
+            <a:r>
+              <a:rPr lang="en-US" sz="1400" dirty="0" err="1" smtClean="0">
+                <a:solidFill>
+                  <a:srgbClr val="008000"/>
+                </a:solidFill>
+              </a:rPr>
+              <a:t>JoinCondition</a:t>
+            </a:r>
+            <a:r>
+              <a:rPr lang="en-US" sz="1400" dirty="0" smtClean="0">
+                <a:solidFill>
+                  <a:srgbClr val="008000"/>
+                </a:solidFill>
+              </a:rPr>
+              <a:t> </a:t>
+            </a:r>
+            <a:r>
+              <a:rPr lang="en-US" sz="1400" dirty="0" err="1" smtClean="0">
+                <a:solidFill>
+                  <a:srgbClr val="008000"/>
+                </a:solidFill>
+              </a:rPr>
+              <a:t>localAttributeName</a:t>
+            </a:r>
+            <a:r>
+              <a:rPr lang="en-US" sz="1400" dirty="0" smtClean="0">
+                <a:solidFill>
+                  <a:srgbClr val="008000"/>
+                </a:solidFill>
+              </a:rPr>
+              <a:t>=</a:t>
+            </a:r>
+            <a:r>
+              <a:rPr lang="en-US" sz="1400" i="1" dirty="0" smtClean="0">
+                <a:solidFill>
+                  <a:srgbClr val="008000"/>
+                </a:solidFill>
+              </a:rPr>
+              <a:t>"</a:t>
+            </a:r>
+            <a:r>
+              <a:rPr lang="en-US" sz="1400" i="1" dirty="0" err="1" smtClean="0">
+                <a:solidFill>
+                  <a:srgbClr val="008000"/>
+                </a:solidFill>
+              </a:rPr>
+              <a:t>fullName</a:t>
+            </a:r>
+            <a:r>
+              <a:rPr lang="en-US" sz="1400" i="1" dirty="0" smtClean="0">
+                <a:solidFill>
+                  <a:srgbClr val="008000"/>
+                </a:solidFill>
+              </a:rPr>
+              <a:t>" </a:t>
+            </a:r>
+            <a:r>
+              <a:rPr lang="en-US" sz="1400" i="1" dirty="0" err="1" smtClean="0">
+                <a:solidFill>
+                  <a:srgbClr val="008000"/>
+                </a:solidFill>
+              </a:rPr>
+              <a:t>foreignAttributeName</a:t>
+            </a:r>
+            <a:r>
+              <a:rPr lang="en-US" sz="1400" i="1" dirty="0" smtClean="0">
+                <a:solidFill>
+                  <a:srgbClr val="008000"/>
+                </a:solidFill>
+              </a:rPr>
+              <a:t>="</a:t>
+            </a:r>
+            <a:r>
+              <a:rPr lang="en-US" sz="1400" i="1" dirty="0" err="1" smtClean="0">
+                <a:solidFill>
+                  <a:srgbClr val="008000"/>
+                </a:solidFill>
+              </a:rPr>
+              <a:t>fullName</a:t>
+            </a:r>
+            <a:r>
+              <a:rPr lang="en-US" sz="1400" i="1" dirty="0" smtClean="0">
+                <a:solidFill>
+                  <a:srgbClr val="008000"/>
+                </a:solidFill>
+              </a:rPr>
+              <a:t>" predicate="EQUAL_TO"/&gt;</a:t>
+            </a:r>
+          </a:p>
+          <a:p>
+            <a:pPr>
+              <a:buFontTx/>
+              <a:buNone/>
+            </a:pPr>
+            <a:r>
+              <a:rPr lang="en-US" sz="1400" dirty="0" smtClean="0">
+                <a:solidFill>
+                  <a:srgbClr val="0000FF"/>
+                </a:solidFill>
+              </a:rPr>
+              <a:t>                &lt;</a:t>
+            </a:r>
+            <a:r>
+              <a:rPr lang="en-US" sz="1400" dirty="0" err="1" smtClean="0">
+                <a:solidFill>
+                  <a:srgbClr val="0000FF"/>
+                </a:solidFill>
+              </a:rPr>
+              <a:t>ForeignObject</a:t>
+            </a:r>
+            <a:r>
+              <a:rPr lang="en-US" sz="1400" dirty="0" smtClean="0">
+                <a:solidFill>
+                  <a:srgbClr val="0000FF"/>
+                </a:solidFill>
+              </a:rPr>
+              <a:t> name=</a:t>
+            </a:r>
+            <a:r>
+              <a:rPr lang="en-US" sz="1400" i="1" dirty="0" smtClean="0">
+                <a:solidFill>
+                  <a:srgbClr val="0000FF"/>
+                </a:solidFill>
+              </a:rPr>
+              <a:t>"</a:t>
+            </a:r>
+            <a:r>
+              <a:rPr lang="en-US" sz="1400" i="1" dirty="0" err="1" smtClean="0">
+                <a:solidFill>
+                  <a:srgbClr val="0000FF"/>
+                </a:solidFill>
+              </a:rPr>
+              <a:t>gov.nih.nci.cabio.domain.Gene</a:t>
+            </a:r>
+            <a:r>
+              <a:rPr lang="en-US" sz="1400" i="1" dirty="0" smtClean="0">
+                <a:solidFill>
+                  <a:srgbClr val="0000FF"/>
+                </a:solidFill>
+              </a:rPr>
+              <a:t>"&gt;</a:t>
+            </a:r>
+          </a:p>
+          <a:p>
+            <a:pPr>
+              <a:buFontTx/>
+              <a:buNone/>
+            </a:pPr>
+            <a:r>
+              <a:rPr lang="en-US" sz="1400" dirty="0" smtClean="0">
+                <a:solidFill>
+                  <a:srgbClr val="0000FF"/>
+                </a:solidFill>
+              </a:rPr>
+              <a:t>                    &lt;Attribute name=</a:t>
+            </a:r>
+            <a:r>
+              <a:rPr lang="en-US" sz="1400" i="1" dirty="0" smtClean="0">
+                <a:solidFill>
+                  <a:srgbClr val="0000FF"/>
+                </a:solidFill>
+              </a:rPr>
+              <a:t>"</a:t>
+            </a:r>
+            <a:r>
+              <a:rPr lang="en-US" sz="1400" i="1" dirty="0" err="1" smtClean="0">
+                <a:solidFill>
+                  <a:srgbClr val="0000FF"/>
+                </a:solidFill>
+              </a:rPr>
+              <a:t>fullName</a:t>
+            </a:r>
+            <a:r>
+              <a:rPr lang="en-US" sz="1400" i="1" dirty="0" smtClean="0">
+                <a:solidFill>
+                  <a:srgbClr val="0000FF"/>
+                </a:solidFill>
+              </a:rPr>
+              <a:t>" value="BRCA%" predicate="LIKE"/&gt;</a:t>
+            </a:r>
+          </a:p>
+          <a:p>
+            <a:pPr>
+              <a:buFontTx/>
+              <a:buNone/>
+            </a:pPr>
+            <a:r>
+              <a:rPr lang="en-US" sz="1400" dirty="0" smtClean="0">
+                <a:solidFill>
+                  <a:srgbClr val="0000FF"/>
+                </a:solidFill>
+              </a:rPr>
+              <a:t>                &lt;/</a:t>
+            </a:r>
+            <a:r>
+              <a:rPr lang="en-US" sz="1400" dirty="0" err="1" smtClean="0">
+                <a:solidFill>
+                  <a:srgbClr val="0000FF"/>
+                </a:solidFill>
+              </a:rPr>
+              <a:t>ForeignObject</a:t>
+            </a:r>
+            <a:r>
+              <a:rPr lang="en-US" sz="1400" dirty="0" smtClean="0">
+                <a:solidFill>
+                  <a:srgbClr val="0000FF"/>
+                </a:solidFill>
+              </a:rPr>
+              <a:t>&gt;</a:t>
+            </a:r>
+          </a:p>
+          <a:p>
+            <a:pPr>
+              <a:buFontTx/>
+              <a:buNone/>
+            </a:pPr>
+            <a:r>
+              <a:rPr lang="en-US" sz="1400" dirty="0" smtClean="0">
+                <a:solidFill>
+                  <a:srgbClr val="FF0000"/>
+                </a:solidFill>
+              </a:rPr>
+              <a:t>            &lt;/</a:t>
+            </a:r>
+            <a:r>
+              <a:rPr lang="en-US" sz="1400" dirty="0" err="1" smtClean="0">
+                <a:solidFill>
+                  <a:srgbClr val="FF0000"/>
+                </a:solidFill>
+              </a:rPr>
+              <a:t>ForeignAssociation</a:t>
+            </a:r>
+            <a:r>
+              <a:rPr lang="en-US" sz="1400" dirty="0" smtClean="0">
+                <a:solidFill>
+                  <a:srgbClr val="FF0000"/>
+                </a:solidFill>
+              </a:rPr>
+              <a:t>&gt;</a:t>
+            </a:r>
+          </a:p>
+          <a:p>
+            <a:pPr>
+              <a:buFontTx/>
+              <a:buNone/>
+            </a:pPr>
+            <a:r>
+              <a:rPr lang="en-US" sz="1400" dirty="0" smtClean="0"/>
+              <a:t>            &lt;Attribute name=</a:t>
+            </a:r>
+            <a:r>
+              <a:rPr lang="en-US" sz="1400" i="1" dirty="0" smtClean="0"/>
+              <a:t>"</a:t>
+            </a:r>
+            <a:r>
+              <a:rPr lang="en-US" sz="1400" i="1" dirty="0" err="1" smtClean="0"/>
+              <a:t>fullName</a:t>
+            </a:r>
+            <a:r>
+              <a:rPr lang="en-US" sz="1400" i="1" dirty="0" smtClean="0"/>
+              <a:t>" value="BRCA%" predicate="LIKE"/&gt;</a:t>
+            </a:r>
+          </a:p>
+          <a:p>
+            <a:pPr>
+              <a:buFontTx/>
+              <a:buNone/>
+            </a:pPr>
+            <a:r>
+              <a:rPr lang="en-US" sz="1400" dirty="0" smtClean="0"/>
+              <a:t>        &lt;/Group&gt;</a:t>
+            </a:r>
+          </a:p>
+          <a:p>
+            <a:pPr>
+              <a:buFontTx/>
+              <a:buNone/>
+            </a:pPr>
+            <a:r>
+              <a:rPr lang="en-US" sz="1400" dirty="0" smtClean="0"/>
+              <a:t>    &lt;/</a:t>
+            </a:r>
+            <a:r>
+              <a:rPr lang="en-US" sz="1400" dirty="0" err="1" smtClean="0"/>
+              <a:t>TargetObject</a:t>
+            </a:r>
+            <a:r>
+              <a:rPr lang="en-US" sz="1400" dirty="0" smtClean="0"/>
+              <a:t>&gt;</a:t>
+            </a:r>
+          </a:p>
+          <a:p>
+            <a:pPr>
+              <a:buFontTx/>
+              <a:buNone/>
+            </a:pPr>
+            <a:r>
+              <a:rPr lang="en-US" sz="1400" dirty="0" smtClean="0"/>
+              <a:t>    &lt;</a:t>
+            </a:r>
+            <a:r>
+              <a:rPr lang="en-US" sz="1400" dirty="0" err="1" smtClean="0"/>
+              <a:t>targetServiceURL</a:t>
+            </a:r>
+            <a:r>
+              <a:rPr lang="en-US" sz="1400" dirty="0" smtClean="0"/>
+              <a:t>&gt;http://localhost:8080/wsrf/services/cagrid/CaBIO&lt;/targetServiceURL&gt;</a:t>
+            </a:r>
+          </a:p>
+          <a:p>
+            <a:pPr>
+              <a:buFontTx/>
+              <a:buNone/>
+            </a:pPr>
+            <a:r>
+              <a:rPr lang="en-US" sz="1400" dirty="0" smtClean="0"/>
+              <a:t>&lt;/</a:t>
+            </a:r>
+            <a:r>
+              <a:rPr lang="en-US" sz="1400" dirty="0" err="1" smtClean="0"/>
+              <a:t>DCQLQuery</a:t>
+            </a:r>
+            <a:r>
+              <a:rPr lang="en-US" sz="1400" dirty="0" smtClean="0"/>
+              <a:t>&gt;</a:t>
+            </a:r>
+          </a:p>
+        </p:txBody>
+      </p:sp>
+    </p:spTree>
+  </p:cSld>
+  <p:clrMapOvr>
+    <a:masterClrMapping/>
+  </p:clrMapOvr>
+  <p:timing>
+    <p:tnLst>
+      <p:par>
+        <p:cTn id="1" dur="indefinite" restart="never" nodeType="tmRoot"/>
+      </p:par>
+    </p:tnLst>
+  </p:timing>
 </p:sld>
 </file>
 

</xml_diff>

<commit_message>
better DCQL aggregation example
</commit_message>
<xml_diff>
--- a/Documentation/presentations/200906_Novartis/caGrid Data Services.pptx
+++ b/Documentation/presentations/200906_Novartis/caGrid Data Services.pptx
@@ -7404,7 +7404,7 @@
                         <a:tabLst/>
                       </a:pPr>
                       <a:r>
-                        <a:rPr kumimoji="0" lang="en-US" sz="1800" b="1" i="0" u="none" strike="noStrike" cap="none" normalizeH="0" baseline="0" smtClean="0">
+                        <a:rPr kumimoji="0" lang="en-US" sz="1800" b="1" i="0" u="none" strike="noStrike" cap="none" normalizeH="0" baseline="0" dirty="0" smtClean="0">
                           <a:ln>
                             <a:noFill/>
                           </a:ln>
@@ -7416,7 +7416,67 @@
                           <a:ea typeface="ヒラギノ角ゴ Pro W3" charset="-128"/>
                           <a:cs typeface="Times New Roman" charset="0"/>
                         </a:rPr>
-                        <a:t>Return all Genes with a symbol beginning with BRCA and have an associated Taxon with a scientificName equal to “Homo sapiens”:</a:t>
+                        <a:t>Return all Genes with a symbol beginning with BRCA and have an associated </a:t>
+                      </a:r>
+                      <a:r>
+                        <a:rPr kumimoji="0" lang="en-US" sz="1800" b="1" i="0" u="none" strike="noStrike" cap="none" normalizeH="0" baseline="0" dirty="0" err="1" smtClean="0">
+                          <a:ln>
+                            <a:noFill/>
+                          </a:ln>
+                          <a:solidFill>
+                            <a:schemeClr val="tx1"/>
+                          </a:solidFill>
+                          <a:effectLst/>
+                          <a:latin typeface="Arial" charset="0"/>
+                          <a:ea typeface="ヒラギノ角ゴ Pro W3" charset="-128"/>
+                          <a:cs typeface="Times New Roman" charset="0"/>
+                        </a:rPr>
+                        <a:t>Taxon</a:t>
+                      </a:r>
+                      <a:r>
+                        <a:rPr kumimoji="0" lang="en-US" sz="1800" b="1" i="0" u="none" strike="noStrike" cap="none" normalizeH="0" baseline="0" dirty="0" smtClean="0">
+                          <a:ln>
+                            <a:noFill/>
+                          </a:ln>
+                          <a:solidFill>
+                            <a:schemeClr val="tx1"/>
+                          </a:solidFill>
+                          <a:effectLst/>
+                          <a:latin typeface="Arial" charset="0"/>
+                          <a:ea typeface="ヒラギノ角ゴ Pro W3" charset="-128"/>
+                          <a:cs typeface="Times New Roman" charset="0"/>
+                        </a:rPr>
+                        <a:t> with a </a:t>
+                      </a:r>
+                      <a:r>
+                        <a:rPr kumimoji="0" lang="en-US" sz="1800" b="1" i="0" u="none" strike="noStrike" cap="none" normalizeH="0" baseline="0" dirty="0" err="1" smtClean="0">
+                          <a:ln>
+                            <a:noFill/>
+                          </a:ln>
+                          <a:solidFill>
+                            <a:schemeClr val="tx1"/>
+                          </a:solidFill>
+                          <a:effectLst/>
+                          <a:latin typeface="Arial" charset="0"/>
+                          <a:ea typeface="ヒラギノ角ゴ Pro W3" charset="-128"/>
+                          <a:cs typeface="Times New Roman" charset="0"/>
+                        </a:rPr>
+                        <a:t>scientificName</a:t>
+                      </a:r>
+                      <a:r>
+                        <a:rPr kumimoji="0" lang="en-US" sz="1800" b="1" i="0" u="none" strike="noStrike" cap="none" normalizeH="0" baseline="0" dirty="0" smtClean="0">
+                          <a:ln>
+                            <a:noFill/>
+                          </a:ln>
+                          <a:solidFill>
+                            <a:schemeClr val="tx1"/>
+                          </a:solidFill>
+                          <a:effectLst/>
+                          <a:latin typeface="Arial" charset="0"/>
+                          <a:ea typeface="ヒラギノ角ゴ Pro W3" charset="-128"/>
+                          <a:cs typeface="Times New Roman" charset="0"/>
+                        </a:rPr>
+                        <a:t> equal to “Homo sapiens”:</a:t>
                       </a:r>
                     </a:p>
                   </a:txBody>
@@ -7490,7 +7550,7 @@
                         <a:tabLst/>
                       </a:pPr>
                       <a:r>
-                        <a:rPr kumimoji="0" lang="en-US" sz="1400" b="0" i="0" u="none" strike="noStrike" cap="none" normalizeH="0" baseline="0" smtClean="0">
+                        <a:rPr kumimoji="0" lang="en-US" sz="1400" b="0" i="0" u="none" strike="noStrike" cap="none" normalizeH="0" baseline="0" dirty="0" smtClean="0">
                           <a:ln>
                             <a:noFill/>
                           </a:ln>
@@ -7501,7 +7561,63 @@
                           <a:latin typeface="Arial Narrow" charset="0"/>
                           <a:ea typeface="ヒラギノ角ゴ Pro W3" charset="-128"/>
                         </a:rPr>
-                        <a:t>&lt;CQLQuery xmlns="http://CQL.caBIG/1/gov.nih.nci.cagrid.CQLQuery"&gt;</a:t>
+                        <a:t>&lt;</a:t>
+                      </a:r>
+                      <a:r>
+                        <a:rPr kumimoji="0" lang="en-US" sz="1400" b="0" i="0" u="none" strike="noStrike" cap="none" normalizeH="0" baseline="0" dirty="0" err="1" smtClean="0">
+                          <a:ln>
+                            <a:noFill/>
+                          </a:ln>
+                          <a:solidFill>
+                            <a:schemeClr val="tx1"/>
+                          </a:solidFill>
+                          <a:effectLst/>
+                          <a:latin typeface="Arial Narrow" charset="0"/>
+                          <a:ea typeface="ヒラギノ角ゴ Pro W3" charset="-128"/>
+                        </a:rPr>
+                        <a:t>CQLQuery</a:t>
+                      </a:r>
+                      <a:r>
+                        <a:rPr kumimoji="0" lang="en-US" sz="1400" b="0" i="0" u="none" strike="noStrike" cap="none" normalizeH="0" baseline="0" dirty="0" smtClean="0">
+                          <a:ln>
+                            <a:noFill/>
+                          </a:ln>
+                          <a:solidFill>
+                            <a:schemeClr val="tx1"/>
+                          </a:solidFill>
+                          <a:effectLst/>
+                          <a:latin typeface="Arial Narrow" charset="0"/>
+                          <a:ea typeface="ヒラギノ角ゴ Pro W3" charset="-128"/>
+                        </a:rPr>
+                        <a:t> </a:t>
+                      </a:r>
+                      <a:r>
+                        <a:rPr kumimoji="0" lang="en-US" sz="1400" b="0" i="0" u="none" strike="noStrike" cap="none" normalizeH="0" baseline="0" dirty="0" err="1" smtClean="0">
+                          <a:ln>
+                            <a:noFill/>
+                          </a:ln>
+                          <a:solidFill>
+                            <a:schemeClr val="tx1"/>
+                          </a:solidFill>
+                          <a:effectLst/>
+                          <a:latin typeface="Arial Narrow" charset="0"/>
+                          <a:ea typeface="ヒラギノ角ゴ Pro W3" charset="-128"/>
+                        </a:rPr>
+                        <a:t>xmlns</a:t>
+                      </a:r>
+                      <a:r>
+                        <a:rPr kumimoji="0" lang="en-US" sz="1400" b="0" i="0" u="none" strike="noStrike" cap="none" normalizeH="0" baseline="0" dirty="0" smtClean="0">
+                          <a:ln>
+                            <a:noFill/>
+                          </a:ln>
+                          <a:solidFill>
+                            <a:schemeClr val="tx1"/>
+                          </a:solidFill>
+                          <a:effectLst/>
+                          <a:latin typeface="Arial Narrow" charset="0"/>
+                          <a:ea typeface="ヒラギノ角ゴ Pro W3" charset="-128"/>
+                        </a:rPr>
+                        <a:t>="http://CQL.caBIG/1/gov.nih.nci.cagrid.CQLQuery"&gt;</a:t>
                       </a:r>
                     </a:p>
                     <a:p>
@@ -7522,7 +7638,7 @@
                         <a:tabLst/>
                       </a:pPr>
                       <a:r>
-                        <a:rPr kumimoji="0" lang="en-US" sz="1400" b="0" i="0" u="none" strike="noStrike" cap="none" normalizeH="0" baseline="0" smtClean="0">
+                        <a:rPr kumimoji="0" lang="en-US" sz="1400" b="0" i="0" u="none" strike="noStrike" cap="none" normalizeH="0" baseline="0" dirty="0" smtClean="0">
                           <a:ln>
                             <a:noFill/>
                           </a:ln>
@@ -7533,7 +7649,35 @@
                           <a:latin typeface="Arial Narrow" charset="0"/>
                           <a:ea typeface="ヒラギノ角ゴ Pro W3" charset="-128"/>
                         </a:rPr>
-                        <a:t>  &lt;Target name="gov.nih.nci.cabio.domain.Gene"&gt;</a:t>
+                        <a:t>  &lt;Target name="</a:t>
+                      </a:r>
+                      <a:r>
+                        <a:rPr kumimoji="0" lang="en-US" sz="1400" b="0" i="0" u="none" strike="noStrike" cap="none" normalizeH="0" baseline="0" dirty="0" err="1" smtClean="0">
+                          <a:ln>
+                            <a:noFill/>
+                          </a:ln>
+                          <a:solidFill>
+                            <a:srgbClr val="FF0000"/>
+                          </a:solidFill>
+                          <a:effectLst/>
+                          <a:latin typeface="Arial Narrow" charset="0"/>
+                          <a:ea typeface="ヒラギノ角ゴ Pro W3" charset="-128"/>
+                        </a:rPr>
+                        <a:t>gov.nih.nci.cabio.domain.Gene</a:t>
+                      </a:r>
+                      <a:r>
+                        <a:rPr kumimoji="0" lang="en-US" sz="1400" b="0" i="0" u="none" strike="noStrike" cap="none" normalizeH="0" baseline="0" dirty="0" smtClean="0">
+                          <a:ln>
+                            <a:noFill/>
+                          </a:ln>
+                          <a:solidFill>
+                            <a:srgbClr val="FF0000"/>
+                          </a:solidFill>
+                          <a:effectLst/>
+                          <a:latin typeface="Arial Narrow" charset="0"/>
+                          <a:ea typeface="ヒラギノ角ゴ Pro W3" charset="-128"/>
+                        </a:rPr>
+                        <a:t>"&gt;</a:t>
                       </a:r>
                     </a:p>
                     <a:p>
@@ -7554,7 +7698,7 @@
                         <a:tabLst/>
                       </a:pPr>
                       <a:r>
-                        <a:rPr kumimoji="0" lang="en-US" sz="1400" b="0" i="0" u="none" strike="noStrike" cap="none" normalizeH="0" baseline="0" smtClean="0">
+                        <a:rPr kumimoji="0" lang="en-US" sz="1400" b="0" i="0" u="none" strike="noStrike" cap="none" normalizeH="0" baseline="0" dirty="0" smtClean="0">
                           <a:ln>
                             <a:noFill/>
                           </a:ln>
@@ -7565,7 +7709,35 @@
                           <a:latin typeface="Arial Narrow" charset="0"/>
                           <a:ea typeface="ヒラギノ角ゴ Pro W3" charset="-128"/>
                         </a:rPr>
-                        <a:t>    &lt;Group logicRelation="AND"&gt;</a:t>
+                        <a:t>    &lt;Group </a:t>
+                      </a:r>
+                      <a:r>
+                        <a:rPr kumimoji="0" lang="en-US" sz="1400" b="0" i="0" u="none" strike="noStrike" cap="none" normalizeH="0" baseline="0" dirty="0" err="1" smtClean="0">
+                          <a:ln>
+                            <a:noFill/>
+                          </a:ln>
+                          <a:solidFill>
+                            <a:schemeClr val="tx1"/>
+                          </a:solidFill>
+                          <a:effectLst/>
+                          <a:latin typeface="Arial Narrow" charset="0"/>
+                          <a:ea typeface="ヒラギノ角ゴ Pro W3" charset="-128"/>
+                        </a:rPr>
+                        <a:t>logicRelation</a:t>
+                      </a:r>
+                      <a:r>
+                        <a:rPr kumimoji="0" lang="en-US" sz="1400" b="0" i="0" u="none" strike="noStrike" cap="none" normalizeH="0" baseline="0" dirty="0" smtClean="0">
+                          <a:ln>
+                            <a:noFill/>
+                          </a:ln>
+                          <a:solidFill>
+                            <a:schemeClr val="tx1"/>
+                          </a:solidFill>
+                          <a:effectLst/>
+                          <a:latin typeface="Arial Narrow" charset="0"/>
+                          <a:ea typeface="ヒラギノ角ゴ Pro W3" charset="-128"/>
+                        </a:rPr>
+                        <a:t>="AND"&gt;</a:t>
                       </a:r>
                     </a:p>
                     <a:p>
@@ -7586,7 +7758,7 @@
                         <a:tabLst/>
                       </a:pPr>
                       <a:r>
-                        <a:rPr kumimoji="0" lang="en-US" sz="1400" b="0" i="0" u="none" strike="noStrike" cap="none" normalizeH="0" baseline="0" smtClean="0">
+                        <a:rPr kumimoji="0" lang="en-US" sz="1400" b="0" i="0" u="none" strike="noStrike" cap="none" normalizeH="0" baseline="0" dirty="0" smtClean="0">
                           <a:ln>
                             <a:noFill/>
                           </a:ln>
@@ -7600,7 +7772,7 @@
                         <a:t>      </a:t>
                       </a:r>
                       <a:r>
-                        <a:rPr kumimoji="0" lang="en-US" sz="1400" b="0" i="0" u="none" strike="noStrike" cap="none" normalizeH="0" baseline="0" smtClean="0">
+                        <a:rPr kumimoji="0" lang="en-US" sz="1400" b="0" i="0" u="none" strike="noStrike" cap="none" normalizeH="0" baseline="0" dirty="0" smtClean="0">
                           <a:ln>
                             <a:noFill/>
                           </a:ln>
@@ -7632,7 +7804,7 @@
                         <a:tabLst/>
                       </a:pPr>
                       <a:r>
-                        <a:rPr kumimoji="0" lang="en-US" sz="1400" b="0" i="0" u="none" strike="noStrike" cap="none" normalizeH="0" baseline="0" smtClean="0">
+                        <a:rPr kumimoji="0" lang="en-US" sz="1400" b="0" i="0" u="none" strike="noStrike" cap="none" normalizeH="0" baseline="0" dirty="0" smtClean="0">
                           <a:ln>
                             <a:noFill/>
                           </a:ln>
@@ -7646,7 +7818,7 @@
                         <a:t>        </a:t>
                       </a:r>
                       <a:r>
-                        <a:rPr kumimoji="0" lang="en-US" sz="1400" b="0" i="0" u="none" strike="noStrike" cap="none" normalizeH="0" baseline="0" smtClean="0">
+                        <a:rPr kumimoji="0" lang="en-US" sz="1400" b="0" i="0" u="none" strike="noStrike" cap="none" normalizeH="0" baseline="0" dirty="0" smtClean="0">
                           <a:ln>
                             <a:noFill/>
                           </a:ln>
@@ -7657,7 +7829,91 @@
                           <a:latin typeface="Arial Narrow" charset="0"/>
                           <a:ea typeface="ヒラギノ角ゴ Pro W3" charset="-128"/>
                         </a:rPr>
-                        <a:t>&lt;Association roleName="taxon“  name="gov.nih.nci.cabio.domain.Taxon"&gt;</a:t>
+                        <a:t>&lt;Association </a:t>
+                      </a:r>
+                      <a:r>
+                        <a:rPr kumimoji="0" lang="en-US" sz="1400" b="0" i="0" u="none" strike="noStrike" cap="none" normalizeH="0" baseline="0" dirty="0" err="1" smtClean="0">
+                          <a:ln>
+                            <a:noFill/>
+                          </a:ln>
+                          <a:solidFill>
+                            <a:schemeClr val="hlink"/>
+                          </a:solidFill>
+                          <a:effectLst/>
+                          <a:latin typeface="Arial Narrow" charset="0"/>
+                          <a:ea typeface="ヒラギノ角ゴ Pro W3" charset="-128"/>
+                        </a:rPr>
+                        <a:t>roleName</a:t>
+                      </a:r>
+                      <a:r>
+                        <a:rPr kumimoji="0" lang="en-US" sz="1400" b="0" i="0" u="none" strike="noStrike" cap="none" normalizeH="0" baseline="0" dirty="0" smtClean="0">
+                          <a:ln>
+                            <a:noFill/>
+                          </a:ln>
+                          <a:solidFill>
+                            <a:schemeClr val="hlink"/>
+                          </a:solidFill>
+                          <a:effectLst/>
+                          <a:latin typeface="Arial Narrow" charset="0"/>
+                          <a:ea typeface="ヒラギノ角ゴ Pro W3" charset="-128"/>
+                        </a:rPr>
+                        <a:t>="</a:t>
+                      </a:r>
+                      <a:r>
+                        <a:rPr kumimoji="0" lang="en-US" sz="1400" b="0" i="0" u="none" strike="noStrike" cap="none" normalizeH="0" baseline="0" dirty="0" err="1" smtClean="0">
+                          <a:ln>
+                            <a:noFill/>
+                          </a:ln>
+                          <a:solidFill>
+                            <a:schemeClr val="hlink"/>
+                          </a:solidFill>
+                          <a:effectLst/>
+                          <a:latin typeface="Arial Narrow" charset="0"/>
+                          <a:ea typeface="ヒラギノ角ゴ Pro W3" charset="-128"/>
+                        </a:rPr>
+                        <a:t>taxon</a:t>
+                      </a:r>
+                      <a:r>
+                        <a:rPr kumimoji="0" lang="en-US" sz="1400" b="0" i="0" u="none" strike="noStrike" cap="none" normalizeH="0" baseline="0" dirty="0" smtClean="0">
+                          <a:ln>
+                            <a:noFill/>
+                          </a:ln>
+                          <a:solidFill>
+                            <a:schemeClr val="hlink"/>
+                          </a:solidFill>
+                          <a:effectLst/>
+                          <a:latin typeface="Arial Narrow" charset="0"/>
+                          <a:ea typeface="ヒラギノ角ゴ Pro W3" charset="-128"/>
+                        </a:rPr>
+                        <a:t>“  name="</a:t>
+                      </a:r>
+                      <a:r>
+                        <a:rPr kumimoji="0" lang="en-US" sz="1400" b="0" i="0" u="none" strike="noStrike" cap="none" normalizeH="0" baseline="0" dirty="0" err="1" smtClean="0">
+                          <a:ln>
+                            <a:noFill/>
+                          </a:ln>
+                          <a:solidFill>
+                            <a:schemeClr val="hlink"/>
+                          </a:solidFill>
+                          <a:effectLst/>
+                          <a:latin typeface="Arial Narrow" charset="0"/>
+                          <a:ea typeface="ヒラギノ角ゴ Pro W3" charset="-128"/>
+                        </a:rPr>
+                        <a:t>gov.nih.nci.cabio.domain.Taxon</a:t>
+                      </a:r>
+                      <a:r>
+                        <a:rPr kumimoji="0" lang="en-US" sz="1400" b="0" i="0" u="none" strike="noStrike" cap="none" normalizeH="0" baseline="0" dirty="0" smtClean="0">
+                          <a:ln>
+                            <a:noFill/>
+                          </a:ln>
+                          <a:solidFill>
+                            <a:schemeClr val="hlink"/>
+                          </a:solidFill>
+                          <a:effectLst/>
+                          <a:latin typeface="Arial Narrow" charset="0"/>
+                          <a:ea typeface="ヒラギノ角ゴ Pro W3" charset="-128"/>
+                        </a:rPr>
+                        <a:t>"&gt;</a:t>
                       </a:r>
                     </a:p>
                     <a:p>
@@ -7678,7 +7934,7 @@
                         <a:tabLst/>
                       </a:pPr>
                       <a:r>
-                        <a:rPr kumimoji="0" lang="en-US" sz="1400" b="0" i="0" u="none" strike="noStrike" cap="none" normalizeH="0" baseline="0" smtClean="0">
+                        <a:rPr kumimoji="0" lang="en-US" sz="1400" b="0" i="0" u="none" strike="noStrike" cap="none" normalizeH="0" baseline="0" dirty="0" smtClean="0">
                           <a:ln>
                             <a:noFill/>
                           </a:ln>
@@ -7692,7 +7948,7 @@
                         <a:t>          </a:t>
                       </a:r>
                       <a:r>
-                        <a:rPr kumimoji="0" lang="en-US" sz="1400" b="0" i="0" u="none" strike="noStrike" cap="none" normalizeH="0" baseline="0" smtClean="0">
+                        <a:rPr kumimoji="0" lang="en-US" sz="1400" b="0" i="0" u="none" strike="noStrike" cap="none" normalizeH="0" baseline="0" dirty="0" smtClean="0">
                           <a:ln>
                             <a:noFill/>
                           </a:ln>
@@ -7706,7 +7962,7 @@
                         <a:t>&lt;Attribute name=“</a:t>
                       </a:r>
                       <a:r>
-                        <a:rPr kumimoji="0" lang="en-US" sz="1400" b="1" i="0" u="none" strike="noStrike" cap="none" normalizeH="0" baseline="0" smtClean="0">
+                        <a:rPr kumimoji="0" lang="en-US" sz="1400" b="1" i="0" u="none" strike="noStrike" cap="none" normalizeH="0" baseline="0" dirty="0" err="1" smtClean="0">
                           <a:ln>
                             <a:noFill/>
                           </a:ln>
@@ -7720,7 +7976,7 @@
                         <a:t>scientificName</a:t>
                       </a:r>
                       <a:r>
-                        <a:rPr kumimoji="0" lang="en-US" sz="1400" b="0" i="0" u="none" strike="noStrike" cap="none" normalizeH="0" baseline="0" smtClean="0">
+                        <a:rPr kumimoji="0" lang="en-US" sz="1400" b="0" i="0" u="none" strike="noStrike" cap="none" normalizeH="0" baseline="0" dirty="0" smtClean="0">
                           <a:ln>
                             <a:noFill/>
                           </a:ln>
@@ -7734,7 +7990,7 @@
                         <a:t>" predicate=“</a:t>
                       </a:r>
                       <a:r>
-                        <a:rPr kumimoji="0" lang="en-US" sz="1400" b="1" i="0" u="none" strike="noStrike" cap="none" normalizeH="0" baseline="0" smtClean="0">
+                        <a:rPr kumimoji="0" lang="en-US" sz="1400" b="1" i="0" u="none" strike="noStrike" cap="none" normalizeH="0" baseline="0" dirty="0" smtClean="0">
                           <a:ln>
                             <a:noFill/>
                           </a:ln>
@@ -7748,7 +8004,7 @@
                         <a:t>EQUAL_TO</a:t>
                       </a:r>
                       <a:r>
-                        <a:rPr kumimoji="0" lang="en-US" sz="1400" b="0" i="0" u="none" strike="noStrike" cap="none" normalizeH="0" baseline="0" smtClean="0">
+                        <a:rPr kumimoji="0" lang="en-US" sz="1400" b="0" i="0" u="none" strike="noStrike" cap="none" normalizeH="0" baseline="0" dirty="0" smtClean="0">
                           <a:ln>
                             <a:noFill/>
                           </a:ln>
@@ -7762,7 +8018,7 @@
                         <a:t>” value=“</a:t>
                       </a:r>
                       <a:r>
-                        <a:rPr kumimoji="0" lang="en-US" sz="1400" b="1" i="0" u="none" strike="noStrike" cap="none" normalizeH="0" baseline="0" smtClean="0">
+                        <a:rPr kumimoji="0" lang="en-US" sz="1400" b="1" i="0" u="none" strike="noStrike" cap="none" normalizeH="0" baseline="0" dirty="0" smtClean="0">
                           <a:ln>
                             <a:noFill/>
                           </a:ln>
@@ -7776,7 +8032,7 @@
                         <a:t>Homo sapiens</a:t>
                       </a:r>
                       <a:r>
-                        <a:rPr kumimoji="0" lang="en-US" sz="1400" b="0" i="0" u="none" strike="noStrike" cap="none" normalizeH="0" baseline="0" smtClean="0">
+                        <a:rPr kumimoji="0" lang="en-US" sz="1400" b="0" i="0" u="none" strike="noStrike" cap="none" normalizeH="0" baseline="0" dirty="0" smtClean="0">
                           <a:ln>
                             <a:noFill/>
                           </a:ln>
@@ -7808,7 +8064,7 @@
                         <a:tabLst/>
                       </a:pPr>
                       <a:r>
-                        <a:rPr kumimoji="0" lang="en-US" sz="1400" b="0" i="0" u="none" strike="noStrike" cap="none" normalizeH="0" baseline="0" smtClean="0">
+                        <a:rPr kumimoji="0" lang="en-US" sz="1400" b="0" i="0" u="none" strike="noStrike" cap="none" normalizeH="0" baseline="0" dirty="0" smtClean="0">
                           <a:ln>
                             <a:noFill/>
                           </a:ln>
@@ -7840,7 +8096,7 @@
                         <a:tabLst/>
                       </a:pPr>
                       <a:r>
-                        <a:rPr kumimoji="0" lang="en-US" sz="1400" b="0" i="0" u="none" strike="noStrike" cap="none" normalizeH="0" baseline="0" smtClean="0">
+                        <a:rPr kumimoji="0" lang="en-US" sz="1400" b="0" i="0" u="none" strike="noStrike" cap="none" normalizeH="0" baseline="0" dirty="0" smtClean="0">
                           <a:ln>
                             <a:noFill/>
                           </a:ln>
@@ -7872,7 +8128,7 @@
                         <a:tabLst/>
                       </a:pPr>
                       <a:r>
-                        <a:rPr kumimoji="0" lang="en-US" sz="1400" b="0" i="0" u="none" strike="noStrike" cap="none" normalizeH="0" baseline="0" smtClean="0">
+                        <a:rPr kumimoji="0" lang="en-US" sz="1400" b="0" i="0" u="none" strike="noStrike" cap="none" normalizeH="0" baseline="0" dirty="0" smtClean="0">
                           <a:ln>
                             <a:noFill/>
                           </a:ln>
@@ -7904,7 +8160,7 @@
                         <a:tabLst/>
                       </a:pPr>
                       <a:r>
-                        <a:rPr kumimoji="0" lang="en-US" sz="1400" b="0" i="0" u="none" strike="noStrike" cap="none" normalizeH="0" baseline="0" smtClean="0">
+                        <a:rPr kumimoji="0" lang="en-US" sz="1400" b="0" i="0" u="none" strike="noStrike" cap="none" normalizeH="0" baseline="0" dirty="0" smtClean="0">
                           <a:ln>
                             <a:noFill/>
                           </a:ln>
@@ -7915,7 +8171,35 @@
                           <a:latin typeface="Arial Narrow" charset="0"/>
                           <a:ea typeface="ヒラギノ角ゴ Pro W3" charset="-128"/>
                         </a:rPr>
-                        <a:t>&lt;/CQLQuery&gt;</a:t>
+                        <a:t>&lt;/</a:t>
+                      </a:r>
+                      <a:r>
+                        <a:rPr kumimoji="0" lang="en-US" sz="1400" b="0" i="0" u="none" strike="noStrike" cap="none" normalizeH="0" baseline="0" dirty="0" err="1" smtClean="0">
+                          <a:ln>
+                            <a:noFill/>
+                          </a:ln>
+                          <a:solidFill>
+                            <a:schemeClr val="tx1"/>
+                          </a:solidFill>
+                          <a:effectLst/>
+                          <a:latin typeface="Arial Narrow" charset="0"/>
+                          <a:ea typeface="ヒラギノ角ゴ Pro W3" charset="-128"/>
+                        </a:rPr>
+                        <a:t>CQLQuery</a:t>
+                      </a:r>
+                      <a:r>
+                        <a:rPr kumimoji="0" lang="en-US" sz="1400" b="0" i="0" u="none" strike="noStrike" cap="none" normalizeH="0" baseline="0" dirty="0" smtClean="0">
+                          <a:ln>
+                            <a:noFill/>
+                          </a:ln>
+                          <a:solidFill>
+                            <a:schemeClr val="tx1"/>
+                          </a:solidFill>
+                          <a:effectLst/>
+                          <a:latin typeface="Arial Narrow" charset="0"/>
+                          <a:ea typeface="ヒラギノ角ゴ Pro W3" charset="-128"/>
+                        </a:rPr>
+                        <a:t>&gt;</a:t>
                       </a:r>
                     </a:p>
                   </a:txBody>
@@ -8770,9 +9054,6 @@
               </a:rPr>
               <a:t> objects or XML text</a:t>
             </a:r>
-            <a:endParaRPr lang="en-US" sz="2000" kern="0" dirty="0" smtClean="0">
-              <a:latin typeface="+mn-lt"/>
-            </a:endParaRPr>
           </a:p>
           <a:p>
             <a:pPr marL="800100" lvl="1" indent="-342900">
@@ -9478,11 +9759,7 @@
             </a:pPr>
             <a:r>
               <a:rPr lang="en-US" sz="2000" kern="0" dirty="0" smtClean="0"/>
-              <a:t>Basic distributed joins and </a:t>
-            </a:r>
-            <a:r>
-              <a:rPr lang="en-US" sz="2000" kern="0" dirty="0" smtClean="0"/>
-              <a:t>aggregations</a:t>
+              <a:t>Basic distributed joins and aggregations</a:t>
             </a:r>
             <a:endParaRPr lang="en-US" sz="2000" b="1" kern="0" dirty="0" smtClean="0">
               <a:latin typeface="+mn-lt"/>
@@ -10018,527 +10295,660 @@
           <a:p>
             <a:pPr eaLnBrk="1" hangingPunct="1"/>
             <a:r>
-              <a:rPr lang="en-US" smtClean="0"/>
-              <a:t>DCQL Example</a:t>
-            </a:r>
+              <a:rPr lang="en-US" dirty="0" smtClean="0"/>
+              <a:t>DCQL </a:t>
+            </a:r>
+            <a:r>
+              <a:rPr lang="en-US" dirty="0" smtClean="0"/>
+              <a:t>Aggregation Example</a:t>
+            </a:r>
+            <a:endParaRPr lang="en-US" dirty="0" smtClean="0"/>
           </a:p>
         </p:txBody>
       </p:sp>
       <p:sp>
         <p:nvSpPr>
-          <p:cNvPr id="59395" name="Rectangle 3"/>
-          <p:cNvSpPr>
-            <a:spLocks noGrp="1" noChangeArrowheads="1"/>
+          <p:cNvPr id="4" name="Content Placeholder 2"/>
+          <p:cNvSpPr txBox="1">
+            <a:spLocks/>
           </p:cNvSpPr>
-          <p:nvPr>
-            <p:ph idx="1"/>
-          </p:nvPr>
+          <p:nvPr/>
+        </p:nvSpPr>
+        <p:spPr bwMode="auto">
+          <a:xfrm>
+            <a:off x="228600" y="1219200"/>
+            <a:ext cx="8458200" cy="3200400"/>
+          </a:xfrm>
+          <a:prstGeom prst="rect">
+            <a:avLst/>
+          </a:prstGeom>
+          <a:noFill/>
+          <a:ln w="9525">
+            <a:noFill/>
+            <a:miter lim="800000"/>
+            <a:headEnd/>
+            <a:tailEnd/>
+          </a:ln>
+          <a:effectLst/>
+        </p:spPr>
+        <p:txBody>
+          <a:bodyPr vert="horz" wrap="square" lIns="91440" tIns="45720" rIns="91440" bIns="45720" numCol="1" anchor="t" anchorCtr="0" compatLnSpc="1">
+            <a:prstTxWarp prst="textNoShape">
+              <a:avLst/>
+            </a:prstTxWarp>
+          </a:bodyPr>
+          <a:lstStyle/>
+          <a:p>
+            <a:pPr marL="342900" indent="-342900">
+              <a:spcBef>
+                <a:spcPct val="20000"/>
+              </a:spcBef>
+              <a:buClr>
+                <a:srgbClr val="00AAF6"/>
+              </a:buClr>
+              <a:buFontTx/>
+              <a:buChar char="•"/>
+              <a:defRPr/>
+            </a:pPr>
+            <a:r>
+              <a:rPr lang="en-US" sz="2000" b="1" kern="0" dirty="0" smtClean="0"/>
+              <a:t>Aggregate data from multiple sources</a:t>
+            </a:r>
+          </a:p>
+          <a:p>
+            <a:pPr marL="800100" lvl="1" indent="-342900">
+              <a:spcBef>
+                <a:spcPct val="20000"/>
+              </a:spcBef>
+              <a:buClr>
+                <a:srgbClr val="00AAF6"/>
+              </a:buClr>
+              <a:buFontTx/>
+              <a:buChar char="•"/>
+              <a:defRPr/>
+            </a:pPr>
+            <a:r>
+              <a:rPr lang="en-US" sz="2000" kern="0" dirty="0" smtClean="0"/>
+              <a:t>Simultaneous query execution up to thread pool size</a:t>
+            </a:r>
+          </a:p>
+          <a:p>
+            <a:pPr marL="342900" indent="-342900">
+              <a:spcBef>
+                <a:spcPct val="20000"/>
+              </a:spcBef>
+              <a:buClr>
+                <a:srgbClr val="00AAF6"/>
+              </a:buClr>
+              <a:buFontTx/>
+              <a:buChar char="•"/>
+              <a:defRPr/>
+            </a:pPr>
+            <a:r>
+              <a:rPr lang="en-US" sz="2000" b="1" kern="0" dirty="0" smtClean="0"/>
+              <a:t>Example query</a:t>
+            </a:r>
+          </a:p>
+          <a:p>
+            <a:pPr marL="800100" lvl="1" indent="-342900">
+              <a:spcBef>
+                <a:spcPct val="20000"/>
+              </a:spcBef>
+              <a:buClr>
+                <a:srgbClr val="00AAF6"/>
+              </a:buClr>
+              <a:buFontTx/>
+              <a:buChar char="•"/>
+              <a:defRPr/>
+            </a:pPr>
+            <a:r>
+              <a:rPr lang="en-US" sz="2000" kern="0" dirty="0" smtClean="0"/>
+              <a:t>Return </a:t>
+            </a:r>
+            <a:r>
+              <a:rPr lang="en-US" sz="2000" dirty="0" smtClean="0">
+                <a:solidFill>
+                  <a:srgbClr val="C00000"/>
+                </a:solidFill>
+              </a:rPr>
+              <a:t>instances</a:t>
+            </a:r>
+            <a:r>
+              <a:rPr lang="en-US" sz="2000" dirty="0" smtClean="0"/>
+              <a:t> </a:t>
+            </a:r>
+            <a:r>
+              <a:rPr lang="en-US" sz="2000" dirty="0" smtClean="0"/>
+              <a:t>of the </a:t>
+            </a:r>
+            <a:r>
+              <a:rPr lang="en-US" sz="2000" i="1" dirty="0" smtClean="0"/>
+              <a:t>gene </a:t>
+            </a:r>
+            <a:r>
+              <a:rPr lang="en-US" sz="2000" dirty="0" smtClean="0"/>
+              <a:t>data type</a:t>
+            </a:r>
+          </a:p>
+          <a:p>
+            <a:pPr marL="800100" lvl="1" indent="-342900">
+              <a:spcBef>
+                <a:spcPct val="20000"/>
+              </a:spcBef>
+              <a:buClr>
+                <a:srgbClr val="00AAF6"/>
+              </a:buClr>
+              <a:buFontTx/>
+              <a:buChar char="•"/>
+              <a:defRPr/>
+            </a:pPr>
+            <a:r>
+              <a:rPr lang="en-US" sz="2000" dirty="0" smtClean="0"/>
+              <a:t>Each </a:t>
+            </a:r>
+            <a:r>
+              <a:rPr lang="en-US" sz="2000" dirty="0" smtClean="0"/>
+              <a:t>gene must have an </a:t>
+            </a:r>
+            <a:r>
+              <a:rPr lang="en-US" sz="2000" dirty="0" smtClean="0">
+                <a:solidFill>
+                  <a:srgbClr val="00B050"/>
+                </a:solidFill>
+              </a:rPr>
+              <a:t>association</a:t>
+            </a:r>
+            <a:r>
+              <a:rPr lang="en-US" sz="2000" dirty="0" smtClean="0"/>
+              <a:t> to an instance of the </a:t>
+            </a:r>
+            <a:r>
+              <a:rPr lang="en-US" sz="2000" i="1" dirty="0" smtClean="0"/>
+              <a:t>term </a:t>
+            </a:r>
+            <a:r>
+              <a:rPr lang="en-US" sz="2000" dirty="0" smtClean="0"/>
+              <a:t>data </a:t>
+            </a:r>
+            <a:r>
+              <a:rPr lang="en-US" sz="2000" dirty="0" smtClean="0"/>
+              <a:t>type via the role name </a:t>
+            </a:r>
+            <a:r>
+              <a:rPr lang="en-US" sz="2000" i="1" dirty="0" smtClean="0"/>
+              <a:t>terms</a:t>
+            </a:r>
+          </a:p>
+          <a:p>
+            <a:pPr marL="800100" lvl="1" indent="-342900">
+              <a:spcBef>
+                <a:spcPct val="20000"/>
+              </a:spcBef>
+              <a:buClr>
+                <a:srgbClr val="00AAF6"/>
+              </a:buClr>
+              <a:buFontTx/>
+              <a:buChar char="•"/>
+              <a:defRPr/>
+            </a:pPr>
+            <a:r>
+              <a:rPr lang="en-US" sz="2000" dirty="0" smtClean="0"/>
+              <a:t>Each </a:t>
+            </a:r>
+            <a:r>
+              <a:rPr lang="en-US" sz="2000" dirty="0" smtClean="0"/>
+              <a:t>term must have it's </a:t>
+            </a:r>
+            <a:r>
+              <a:rPr lang="en-US" sz="2000" i="1" dirty="0" smtClean="0"/>
+              <a:t>value</a:t>
+            </a:r>
+            <a:r>
+              <a:rPr lang="en-US" sz="2000" dirty="0" smtClean="0"/>
+              <a:t> </a:t>
+            </a:r>
+            <a:r>
+              <a:rPr lang="en-US" sz="2000" dirty="0" smtClean="0">
+                <a:solidFill>
+                  <a:srgbClr val="0070C0"/>
+                </a:solidFill>
+              </a:rPr>
+              <a:t>attribute</a:t>
+            </a:r>
+            <a:r>
+              <a:rPr lang="en-US" sz="2000" dirty="0" smtClean="0"/>
+              <a:t> equal to </a:t>
+            </a:r>
+            <a:r>
+              <a:rPr lang="en-US" sz="2000" dirty="0" smtClean="0"/>
+              <a:t>“root”</a:t>
+            </a:r>
+          </a:p>
+          <a:p>
+            <a:pPr marL="800100" lvl="1" indent="-342900">
+              <a:spcBef>
+                <a:spcPct val="20000"/>
+              </a:spcBef>
+              <a:buClr>
+                <a:srgbClr val="00AAF6"/>
+              </a:buClr>
+              <a:buFontTx/>
+              <a:buChar char="•"/>
+              <a:defRPr/>
+            </a:pPr>
+            <a:r>
+              <a:rPr lang="en-US" sz="2000" dirty="0" smtClean="0"/>
+              <a:t>The </a:t>
+            </a:r>
+            <a:r>
+              <a:rPr lang="en-US" sz="2000" dirty="0" smtClean="0"/>
+              <a:t>query is executed on </a:t>
+            </a:r>
+            <a:r>
+              <a:rPr lang="en-US" sz="2000" dirty="0" smtClean="0">
+                <a:solidFill>
+                  <a:srgbClr val="7030A0"/>
+                </a:solidFill>
+              </a:rPr>
+              <a:t>two data services</a:t>
+            </a:r>
+            <a:r>
+              <a:rPr lang="en-US" sz="2000" dirty="0" smtClean="0"/>
+              <a:t>, each indicated by the </a:t>
+            </a:r>
+            <a:r>
+              <a:rPr lang="en-US" sz="2000" i="1" dirty="0" err="1" smtClean="0"/>
+              <a:t>targetServiceUrl</a:t>
+            </a:r>
+            <a:r>
+              <a:rPr lang="en-US" sz="2000" dirty="0" smtClean="0"/>
+              <a:t> </a:t>
+            </a:r>
+            <a:r>
+              <a:rPr lang="en-US" sz="2000" dirty="0" smtClean="0"/>
+              <a:t>elements at the end of the </a:t>
+            </a:r>
+            <a:r>
+              <a:rPr lang="en-US" sz="2000" dirty="0" smtClean="0"/>
+              <a:t>query</a:t>
+            </a:r>
+          </a:p>
+          <a:p>
+            <a:pPr marL="342900" indent="-342900">
+              <a:spcBef>
+                <a:spcPct val="20000"/>
+              </a:spcBef>
+              <a:buClr>
+                <a:srgbClr val="00AAF6"/>
+              </a:buClr>
+              <a:buFontTx/>
+              <a:buChar char="•"/>
+              <a:defRPr/>
+            </a:pPr>
+            <a:endParaRPr lang="en-US" sz="2000" dirty="0" smtClean="0"/>
+          </a:p>
+          <a:p>
+            <a:pPr marL="800100" lvl="1" indent="-342900">
+              <a:spcBef>
+                <a:spcPct val="20000"/>
+              </a:spcBef>
+              <a:buClr>
+                <a:srgbClr val="00AAF6"/>
+              </a:buClr>
+              <a:buFontTx/>
+              <a:buChar char="•"/>
+              <a:defRPr/>
+            </a:pPr>
+            <a:endParaRPr lang="en-US" sz="2000" kern="0" dirty="0" smtClean="0">
+              <a:latin typeface="+mn-lt"/>
+            </a:endParaRPr>
+          </a:p>
+        </p:txBody>
+      </p:sp>
+      <p:sp>
+        <p:nvSpPr>
+          <p:cNvPr id="7" name="TextBox 6"/>
+          <p:cNvSpPr txBox="1"/>
+          <p:nvPr/>
         </p:nvSpPr>
         <p:spPr>
           <a:xfrm>
-            <a:off x="685800" y="1447800"/>
-            <a:ext cx="8458200" cy="4953000"/>
+            <a:off x="228600" y="4495800"/>
+            <a:ext cx="8610600" cy="1892826"/>
           </a:xfrm>
+          <a:prstGeom prst="rect">
+            <a:avLst/>
+          </a:prstGeom>
+          <a:noFill/>
         </p:spPr>
         <p:txBody>
-          <a:bodyPr/>
+          <a:bodyPr wrap="square" rtlCol="0">
+            <a:spAutoFit/>
+          </a:bodyPr>
           <a:lstStyle/>
           <a:p>
-            <a:pPr>
-              <a:buFontTx/>
-              <a:buNone/>
-            </a:pPr>
-            <a:r>
-              <a:rPr lang="en-US" sz="1800" dirty="0" smtClean="0"/>
-              <a:t>Return all the Genes in my local database that have a symbol </a:t>
-            </a:r>
-            <a:r>
-              <a:rPr lang="en-US" sz="1800" i="1" dirty="0" smtClean="0"/>
-              <a:t>beginning </a:t>
-            </a:r>
-            <a:r>
-              <a:rPr lang="en-US" sz="1800" dirty="0" smtClean="0"/>
-              <a:t>with “BRC“ and also exist in the </a:t>
-            </a:r>
-            <a:r>
-              <a:rPr lang="en-US" sz="1800" dirty="0" err="1" smtClean="0"/>
-              <a:t>caBIO</a:t>
-            </a:r>
-            <a:r>
-              <a:rPr lang="en-US" sz="1800" dirty="0" smtClean="0"/>
-              <a:t> database.</a:t>
-            </a:r>
-          </a:p>
-          <a:p>
-            <a:pPr>
-              <a:buFontTx/>
-              <a:buNone/>
-            </a:pPr>
-            <a:endParaRPr lang="en-US" sz="1400" dirty="0" smtClean="0"/>
-          </a:p>
-          <a:p>
-            <a:pPr>
-              <a:buFontTx/>
-              <a:buNone/>
-            </a:pPr>
-            <a:r>
-              <a:rPr lang="en-US" sz="1400" dirty="0" smtClean="0"/>
+            <a:r>
+              <a:rPr lang="en-US" sz="1300" dirty="0" smtClean="0">
+                <a:latin typeface="Arial Narrow" pitchFamily="34" charset="0"/>
+              </a:rPr>
+              <a:t>&lt;ns1:DCQLQuery </a:t>
+            </a:r>
+            <a:r>
+              <a:rPr lang="en-US" sz="1300" dirty="0" smtClean="0">
+                <a:latin typeface="Arial Narrow" pitchFamily="34" charset="0"/>
+              </a:rPr>
+              <a:t>xmlns:ns1=</a:t>
+            </a:r>
+            <a:r>
+              <a:rPr lang="en-US" sz="1300" dirty="0" smtClean="0">
+                <a:latin typeface="Arial Narrow" pitchFamily="34" charset="0"/>
+                <a:hlinkClick r:id="rId3"/>
+              </a:rPr>
+              <a:t>http</a:t>
+            </a:r>
+            <a:r>
+              <a:rPr lang="en-US" sz="1300" dirty="0" smtClean="0">
+                <a:latin typeface="Arial Narrow" pitchFamily="34" charset="0"/>
+                <a:hlinkClick r:id="rId3"/>
+              </a:rPr>
+              <a:t>://</a:t>
+            </a:r>
+            <a:r>
+              <a:rPr lang="en-US" sz="1300" dirty="0" smtClean="0">
+                <a:latin typeface="Arial Narrow" pitchFamily="34" charset="0"/>
+                <a:hlinkClick r:id="rId3"/>
+              </a:rPr>
+              <a:t>caGrid.caBIG/1.0/gov.nih.nci.cagrid.dcql</a:t>
+            </a:r>
+            <a:r>
+              <a:rPr lang="en-US" sz="1300" dirty="0" smtClean="0">
+                <a:latin typeface="Arial Narrow" pitchFamily="34" charset="0"/>
+              </a:rPr>
+              <a:t>&gt;</a:t>
+            </a:r>
+          </a:p>
+          <a:p>
+            <a:r>
+              <a:rPr lang="en-US" sz="1300" dirty="0" smtClean="0">
+                <a:latin typeface="Arial Narrow" pitchFamily="34" charset="0"/>
+              </a:rPr>
+              <a:t>   </a:t>
+            </a:r>
+            <a:r>
+              <a:rPr lang="en-US" sz="1300" dirty="0" smtClean="0">
+                <a:solidFill>
+                  <a:srgbClr val="C00000"/>
+                </a:solidFill>
+                <a:latin typeface="Arial Narrow" pitchFamily="34" charset="0"/>
+              </a:rPr>
               <a:t>&lt;</a:t>
             </a:r>
             <a:r>
-              <a:rPr lang="en-US" sz="1400" dirty="0" err="1" smtClean="0"/>
-              <a:t>DCQLQuery</a:t>
-            </a:r>
-            <a:r>
-              <a:rPr lang="en-US" sz="1400" dirty="0" smtClean="0"/>
+              <a:rPr lang="en-US" sz="1300" dirty="0" smtClean="0">
+                <a:solidFill>
+                  <a:srgbClr val="C00000"/>
+                </a:solidFill>
+                <a:latin typeface="Arial Narrow" pitchFamily="34" charset="0"/>
+              </a:rPr>
+              <a:t>ns1:TargetObject name="model1.domain.Gene</a:t>
+            </a:r>
+            <a:r>
+              <a:rPr lang="en-US" sz="1300" dirty="0" smtClean="0">
+                <a:solidFill>
+                  <a:srgbClr val="C00000"/>
+                </a:solidFill>
+                <a:latin typeface="Arial Narrow" pitchFamily="34" charset="0"/>
+              </a:rPr>
+              <a:t>"&gt;</a:t>
+            </a:r>
+          </a:p>
+          <a:p>
+            <a:r>
+              <a:rPr lang="en-US" sz="1300" dirty="0" smtClean="0">
+                <a:latin typeface="Arial Narrow" pitchFamily="34" charset="0"/>
+              </a:rPr>
+              <a:t>      </a:t>
+            </a:r>
+            <a:r>
+              <a:rPr lang="en-US" sz="1300" dirty="0" smtClean="0">
+                <a:solidFill>
+                  <a:srgbClr val="00B050"/>
+                </a:solidFill>
+                <a:latin typeface="Arial Narrow" pitchFamily="34" charset="0"/>
+              </a:rPr>
+              <a:t>&lt;</a:t>
+            </a:r>
+            <a:r>
+              <a:rPr lang="en-US" sz="1300" dirty="0" smtClean="0">
+                <a:solidFill>
+                  <a:srgbClr val="00B050"/>
+                </a:solidFill>
+                <a:latin typeface="Arial Narrow" pitchFamily="34" charset="0"/>
+              </a:rPr>
+              <a:t>ns1:Association name="model1.domain.Term" </a:t>
+            </a:r>
+            <a:r>
+              <a:rPr lang="en-US" sz="1300" dirty="0" err="1" smtClean="0">
+                <a:solidFill>
+                  <a:srgbClr val="00B050"/>
+                </a:solidFill>
+                <a:latin typeface="Arial Narrow" pitchFamily="34" charset="0"/>
+              </a:rPr>
+              <a:t>roleName</a:t>
+            </a:r>
+            <a:r>
+              <a:rPr lang="en-US" sz="1300" dirty="0" smtClean="0">
+                <a:solidFill>
+                  <a:srgbClr val="00B050"/>
+                </a:solidFill>
+                <a:latin typeface="Arial Narrow" pitchFamily="34" charset="0"/>
+              </a:rPr>
+              <a:t>="terms</a:t>
+            </a:r>
+            <a:r>
+              <a:rPr lang="en-US" sz="1300" dirty="0" smtClean="0">
+                <a:solidFill>
+                  <a:srgbClr val="00B050"/>
+                </a:solidFill>
+                <a:latin typeface="Arial Narrow" pitchFamily="34" charset="0"/>
+              </a:rPr>
+              <a:t>"&gt;</a:t>
+            </a:r>
+          </a:p>
+          <a:p>
+            <a:r>
+              <a:rPr lang="en-US" sz="1300" dirty="0" smtClean="0">
+                <a:latin typeface="Arial Narrow" pitchFamily="34" charset="0"/>
+              </a:rPr>
+              <a:t>         </a:t>
+            </a:r>
+            <a:r>
+              <a:rPr lang="en-US" sz="1300" dirty="0" smtClean="0">
+                <a:solidFill>
+                  <a:srgbClr val="0070C0"/>
+                </a:solidFill>
+                <a:latin typeface="Arial Narrow" pitchFamily="34" charset="0"/>
+              </a:rPr>
+              <a:t>&lt;</a:t>
+            </a:r>
+            <a:r>
+              <a:rPr lang="en-US" sz="1300" dirty="0" smtClean="0">
+                <a:solidFill>
+                  <a:srgbClr val="0070C0"/>
+                </a:solidFill>
+                <a:latin typeface="Arial Narrow" pitchFamily="34" charset="0"/>
+              </a:rPr>
+              <a:t>ns1:Attribute name="value" predicate="EQUAL_TO" value="root</a:t>
+            </a:r>
+            <a:r>
+              <a:rPr lang="en-US" sz="1300" dirty="0" smtClean="0">
+                <a:solidFill>
+                  <a:srgbClr val="0070C0"/>
+                </a:solidFill>
+                <a:latin typeface="Arial Narrow" pitchFamily="34" charset="0"/>
+              </a:rPr>
+              <a:t>"/&gt;</a:t>
+            </a:r>
+          </a:p>
+          <a:p>
+            <a:r>
+              <a:rPr lang="en-US" sz="1300" dirty="0" smtClean="0">
+                <a:latin typeface="Arial Narrow" pitchFamily="34" charset="0"/>
+              </a:rPr>
+              <a:t>      </a:t>
+            </a:r>
+            <a:r>
+              <a:rPr lang="en-US" sz="1300" dirty="0" smtClean="0">
+                <a:solidFill>
+                  <a:srgbClr val="00B050"/>
+                </a:solidFill>
+                <a:latin typeface="Arial Narrow" pitchFamily="34" charset="0"/>
+              </a:rPr>
+              <a:t>&lt;/</a:t>
+            </a:r>
+            <a:r>
+              <a:rPr lang="en-US" sz="1300" dirty="0" smtClean="0">
+                <a:solidFill>
+                  <a:srgbClr val="00B050"/>
+                </a:solidFill>
+                <a:latin typeface="Arial Narrow" pitchFamily="34" charset="0"/>
+              </a:rPr>
+              <a:t>ns1:Association</a:t>
+            </a:r>
+            <a:r>
+              <a:rPr lang="en-US" sz="1300" dirty="0" smtClean="0">
+                <a:solidFill>
+                  <a:srgbClr val="00B050"/>
+                </a:solidFill>
+                <a:latin typeface="Arial Narrow" pitchFamily="34" charset="0"/>
+              </a:rPr>
               <a:t>&gt;</a:t>
             </a:r>
           </a:p>
           <a:p>
-            <a:pPr>
-              <a:buFontTx/>
-              <a:buNone/>
-            </a:pPr>
-            <a:r>
-              <a:rPr lang="en-US" sz="1400" dirty="0" smtClean="0"/>
-              <a:t>    &lt;</a:t>
-            </a:r>
-            <a:r>
-              <a:rPr lang="en-US" sz="1400" dirty="0" err="1" smtClean="0"/>
-              <a:t>TargetObject</a:t>
-            </a:r>
-            <a:r>
-              <a:rPr lang="en-US" sz="1400" dirty="0" smtClean="0"/>
-              <a:t> name=</a:t>
-            </a:r>
-            <a:r>
-              <a:rPr lang="en-US" sz="1400" i="1" dirty="0" smtClean="0"/>
-              <a:t>"</a:t>
-            </a:r>
-            <a:r>
-              <a:rPr lang="en-US" sz="1400" i="1" dirty="0" err="1" smtClean="0"/>
-              <a:t>gov.nih.nci.cabio.domain.Gene</a:t>
-            </a:r>
-            <a:r>
-              <a:rPr lang="en-US" sz="1400" i="1" dirty="0" smtClean="0"/>
-              <a:t>"&gt;</a:t>
-            </a:r>
-          </a:p>
-          <a:p>
-            <a:pPr>
-              <a:buFontTx/>
-              <a:buNone/>
-            </a:pPr>
-            <a:r>
-              <a:rPr lang="en-US" sz="1400" dirty="0" smtClean="0"/>
-              <a:t>        &lt;Group </a:t>
-            </a:r>
-            <a:r>
-              <a:rPr lang="en-US" sz="1400" dirty="0" err="1" smtClean="0"/>
-              <a:t>logicRelation</a:t>
-            </a:r>
-            <a:r>
-              <a:rPr lang="en-US" sz="1400" dirty="0" smtClean="0"/>
-              <a:t>=</a:t>
-            </a:r>
-            <a:r>
-              <a:rPr lang="en-US" sz="1400" i="1" dirty="0" smtClean="0"/>
-              <a:t>"AND"&gt;</a:t>
-            </a:r>
-          </a:p>
-          <a:p>
-            <a:pPr>
-              <a:buFontTx/>
-              <a:buNone/>
-            </a:pPr>
-            <a:r>
-              <a:rPr lang="en-US" sz="1400" dirty="0" smtClean="0">
+            <a:r>
+              <a:rPr lang="en-US" sz="1300" dirty="0" smtClean="0">
+                <a:latin typeface="Arial Narrow" pitchFamily="34" charset="0"/>
+              </a:rPr>
+              <a:t>    </a:t>
+            </a:r>
+            <a:r>
+              <a:rPr lang="en-US" sz="1300" dirty="0" smtClean="0">
                 <a:solidFill>
-                  <a:srgbClr val="FF0000"/>
+                  <a:srgbClr val="C00000"/>
                 </a:solidFill>
-              </a:rPr>
-              <a:t>            &lt;</a:t>
-            </a:r>
-            <a:r>
-              <a:rPr lang="en-US" sz="1400" dirty="0" err="1" smtClean="0">
+                <a:latin typeface="Arial Narrow" pitchFamily="34" charset="0"/>
+              </a:rPr>
+              <a:t>&lt;/ns1:TargetObject</a:t>
+            </a:r>
+            <a:r>
+              <a:rPr lang="en-US" sz="1300" dirty="0" smtClean="0">
                 <a:solidFill>
-                  <a:srgbClr val="FF0000"/>
+                  <a:srgbClr val="C00000"/>
                 </a:solidFill>
-              </a:rPr>
-              <a:t>ForeignAssociation</a:t>
-            </a:r>
-            <a:r>
-              <a:rPr lang="en-US" sz="1400" dirty="0" smtClean="0">
+                <a:latin typeface="Arial Narrow" pitchFamily="34" charset="0"/>
+              </a:rPr>
+              <a:t>&gt;</a:t>
+            </a:r>
+          </a:p>
+          <a:p>
+            <a:r>
+              <a:rPr lang="en-US" sz="1300" dirty="0" smtClean="0">
+                <a:latin typeface="Arial Narrow" pitchFamily="34" charset="0"/>
+              </a:rPr>
+              <a:t>   </a:t>
+            </a:r>
+            <a:r>
+              <a:rPr lang="en-US" sz="1300" dirty="0" smtClean="0">
                 <a:solidFill>
-                  <a:srgbClr val="FF0000"/>
+                  <a:srgbClr val="7030A0"/>
                 </a:solidFill>
-              </a:rPr>
-              <a:t> </a:t>
-            </a:r>
-            <a:r>
-              <a:rPr lang="en-US" sz="1400" dirty="0" err="1" smtClean="0">
+                <a:latin typeface="Arial Narrow" pitchFamily="34" charset="0"/>
+              </a:rPr>
+              <a:t>&lt;</a:t>
+            </a:r>
+            <a:r>
+              <a:rPr lang="en-US" sz="1300" dirty="0" smtClean="0">
                 <a:solidFill>
-                  <a:srgbClr val="FF0000"/>
+                  <a:srgbClr val="7030A0"/>
                 </a:solidFill>
-              </a:rPr>
-              <a:t>targetServiceURL</a:t>
-            </a:r>
-            <a:r>
-              <a:rPr lang="en-US" sz="1400" dirty="0" smtClean="0">
+                <a:latin typeface="Arial Narrow" pitchFamily="34" charset="0"/>
+              </a:rPr>
+              <a:t>ns1:targetServiceURL&gt;http://</a:t>
+            </a:r>
+            <a:r>
+              <a:rPr lang="en-US" sz="1300" dirty="0" smtClean="0">
                 <a:solidFill>
-                  <a:srgbClr val="FF0000"/>
+                  <a:srgbClr val="7030A0"/>
                 </a:solidFill>
-              </a:rPr>
-              <a:t>=</a:t>
-            </a:r>
-            <a:r>
-              <a:rPr lang="en-US" sz="1400" i="1" dirty="0" smtClean="0">
+                <a:latin typeface="Arial Narrow" pitchFamily="34" charset="0"/>
+              </a:rPr>
+              <a:t>sbdev1000.semanticbits.com:13080/wsrf-model1/services/cagrid/Model1Svc&lt;/</a:t>
+            </a:r>
+            <a:r>
+              <a:rPr lang="en-US" sz="1300" dirty="0" smtClean="0">
                 <a:solidFill>
-                  <a:srgbClr val="FF0000"/>
+                  <a:srgbClr val="7030A0"/>
                 </a:solidFill>
-              </a:rPr>
-              <a:t>"http://cabio-gridservice.nci.nih.gov:80/wsrf-cabio/services/cagrid/CaBIOSvc"&gt;</a:t>
-            </a:r>
-          </a:p>
-          <a:p>
-            <a:pPr>
-              <a:buFontTx/>
-              <a:buNone/>
-            </a:pPr>
-            <a:r>
-              <a:rPr lang="en-US" sz="1400" dirty="0" smtClean="0">
+                <a:latin typeface="Arial Narrow" pitchFamily="34" charset="0"/>
+              </a:rPr>
+              <a:t>ns1:targetServiceURL</a:t>
+            </a:r>
+            <a:r>
+              <a:rPr lang="en-US" sz="1300" dirty="0" smtClean="0">
                 <a:solidFill>
-                  <a:srgbClr val="008000"/>
+                  <a:srgbClr val="7030A0"/>
                 </a:solidFill>
-              </a:rPr>
-              <a:t>                &lt;</a:t>
-            </a:r>
-            <a:r>
-              <a:rPr lang="en-US" sz="1400" dirty="0" err="1" smtClean="0">
+                <a:latin typeface="Arial Narrow" pitchFamily="34" charset="0"/>
+              </a:rPr>
+              <a:t>&gt;</a:t>
+            </a:r>
+          </a:p>
+          <a:p>
+            <a:r>
+              <a:rPr lang="en-US" sz="1300" dirty="0" smtClean="0">
                 <a:solidFill>
-                  <a:srgbClr val="008000"/>
+                  <a:srgbClr val="7030A0"/>
                 </a:solidFill>
-              </a:rPr>
-              <a:t>JoinCondition</a:t>
-            </a:r>
-            <a:r>
-              <a:rPr lang="en-US" sz="1400" dirty="0" smtClean="0">
+                <a:latin typeface="Arial Narrow" pitchFamily="34" charset="0"/>
+              </a:rPr>
+              <a:t>   &lt;</a:t>
+            </a:r>
+            <a:r>
+              <a:rPr lang="en-US" sz="1300" dirty="0" smtClean="0">
                 <a:solidFill>
-                  <a:srgbClr val="008000"/>
+                  <a:srgbClr val="7030A0"/>
                 </a:solidFill>
-              </a:rPr>
-              <a:t> </a:t>
-            </a:r>
-            <a:r>
-              <a:rPr lang="en-US" sz="1400" dirty="0" err="1" smtClean="0">
+                <a:latin typeface="Arial Narrow" pitchFamily="34" charset="0"/>
+              </a:rPr>
+              <a:t>ns1:targetServiceURL&gt;http://sbdev1000.semanticbits.com:13080/wsrf-model1-a/services/cagrid/Model1Svc&lt;/ns1:targetServiceURL</a:t>
+            </a:r>
+            <a:r>
+              <a:rPr lang="en-US" sz="1300" dirty="0" smtClean="0">
                 <a:solidFill>
-                  <a:srgbClr val="008000"/>
+                  <a:srgbClr val="7030A0"/>
                 </a:solidFill>
-              </a:rPr>
-              <a:t>localAttributeName</a:t>
-            </a:r>
-            <a:r>
-              <a:rPr lang="en-US" sz="1400" dirty="0" smtClean="0">
-                <a:solidFill>
-                  <a:srgbClr val="008000"/>
-                </a:solidFill>
-              </a:rPr>
-              <a:t>=</a:t>
-            </a:r>
-            <a:r>
-              <a:rPr lang="en-US" sz="1400" i="1" dirty="0" smtClean="0">
-                <a:solidFill>
-                  <a:srgbClr val="008000"/>
-                </a:solidFill>
-              </a:rPr>
-              <a:t>"</a:t>
-            </a:r>
-            <a:r>
-              <a:rPr lang="en-US" sz="1400" i="1" dirty="0" err="1" smtClean="0">
-                <a:solidFill>
-                  <a:srgbClr val="008000"/>
-                </a:solidFill>
-              </a:rPr>
-              <a:t>fullName</a:t>
-            </a:r>
-            <a:r>
-              <a:rPr lang="en-US" sz="1400" i="1" dirty="0" smtClean="0">
-                <a:solidFill>
-                  <a:srgbClr val="008000"/>
-                </a:solidFill>
-              </a:rPr>
-              <a:t>" </a:t>
-            </a:r>
-            <a:r>
-              <a:rPr lang="en-US" sz="1400" i="1" dirty="0" err="1" smtClean="0">
-                <a:solidFill>
-                  <a:srgbClr val="008000"/>
-                </a:solidFill>
-              </a:rPr>
-              <a:t>foreignAttributeName</a:t>
-            </a:r>
-            <a:r>
-              <a:rPr lang="en-US" sz="1400" i="1" dirty="0" smtClean="0">
-                <a:solidFill>
-                  <a:srgbClr val="008000"/>
-                </a:solidFill>
-              </a:rPr>
-              <a:t>="</a:t>
-            </a:r>
-            <a:r>
-              <a:rPr lang="en-US" sz="1400" i="1" dirty="0" err="1" smtClean="0">
-                <a:solidFill>
-                  <a:srgbClr val="008000"/>
-                </a:solidFill>
-              </a:rPr>
-              <a:t>fullName</a:t>
-            </a:r>
-            <a:r>
-              <a:rPr lang="en-US" sz="1400" i="1" dirty="0" smtClean="0">
-                <a:solidFill>
-                  <a:srgbClr val="008000"/>
-                </a:solidFill>
-              </a:rPr>
-              <a:t>" predicate="EQUAL_TO"/&gt;</a:t>
-            </a:r>
-          </a:p>
-          <a:p>
-            <a:pPr>
-              <a:buFontTx/>
-              <a:buNone/>
-            </a:pPr>
-            <a:r>
-              <a:rPr lang="en-US" sz="1400" dirty="0" smtClean="0">
-                <a:solidFill>
-                  <a:srgbClr val="0000FF"/>
-                </a:solidFill>
-              </a:rPr>
-              <a:t>                &lt;</a:t>
-            </a:r>
-            <a:r>
-              <a:rPr lang="en-US" sz="1400" dirty="0" err="1" smtClean="0">
-                <a:solidFill>
-                  <a:srgbClr val="0000FF"/>
-                </a:solidFill>
-              </a:rPr>
-              <a:t>ForeignObject</a:t>
-            </a:r>
-            <a:r>
-              <a:rPr lang="en-US" sz="1400" dirty="0" smtClean="0">
-                <a:solidFill>
-                  <a:srgbClr val="0000FF"/>
-                </a:solidFill>
-              </a:rPr>
-              <a:t> name=</a:t>
-            </a:r>
-            <a:r>
-              <a:rPr lang="en-US" sz="1400" i="1" dirty="0" smtClean="0">
-                <a:solidFill>
-                  <a:srgbClr val="0000FF"/>
-                </a:solidFill>
-              </a:rPr>
-              <a:t>"</a:t>
-            </a:r>
-            <a:r>
-              <a:rPr lang="en-US" sz="1400" i="1" dirty="0" err="1" smtClean="0">
-                <a:solidFill>
-                  <a:srgbClr val="0000FF"/>
-                </a:solidFill>
-              </a:rPr>
-              <a:t>gov.nih.nci.cabio.domain.Gene</a:t>
-            </a:r>
-            <a:r>
-              <a:rPr lang="en-US" sz="1400" i="1" dirty="0" smtClean="0">
-                <a:solidFill>
-                  <a:srgbClr val="0000FF"/>
-                </a:solidFill>
-              </a:rPr>
-              <a:t>"&gt;</a:t>
-            </a:r>
-          </a:p>
-          <a:p>
-            <a:pPr>
-              <a:buFontTx/>
-              <a:buNone/>
-            </a:pPr>
-            <a:r>
-              <a:rPr lang="en-US" sz="1400" dirty="0" smtClean="0">
-                <a:solidFill>
-                  <a:srgbClr val="0000FF"/>
-                </a:solidFill>
-              </a:rPr>
-              <a:t>                    &lt;Attribute name=</a:t>
-            </a:r>
-            <a:r>
-              <a:rPr lang="en-US" sz="1400" i="1" dirty="0" smtClean="0">
-                <a:solidFill>
-                  <a:srgbClr val="0000FF"/>
-                </a:solidFill>
-              </a:rPr>
-              <a:t>"</a:t>
-            </a:r>
-            <a:r>
-              <a:rPr lang="en-US" sz="1400" i="1" dirty="0" err="1" smtClean="0">
-                <a:solidFill>
-                  <a:srgbClr val="0000FF"/>
-                </a:solidFill>
-              </a:rPr>
-              <a:t>fullName</a:t>
-            </a:r>
-            <a:r>
-              <a:rPr lang="en-US" sz="1400" i="1" dirty="0" smtClean="0">
-                <a:solidFill>
-                  <a:srgbClr val="0000FF"/>
-                </a:solidFill>
-              </a:rPr>
-              <a:t>" value="BRCA%" predicate="LIKE"/&gt;</a:t>
-            </a:r>
-          </a:p>
-          <a:p>
-            <a:pPr>
-              <a:buFontTx/>
-              <a:buNone/>
-            </a:pPr>
-            <a:r>
-              <a:rPr lang="en-US" sz="1400" dirty="0" smtClean="0">
-                <a:solidFill>
-                  <a:srgbClr val="0000FF"/>
-                </a:solidFill>
-              </a:rPr>
-              <a:t>                &lt;/</a:t>
-            </a:r>
-            <a:r>
-              <a:rPr lang="en-US" sz="1400" dirty="0" err="1" smtClean="0">
-                <a:solidFill>
-                  <a:srgbClr val="0000FF"/>
-                </a:solidFill>
-              </a:rPr>
-              <a:t>ForeignObject</a:t>
-            </a:r>
-            <a:r>
-              <a:rPr lang="en-US" sz="1400" dirty="0" smtClean="0">
-                <a:solidFill>
-                  <a:srgbClr val="0000FF"/>
-                </a:solidFill>
+                <a:latin typeface="Arial Narrow" pitchFamily="34" charset="0"/>
               </a:rPr>
               <a:t>&gt;</a:t>
             </a:r>
           </a:p>
           <a:p>
-            <a:pPr>
-              <a:buFontTx/>
-              <a:buNone/>
-            </a:pPr>
-            <a:r>
-              <a:rPr lang="en-US" sz="1400" dirty="0" smtClean="0">
-                <a:solidFill>
-                  <a:srgbClr val="FF0000"/>
-                </a:solidFill>
-              </a:rPr>
-              <a:t>            &lt;/</a:t>
-            </a:r>
-            <a:r>
-              <a:rPr lang="en-US" sz="1400" dirty="0" err="1" smtClean="0">
-                <a:solidFill>
-                  <a:srgbClr val="FF0000"/>
-                </a:solidFill>
-              </a:rPr>
-              <a:t>ForeignAssociation</a:t>
-            </a:r>
-            <a:r>
-              <a:rPr lang="en-US" sz="1400" dirty="0" smtClean="0">
-                <a:solidFill>
-                  <a:srgbClr val="FF0000"/>
-                </a:solidFill>
-              </a:rPr>
-              <a:t>&gt;</a:t>
-            </a:r>
-          </a:p>
-          <a:p>
-            <a:pPr>
-              <a:buFontTx/>
-              <a:buNone/>
-            </a:pPr>
-            <a:r>
-              <a:rPr lang="en-US" sz="1400" dirty="0" smtClean="0"/>
-              <a:t>            &lt;Attribute name=</a:t>
-            </a:r>
-            <a:r>
-              <a:rPr lang="en-US" sz="1400" i="1" dirty="0" smtClean="0"/>
-              <a:t>"</a:t>
-            </a:r>
-            <a:r>
-              <a:rPr lang="en-US" sz="1400" i="1" dirty="0" err="1" smtClean="0"/>
-              <a:t>fullName</a:t>
-            </a:r>
-            <a:r>
-              <a:rPr lang="en-US" sz="1400" i="1" dirty="0" smtClean="0"/>
-              <a:t>" value="BRCA%" predicate="LIKE"/&gt;</a:t>
-            </a:r>
-          </a:p>
-          <a:p>
-            <a:pPr>
-              <a:buFontTx/>
-              <a:buNone/>
-            </a:pPr>
-            <a:r>
-              <a:rPr lang="en-US" sz="1400" dirty="0" smtClean="0"/>
-              <a:t>        &lt;/Group&gt;</a:t>
-            </a:r>
-          </a:p>
-          <a:p>
-            <a:pPr>
-              <a:buFontTx/>
-              <a:buNone/>
-            </a:pPr>
-            <a:r>
-              <a:rPr lang="en-US" sz="1400" dirty="0" smtClean="0"/>
-              <a:t>    &lt;/</a:t>
-            </a:r>
-            <a:r>
-              <a:rPr lang="en-US" sz="1400" dirty="0" err="1" smtClean="0"/>
-              <a:t>TargetObject</a:t>
-            </a:r>
-            <a:r>
-              <a:rPr lang="en-US" sz="1400" dirty="0" smtClean="0"/>
-              <a:t>&gt;</a:t>
-            </a:r>
-          </a:p>
-          <a:p>
-            <a:pPr>
-              <a:buFontTx/>
-              <a:buNone/>
-            </a:pPr>
-            <a:r>
-              <a:rPr lang="en-US" sz="1400" dirty="0" smtClean="0"/>
-              <a:t>    &lt;</a:t>
-            </a:r>
-            <a:r>
-              <a:rPr lang="en-US" sz="1400" dirty="0" err="1" smtClean="0"/>
-              <a:t>targetServiceURL</a:t>
-            </a:r>
-            <a:r>
-              <a:rPr lang="en-US" sz="1400" dirty="0" smtClean="0"/>
-              <a:t>&gt;http://localhost:8080/wsrf/services/cagrid/CaBIO&lt;/targetServiceURL&gt;</a:t>
-            </a:r>
-          </a:p>
-          <a:p>
-            <a:pPr>
-              <a:buFontTx/>
-              <a:buNone/>
-            </a:pPr>
-            <a:r>
-              <a:rPr lang="en-US" sz="1400" dirty="0" smtClean="0"/>
+            <a:r>
+              <a:rPr lang="en-US" sz="1300" dirty="0" smtClean="0">
+                <a:latin typeface="Arial Narrow" pitchFamily="34" charset="0"/>
+              </a:rPr>
               <a:t>&lt;/</a:t>
             </a:r>
             <a:r>
-              <a:rPr lang="en-US" sz="1400" dirty="0" err="1" smtClean="0"/>
-              <a:t>DCQLQuery</a:t>
-            </a:r>
-            <a:r>
-              <a:rPr lang="en-US" sz="1400" dirty="0" smtClean="0"/>
-              <a:t>&gt;</a:t>
-            </a:r>
+              <a:rPr lang="en-US" sz="1300" dirty="0" smtClean="0">
+                <a:latin typeface="Arial Narrow" pitchFamily="34" charset="0"/>
+              </a:rPr>
+              <a:t>ns1:DCQLQuery&gt;</a:t>
+            </a:r>
+            <a:endParaRPr lang="en-US" sz="1300" dirty="0">
+              <a:latin typeface="Arial Narrow" pitchFamily="34" charset="0"/>
+            </a:endParaRPr>
           </a:p>
         </p:txBody>
       </p:sp>

</xml_diff>